<commit_message>
Introduce frame number in motor settings and scanline number in transducer settings. Remove some constructors with all the parameters
</commit_message>
<xml_diff>
--- a/doc/image/img-usProbeSettings.pptx
+++ b/doc/image/img-usProbeSettings.pptx
@@ -7,8 +7,11 @@
   <p:sldIdLst>
     <p:sldId id="258" r:id="rId2"/>
     <p:sldId id="259" r:id="rId3"/>
-    <p:sldId id="260" r:id="rId4"/>
-    <p:sldId id="261" r:id="rId5"/>
+    <p:sldId id="266" r:id="rId4"/>
+    <p:sldId id="260" r:id="rId5"/>
+    <p:sldId id="261" r:id="rId6"/>
+    <p:sldId id="262" r:id="rId7"/>
+    <p:sldId id="265" r:id="rId8"/>
   </p:sldIdLst>
   <p:sldSz cx="9144000" cy="6858000" type="screen4x3"/>
   <p:notesSz cx="6858000" cy="9144000"/>
@@ -8700,8 +8703,8 @@
             <a:solidFill>
               <a:schemeClr val="tx1"/>
             </a:solidFill>
-            <a:headEnd type="stealth"/>
-            <a:tailEnd type="stealth"/>
+            <a:headEnd type="triangle"/>
+            <a:tailEnd type="triangle"/>
           </a:ln>
           <a:effectLst/>
         </p:spPr>
@@ -8776,8 +8779,8 @@
             <a:solidFill>
               <a:schemeClr val="tx1"/>
             </a:solidFill>
-            <a:headEnd type="stealth"/>
-            <a:tailEnd type="stealth"/>
+            <a:headEnd type="triangle"/>
+            <a:tailEnd type="triangle"/>
           </a:ln>
           <a:effectLst/>
         </p:spPr>
@@ -8985,6 +8988,875 @@
 </file>
 
 <file path=ppt/slides/slide3.xml><?xml version="1.0" encoding="utf-8"?>
+<p:sld xmlns:a="http://schemas.openxmlformats.org/drawingml/2006/main" xmlns:r="http://schemas.openxmlformats.org/officeDocument/2006/relationships" xmlns:p="http://schemas.openxmlformats.org/presentationml/2006/main">
+  <p:cSld>
+    <p:spTree>
+      <p:nvGrpSpPr>
+        <p:cNvPr id="1" name=""/>
+        <p:cNvGrpSpPr/>
+        <p:nvPr/>
+      </p:nvGrpSpPr>
+      <p:grpSpPr>
+        <a:xfrm>
+          <a:off x="0" y="0"/>
+          <a:ext cx="0" cy="0"/>
+          <a:chOff x="0" y="0"/>
+          <a:chExt cx="0" cy="0"/>
+        </a:xfrm>
+      </p:grpSpPr>
+      <p:sp>
+        <p:nvSpPr>
+          <p:cNvPr id="101" name="Ellipse 100"/>
+          <p:cNvSpPr>
+            <a:spLocks noChangeAspect="1"/>
+          </p:cNvSpPr>
+          <p:nvPr/>
+        </p:nvSpPr>
+        <p:spPr>
+          <a:xfrm>
+            <a:off x="4010167" y="4801833"/>
+            <a:ext cx="72000" cy="72000"/>
+          </a:xfrm>
+          <a:prstGeom prst="ellipse">
+            <a:avLst/>
+          </a:prstGeom>
+          <a:effectLst/>
+        </p:spPr>
+        <p:style>
+          <a:lnRef idx="1">
+            <a:schemeClr val="accent1"/>
+          </a:lnRef>
+          <a:fillRef idx="3">
+            <a:schemeClr val="accent1"/>
+          </a:fillRef>
+          <a:effectRef idx="2">
+            <a:schemeClr val="accent1"/>
+          </a:effectRef>
+          <a:fontRef idx="minor">
+            <a:schemeClr val="lt1"/>
+          </a:fontRef>
+        </p:style>
+        <p:txBody>
+          <a:bodyPr rtlCol="0" anchor="ctr"/>
+          <a:lstStyle/>
+          <a:p>
+            <a:pPr algn="ctr"/>
+            <a:endParaRPr lang="en-GB"/>
+          </a:p>
+        </p:txBody>
+      </p:sp>
+      <p:sp>
+        <p:nvSpPr>
+          <p:cNvPr id="102" name="Ellipse 101"/>
+          <p:cNvSpPr>
+            <a:spLocks noChangeAspect="1"/>
+          </p:cNvSpPr>
+          <p:nvPr/>
+        </p:nvSpPr>
+        <p:spPr>
+          <a:xfrm>
+            <a:off x="4010167" y="4981833"/>
+            <a:ext cx="72000" cy="72000"/>
+          </a:xfrm>
+          <a:prstGeom prst="ellipse">
+            <a:avLst/>
+          </a:prstGeom>
+          <a:effectLst/>
+        </p:spPr>
+        <p:style>
+          <a:lnRef idx="1">
+            <a:schemeClr val="accent1"/>
+          </a:lnRef>
+          <a:fillRef idx="3">
+            <a:schemeClr val="accent1"/>
+          </a:fillRef>
+          <a:effectRef idx="2">
+            <a:schemeClr val="accent1"/>
+          </a:effectRef>
+          <a:fontRef idx="minor">
+            <a:schemeClr val="lt1"/>
+          </a:fontRef>
+        </p:style>
+        <p:txBody>
+          <a:bodyPr rtlCol="0" anchor="ctr"/>
+          <a:lstStyle/>
+          <a:p>
+            <a:pPr algn="ctr"/>
+            <a:endParaRPr lang="en-GB"/>
+          </a:p>
+        </p:txBody>
+      </p:sp>
+      <p:sp>
+        <p:nvSpPr>
+          <p:cNvPr id="103" name="Ellipse 102"/>
+          <p:cNvSpPr>
+            <a:spLocks noChangeAspect="1"/>
+          </p:cNvSpPr>
+          <p:nvPr/>
+        </p:nvSpPr>
+        <p:spPr>
+          <a:xfrm>
+            <a:off x="4010167" y="5161833"/>
+            <a:ext cx="72000" cy="72000"/>
+          </a:xfrm>
+          <a:prstGeom prst="ellipse">
+            <a:avLst/>
+          </a:prstGeom>
+          <a:effectLst/>
+        </p:spPr>
+        <p:style>
+          <a:lnRef idx="1">
+            <a:schemeClr val="accent1"/>
+          </a:lnRef>
+          <a:fillRef idx="3">
+            <a:schemeClr val="accent1"/>
+          </a:fillRef>
+          <a:effectRef idx="2">
+            <a:schemeClr val="accent1"/>
+          </a:effectRef>
+          <a:fontRef idx="minor">
+            <a:schemeClr val="lt1"/>
+          </a:fontRef>
+        </p:style>
+        <p:txBody>
+          <a:bodyPr rtlCol="0" anchor="ctr"/>
+          <a:lstStyle/>
+          <a:p>
+            <a:pPr algn="ctr"/>
+            <a:endParaRPr lang="en-GB"/>
+          </a:p>
+        </p:txBody>
+      </p:sp>
+      <p:sp>
+        <p:nvSpPr>
+          <p:cNvPr id="104" name="Ellipse 103"/>
+          <p:cNvSpPr>
+            <a:spLocks noChangeAspect="1"/>
+          </p:cNvSpPr>
+          <p:nvPr/>
+        </p:nvSpPr>
+        <p:spPr>
+          <a:xfrm>
+            <a:off x="4010167" y="5341833"/>
+            <a:ext cx="72000" cy="72000"/>
+          </a:xfrm>
+          <a:prstGeom prst="ellipse">
+            <a:avLst/>
+          </a:prstGeom>
+          <a:effectLst/>
+        </p:spPr>
+        <p:style>
+          <a:lnRef idx="1">
+            <a:schemeClr val="accent1"/>
+          </a:lnRef>
+          <a:fillRef idx="3">
+            <a:schemeClr val="accent1"/>
+          </a:fillRef>
+          <a:effectRef idx="2">
+            <a:schemeClr val="accent1"/>
+          </a:effectRef>
+          <a:fontRef idx="minor">
+            <a:schemeClr val="lt1"/>
+          </a:fontRef>
+        </p:style>
+        <p:txBody>
+          <a:bodyPr rtlCol="0" anchor="ctr"/>
+          <a:lstStyle/>
+          <a:p>
+            <a:pPr algn="ctr"/>
+            <a:endParaRPr lang="en-GB"/>
+          </a:p>
+        </p:txBody>
+      </p:sp>
+      <p:sp>
+        <p:nvSpPr>
+          <p:cNvPr id="105" name="Ellipse 104"/>
+          <p:cNvSpPr>
+            <a:spLocks noChangeAspect="1"/>
+          </p:cNvSpPr>
+          <p:nvPr/>
+        </p:nvSpPr>
+        <p:spPr>
+          <a:xfrm>
+            <a:off x="4010167" y="5521551"/>
+            <a:ext cx="72000" cy="72000"/>
+          </a:xfrm>
+          <a:prstGeom prst="ellipse">
+            <a:avLst/>
+          </a:prstGeom>
+          <a:effectLst/>
+        </p:spPr>
+        <p:style>
+          <a:lnRef idx="1">
+            <a:schemeClr val="accent1"/>
+          </a:lnRef>
+          <a:fillRef idx="3">
+            <a:schemeClr val="accent1"/>
+          </a:fillRef>
+          <a:effectRef idx="2">
+            <a:schemeClr val="accent1"/>
+          </a:effectRef>
+          <a:fontRef idx="minor">
+            <a:schemeClr val="lt1"/>
+          </a:fontRef>
+        </p:style>
+        <p:txBody>
+          <a:bodyPr rtlCol="0" anchor="ctr"/>
+          <a:lstStyle/>
+          <a:p>
+            <a:pPr algn="ctr"/>
+            <a:endParaRPr lang="en-GB"/>
+          </a:p>
+        </p:txBody>
+      </p:sp>
+      <p:sp>
+        <p:nvSpPr>
+          <p:cNvPr id="106" name="Ellipse 105"/>
+          <p:cNvSpPr>
+            <a:spLocks noChangeAspect="1"/>
+          </p:cNvSpPr>
+          <p:nvPr/>
+        </p:nvSpPr>
+        <p:spPr>
+          <a:xfrm>
+            <a:off x="4009701" y="5701833"/>
+            <a:ext cx="72000" cy="72000"/>
+          </a:xfrm>
+          <a:prstGeom prst="ellipse">
+            <a:avLst/>
+          </a:prstGeom>
+          <a:effectLst/>
+        </p:spPr>
+        <p:style>
+          <a:lnRef idx="1">
+            <a:schemeClr val="accent1"/>
+          </a:lnRef>
+          <a:fillRef idx="3">
+            <a:schemeClr val="accent1"/>
+          </a:fillRef>
+          <a:effectRef idx="2">
+            <a:schemeClr val="accent1"/>
+          </a:effectRef>
+          <a:fontRef idx="minor">
+            <a:schemeClr val="lt1"/>
+          </a:fontRef>
+        </p:style>
+        <p:txBody>
+          <a:bodyPr rtlCol="0" anchor="ctr"/>
+          <a:lstStyle/>
+          <a:p>
+            <a:pPr algn="ctr"/>
+            <a:endParaRPr lang="en-GB"/>
+          </a:p>
+        </p:txBody>
+      </p:sp>
+      <p:sp>
+        <p:nvSpPr>
+          <p:cNvPr id="107" name="Ellipse 106"/>
+          <p:cNvSpPr>
+            <a:spLocks noChangeAspect="1"/>
+          </p:cNvSpPr>
+          <p:nvPr/>
+        </p:nvSpPr>
+        <p:spPr>
+          <a:xfrm>
+            <a:off x="4010167" y="5881833"/>
+            <a:ext cx="72000" cy="72000"/>
+          </a:xfrm>
+          <a:prstGeom prst="ellipse">
+            <a:avLst/>
+          </a:prstGeom>
+          <a:effectLst/>
+        </p:spPr>
+        <p:style>
+          <a:lnRef idx="1">
+            <a:schemeClr val="accent1"/>
+          </a:lnRef>
+          <a:fillRef idx="3">
+            <a:schemeClr val="accent1"/>
+          </a:fillRef>
+          <a:effectRef idx="2">
+            <a:schemeClr val="accent1"/>
+          </a:effectRef>
+          <a:fontRef idx="minor">
+            <a:schemeClr val="lt1"/>
+          </a:fontRef>
+        </p:style>
+        <p:txBody>
+          <a:bodyPr rtlCol="0" anchor="ctr"/>
+          <a:lstStyle/>
+          <a:p>
+            <a:pPr algn="ctr"/>
+            <a:endParaRPr lang="en-GB"/>
+          </a:p>
+        </p:txBody>
+      </p:sp>
+      <p:cxnSp>
+        <p:nvCxnSpPr>
+          <p:cNvPr id="108" name="Connecteur droit 107"/>
+          <p:cNvCxnSpPr/>
+          <p:nvPr/>
+        </p:nvCxnSpPr>
+        <p:spPr>
+          <a:xfrm>
+            <a:off x="4224025" y="4819026"/>
+            <a:ext cx="0" cy="1116000"/>
+          </a:xfrm>
+          <a:prstGeom prst="line">
+            <a:avLst/>
+          </a:prstGeom>
+          <a:effectLst/>
+        </p:spPr>
+        <p:style>
+          <a:lnRef idx="2">
+            <a:schemeClr val="accent1"/>
+          </a:lnRef>
+          <a:fillRef idx="0">
+            <a:schemeClr val="accent1"/>
+          </a:fillRef>
+          <a:effectRef idx="1">
+            <a:schemeClr val="accent1"/>
+          </a:effectRef>
+          <a:fontRef idx="minor">
+            <a:schemeClr val="tx1"/>
+          </a:fontRef>
+        </p:style>
+      </p:cxnSp>
+      <p:cxnSp>
+        <p:nvCxnSpPr>
+          <p:cNvPr id="110" name="Connecteur droit 109"/>
+          <p:cNvCxnSpPr/>
+          <p:nvPr/>
+        </p:nvCxnSpPr>
+        <p:spPr>
+          <a:xfrm>
+            <a:off x="4404025" y="4819026"/>
+            <a:ext cx="0" cy="1116000"/>
+          </a:xfrm>
+          <a:prstGeom prst="line">
+            <a:avLst/>
+          </a:prstGeom>
+          <a:effectLst/>
+        </p:spPr>
+        <p:style>
+          <a:lnRef idx="2">
+            <a:schemeClr val="accent1"/>
+          </a:lnRef>
+          <a:fillRef idx="0">
+            <a:schemeClr val="accent1"/>
+          </a:fillRef>
+          <a:effectRef idx="1">
+            <a:schemeClr val="accent1"/>
+          </a:effectRef>
+          <a:fontRef idx="minor">
+            <a:schemeClr val="tx1"/>
+          </a:fontRef>
+        </p:style>
+      </p:cxnSp>
+      <p:cxnSp>
+        <p:nvCxnSpPr>
+          <p:cNvPr id="113" name="Connecteur droit 112"/>
+          <p:cNvCxnSpPr/>
+          <p:nvPr/>
+        </p:nvCxnSpPr>
+        <p:spPr>
+          <a:xfrm>
+            <a:off x="4584025" y="4819026"/>
+            <a:ext cx="0" cy="1116000"/>
+          </a:xfrm>
+          <a:prstGeom prst="line">
+            <a:avLst/>
+          </a:prstGeom>
+          <a:effectLst/>
+        </p:spPr>
+        <p:style>
+          <a:lnRef idx="2">
+            <a:schemeClr val="accent1"/>
+          </a:lnRef>
+          <a:fillRef idx="0">
+            <a:schemeClr val="accent1"/>
+          </a:fillRef>
+          <a:effectRef idx="1">
+            <a:schemeClr val="accent1"/>
+          </a:effectRef>
+          <a:fontRef idx="minor">
+            <a:schemeClr val="tx1"/>
+          </a:fontRef>
+        </p:style>
+      </p:cxnSp>
+      <p:cxnSp>
+        <p:nvCxnSpPr>
+          <p:cNvPr id="114" name="Connecteur droit 113"/>
+          <p:cNvCxnSpPr/>
+          <p:nvPr/>
+        </p:nvCxnSpPr>
+        <p:spPr>
+          <a:xfrm>
+            <a:off x="4764025" y="4819026"/>
+            <a:ext cx="0" cy="1116000"/>
+          </a:xfrm>
+          <a:prstGeom prst="line">
+            <a:avLst/>
+          </a:prstGeom>
+          <a:effectLst/>
+        </p:spPr>
+        <p:style>
+          <a:lnRef idx="2">
+            <a:schemeClr val="accent1"/>
+          </a:lnRef>
+          <a:fillRef idx="0">
+            <a:schemeClr val="accent1"/>
+          </a:fillRef>
+          <a:effectRef idx="1">
+            <a:schemeClr val="accent1"/>
+          </a:effectRef>
+          <a:fontRef idx="minor">
+            <a:schemeClr val="tx1"/>
+          </a:fontRef>
+        </p:style>
+      </p:cxnSp>
+      <p:cxnSp>
+        <p:nvCxnSpPr>
+          <p:cNvPr id="115" name="Connecteur droit 114"/>
+          <p:cNvCxnSpPr/>
+          <p:nvPr/>
+        </p:nvCxnSpPr>
+        <p:spPr>
+          <a:xfrm>
+            <a:off x="4944025" y="4818972"/>
+            <a:ext cx="0" cy="1116000"/>
+          </a:xfrm>
+          <a:prstGeom prst="line">
+            <a:avLst/>
+          </a:prstGeom>
+          <a:effectLst/>
+        </p:spPr>
+        <p:style>
+          <a:lnRef idx="2">
+            <a:schemeClr val="accent1"/>
+          </a:lnRef>
+          <a:fillRef idx="0">
+            <a:schemeClr val="accent1"/>
+          </a:fillRef>
+          <a:effectRef idx="1">
+            <a:schemeClr val="accent1"/>
+          </a:effectRef>
+          <a:fontRef idx="minor">
+            <a:schemeClr val="tx1"/>
+          </a:fontRef>
+        </p:style>
+      </p:cxnSp>
+      <p:cxnSp>
+        <p:nvCxnSpPr>
+          <p:cNvPr id="116" name="Connecteur droit 115"/>
+          <p:cNvCxnSpPr/>
+          <p:nvPr/>
+        </p:nvCxnSpPr>
+        <p:spPr>
+          <a:xfrm>
+            <a:off x="5124025" y="4818972"/>
+            <a:ext cx="0" cy="1116000"/>
+          </a:xfrm>
+          <a:prstGeom prst="line">
+            <a:avLst/>
+          </a:prstGeom>
+          <a:effectLst/>
+        </p:spPr>
+        <p:style>
+          <a:lnRef idx="2">
+            <a:schemeClr val="accent1"/>
+          </a:lnRef>
+          <a:fillRef idx="0">
+            <a:schemeClr val="accent1"/>
+          </a:fillRef>
+          <a:effectRef idx="1">
+            <a:schemeClr val="accent1"/>
+          </a:effectRef>
+          <a:fontRef idx="minor">
+            <a:schemeClr val="tx1"/>
+          </a:fontRef>
+        </p:style>
+      </p:cxnSp>
+      <p:cxnSp>
+        <p:nvCxnSpPr>
+          <p:cNvPr id="117" name="Connecteur droit 116"/>
+          <p:cNvCxnSpPr/>
+          <p:nvPr/>
+        </p:nvCxnSpPr>
+        <p:spPr>
+          <a:xfrm>
+            <a:off x="5304025" y="4818972"/>
+            <a:ext cx="0" cy="1116000"/>
+          </a:xfrm>
+          <a:prstGeom prst="line">
+            <a:avLst/>
+          </a:prstGeom>
+          <a:effectLst/>
+        </p:spPr>
+        <p:style>
+          <a:lnRef idx="2">
+            <a:schemeClr val="accent1"/>
+          </a:lnRef>
+          <a:fillRef idx="0">
+            <a:schemeClr val="accent1"/>
+          </a:fillRef>
+          <a:effectRef idx="1">
+            <a:schemeClr val="accent1"/>
+          </a:effectRef>
+          <a:fontRef idx="minor">
+            <a:schemeClr val="tx1"/>
+          </a:fontRef>
+        </p:style>
+      </p:cxnSp>
+      <p:cxnSp>
+        <p:nvCxnSpPr>
+          <p:cNvPr id="125" name="Connecteur droit 124"/>
+          <p:cNvCxnSpPr/>
+          <p:nvPr/>
+        </p:nvCxnSpPr>
+        <p:spPr>
+          <a:xfrm>
+            <a:off x="5482885" y="4817295"/>
+            <a:ext cx="0" cy="1116000"/>
+          </a:xfrm>
+          <a:prstGeom prst="line">
+            <a:avLst/>
+          </a:prstGeom>
+          <a:effectLst/>
+        </p:spPr>
+        <p:style>
+          <a:lnRef idx="2">
+            <a:schemeClr val="accent1"/>
+          </a:lnRef>
+          <a:fillRef idx="0">
+            <a:schemeClr val="accent1"/>
+          </a:fillRef>
+          <a:effectRef idx="1">
+            <a:schemeClr val="accent1"/>
+          </a:effectRef>
+          <a:fontRef idx="minor">
+            <a:schemeClr val="tx1"/>
+          </a:fontRef>
+        </p:style>
+      </p:cxnSp>
+      <p:cxnSp>
+        <p:nvCxnSpPr>
+          <p:cNvPr id="126" name="Connecteur droit 125"/>
+          <p:cNvCxnSpPr/>
+          <p:nvPr/>
+        </p:nvCxnSpPr>
+        <p:spPr>
+          <a:xfrm>
+            <a:off x="4048321" y="4817295"/>
+            <a:ext cx="0" cy="1116000"/>
+          </a:xfrm>
+          <a:prstGeom prst="line">
+            <a:avLst/>
+          </a:prstGeom>
+          <a:effectLst/>
+        </p:spPr>
+        <p:style>
+          <a:lnRef idx="2">
+            <a:schemeClr val="accent1"/>
+          </a:lnRef>
+          <a:fillRef idx="0">
+            <a:schemeClr val="accent1"/>
+          </a:fillRef>
+          <a:effectRef idx="1">
+            <a:schemeClr val="accent1"/>
+          </a:effectRef>
+          <a:fontRef idx="minor">
+            <a:schemeClr val="tx1"/>
+          </a:fontRef>
+        </p:style>
+      </p:cxnSp>
+      <p:cxnSp>
+        <p:nvCxnSpPr>
+          <p:cNvPr id="229" name="Connecteur droit 228"/>
+          <p:cNvCxnSpPr/>
+          <p:nvPr/>
+        </p:nvCxnSpPr>
+        <p:spPr>
+          <a:xfrm>
+            <a:off x="4046167" y="4823001"/>
+            <a:ext cx="1436718" cy="0"/>
+          </a:xfrm>
+          <a:prstGeom prst="line">
+            <a:avLst/>
+          </a:prstGeom>
+          <a:ln w="9525">
+            <a:solidFill>
+              <a:schemeClr val="tx1"/>
+            </a:solidFill>
+          </a:ln>
+          <a:effectLst/>
+        </p:spPr>
+        <p:style>
+          <a:lnRef idx="2">
+            <a:schemeClr val="accent1"/>
+          </a:lnRef>
+          <a:fillRef idx="0">
+            <a:schemeClr val="accent1"/>
+          </a:fillRef>
+          <a:effectRef idx="1">
+            <a:schemeClr val="accent1"/>
+          </a:effectRef>
+          <a:fontRef idx="minor">
+            <a:schemeClr val="tx1"/>
+          </a:fontRef>
+        </p:style>
+      </p:cxnSp>
+      <p:cxnSp>
+        <p:nvCxnSpPr>
+          <p:cNvPr id="131" name="Connecteur droit 130"/>
+          <p:cNvCxnSpPr/>
+          <p:nvPr/>
+        </p:nvCxnSpPr>
+        <p:spPr>
+          <a:xfrm>
+            <a:off x="4050391" y="5933253"/>
+            <a:ext cx="1436718" cy="0"/>
+          </a:xfrm>
+          <a:prstGeom prst="line">
+            <a:avLst/>
+          </a:prstGeom>
+          <a:ln w="9525">
+            <a:solidFill>
+              <a:schemeClr val="tx1"/>
+            </a:solidFill>
+          </a:ln>
+          <a:effectLst/>
+        </p:spPr>
+        <p:style>
+          <a:lnRef idx="2">
+            <a:schemeClr val="accent1"/>
+          </a:lnRef>
+          <a:fillRef idx="0">
+            <a:schemeClr val="accent1"/>
+          </a:fillRef>
+          <a:effectRef idx="1">
+            <a:schemeClr val="accent1"/>
+          </a:effectRef>
+          <a:fontRef idx="minor">
+            <a:schemeClr val="tx1"/>
+          </a:fontRef>
+        </p:style>
+      </p:cxnSp>
+      <p:sp>
+        <p:nvSpPr>
+          <p:cNvPr id="142" name="ZoneTexte 141"/>
+          <p:cNvSpPr txBox="1"/>
+          <p:nvPr/>
+        </p:nvSpPr>
+        <p:spPr>
+          <a:xfrm>
+            <a:off x="4106038" y="4494056"/>
+            <a:ext cx="1315973" cy="307777"/>
+          </a:xfrm>
+          <a:prstGeom prst="rect">
+            <a:avLst/>
+          </a:prstGeom>
+          <a:noFill/>
+        </p:spPr>
+        <p:txBody>
+          <a:bodyPr wrap="none" rtlCol="0">
+            <a:spAutoFit/>
+          </a:bodyPr>
+          <a:lstStyle/>
+          <a:p>
+            <a:r>
+              <a:rPr lang="en-GB" sz="1400" b="1" dirty="0" smtClean="0"/>
+              <a:t>Pre-scan</a:t>
+            </a:r>
+            <a:r>
+              <a:rPr lang="en-GB" sz="1400" b="1" dirty="0" smtClean="0"/>
+              <a:t> image</a:t>
+            </a:r>
+            <a:endParaRPr lang="en-GB" sz="1400" b="1" dirty="0"/>
+          </a:p>
+        </p:txBody>
+      </p:sp>
+      <p:sp>
+        <p:nvSpPr>
+          <p:cNvPr id="163" name="ZoneTexte 162"/>
+          <p:cNvSpPr txBox="1"/>
+          <p:nvPr/>
+        </p:nvSpPr>
+        <p:spPr>
+          <a:xfrm>
+            <a:off x="2409168" y="5115798"/>
+            <a:ext cx="1326004" cy="523220"/>
+          </a:xfrm>
+          <a:prstGeom prst="rect">
+            <a:avLst/>
+          </a:prstGeom>
+          <a:noFill/>
+        </p:spPr>
+        <p:txBody>
+          <a:bodyPr wrap="none" rtlCol="0">
+            <a:spAutoFit/>
+          </a:bodyPr>
+          <a:lstStyle/>
+          <a:p>
+            <a:pPr algn="ctr"/>
+            <a:r>
+              <a:rPr lang="en-GB" sz="1400" dirty="0"/>
+              <a:t>b</a:t>
+            </a:r>
+            <a:r>
+              <a:rPr lang="en-GB" sz="1400" dirty="0" smtClean="0"/>
+              <a:t>-mode</a:t>
+            </a:r>
+            <a:r>
+              <a:rPr lang="en-GB" sz="1400" dirty="0" smtClean="0"/>
+              <a:t> sample</a:t>
+            </a:r>
+          </a:p>
+          <a:p>
+            <a:pPr algn="ctr"/>
+            <a:r>
+              <a:rPr lang="en-GB" sz="1400" dirty="0" smtClean="0"/>
+              <a:t>number</a:t>
+            </a:r>
+            <a:endParaRPr lang="en-GB" sz="1400" dirty="0"/>
+          </a:p>
+        </p:txBody>
+      </p:sp>
+      <p:cxnSp>
+        <p:nvCxnSpPr>
+          <p:cNvPr id="164" name="Connecteur droit avec flèche 163"/>
+          <p:cNvCxnSpPr/>
+          <p:nvPr/>
+        </p:nvCxnSpPr>
+        <p:spPr>
+          <a:xfrm flipV="1">
+            <a:off x="3781258" y="4829847"/>
+            <a:ext cx="0" cy="1123986"/>
+          </a:xfrm>
+          <a:prstGeom prst="straightConnector1">
+            <a:avLst/>
+          </a:prstGeom>
+          <a:ln w="9525">
+            <a:solidFill>
+              <a:schemeClr val="tx1"/>
+            </a:solidFill>
+            <a:headEnd type="triangle"/>
+            <a:tailEnd type="triangle"/>
+          </a:ln>
+          <a:effectLst/>
+        </p:spPr>
+        <p:style>
+          <a:lnRef idx="2">
+            <a:schemeClr val="accent1"/>
+          </a:lnRef>
+          <a:fillRef idx="0">
+            <a:schemeClr val="accent1"/>
+          </a:fillRef>
+          <a:effectRef idx="1">
+            <a:schemeClr val="accent1"/>
+          </a:effectRef>
+          <a:fontRef idx="minor">
+            <a:schemeClr val="tx1"/>
+          </a:fontRef>
+        </p:style>
+      </p:cxnSp>
+      <p:sp>
+        <p:nvSpPr>
+          <p:cNvPr id="165" name="ZoneTexte 164"/>
+          <p:cNvSpPr txBox="1"/>
+          <p:nvPr/>
+        </p:nvSpPr>
+        <p:spPr>
+          <a:xfrm>
+            <a:off x="4360231" y="6209725"/>
+            <a:ext cx="830050" cy="523220"/>
+          </a:xfrm>
+          <a:prstGeom prst="rect">
+            <a:avLst/>
+          </a:prstGeom>
+          <a:noFill/>
+        </p:spPr>
+        <p:txBody>
+          <a:bodyPr wrap="none" rtlCol="0">
+            <a:spAutoFit/>
+          </a:bodyPr>
+          <a:lstStyle/>
+          <a:p>
+            <a:pPr algn="ctr"/>
+            <a:r>
+              <a:rPr lang="en-GB" sz="1400" dirty="0" smtClean="0"/>
+              <a:t>Scan line</a:t>
+            </a:r>
+          </a:p>
+          <a:p>
+            <a:pPr algn="ctr"/>
+            <a:r>
+              <a:rPr lang="en-GB" sz="1400" dirty="0" smtClean="0"/>
+              <a:t>number</a:t>
+            </a:r>
+            <a:endParaRPr lang="en-GB" sz="1400" dirty="0"/>
+          </a:p>
+        </p:txBody>
+      </p:sp>
+      <p:cxnSp>
+        <p:nvCxnSpPr>
+          <p:cNvPr id="167" name="Connecteur droit avec flèche 166"/>
+          <p:cNvCxnSpPr/>
+          <p:nvPr/>
+        </p:nvCxnSpPr>
+        <p:spPr>
+          <a:xfrm>
+            <a:off x="4046167" y="6193821"/>
+            <a:ext cx="1440942" cy="0"/>
+          </a:xfrm>
+          <a:prstGeom prst="straightConnector1">
+            <a:avLst/>
+          </a:prstGeom>
+          <a:ln w="9525">
+            <a:solidFill>
+              <a:schemeClr val="tx1"/>
+            </a:solidFill>
+            <a:headEnd type="triangle"/>
+            <a:tailEnd type="triangle"/>
+          </a:ln>
+          <a:effectLst/>
+        </p:spPr>
+        <p:style>
+          <a:lnRef idx="2">
+            <a:schemeClr val="accent1"/>
+          </a:lnRef>
+          <a:fillRef idx="0">
+            <a:schemeClr val="accent1"/>
+          </a:fillRef>
+          <a:effectRef idx="1">
+            <a:schemeClr val="accent1"/>
+          </a:effectRef>
+          <a:fontRef idx="minor">
+            <a:schemeClr val="tx1"/>
+          </a:fontRef>
+        </p:style>
+      </p:cxnSp>
+    </p:spTree>
+    <p:extLst>
+      <p:ext uri="{BB962C8B-B14F-4D97-AF65-F5344CB8AC3E}">
+        <p14:creationId xmlns:p14="http://schemas.microsoft.com/office/powerpoint/2010/main" val="1364759729"/>
+      </p:ext>
+    </p:extLst>
+  </p:cSld>
+  <p:clrMapOvr>
+    <a:masterClrMapping/>
+  </p:clrMapOvr>
+  <p:timing>
+    <p:tnLst>
+      <p:par>
+        <p:cTn xmlns:p14="http://schemas.microsoft.com/office/powerpoint/2010/main" id="1" dur="indefinite" restart="never" nodeType="tmRoot"/>
+      </p:par>
+    </p:tnLst>
+  </p:timing>
+</p:sld>
+</file>
+
+<file path=ppt/slides/slide4.xml><?xml version="1.0" encoding="utf-8"?>
 <p:sld xmlns:a="http://schemas.openxmlformats.org/drawingml/2006/main" xmlns:r="http://schemas.openxmlformats.org/officeDocument/2006/relationships" xmlns:p="http://schemas.openxmlformats.org/presentationml/2006/main">
   <p:cSld>
     <p:spTree>
@@ -11286,7 +12158,7 @@
 </p:sld>
 </file>
 
-<file path=ppt/slides/slide4.xml><?xml version="1.0" encoding="utf-8"?>
+<file path=ppt/slides/slide5.xml><?xml version="1.0" encoding="utf-8"?>
 <p:sld xmlns:a="http://schemas.openxmlformats.org/drawingml/2006/main" xmlns:r="http://schemas.openxmlformats.org/officeDocument/2006/relationships" xmlns:p="http://schemas.openxmlformats.org/presentationml/2006/main">
   <p:cSld>
     <p:spTree>
@@ -11303,36 +12175,6 @@
           <a:chExt cx="0" cy="0"/>
         </a:xfrm>
       </p:grpSpPr>
-      <p:pic>
-        <p:nvPicPr>
-          <p:cNvPr id="2" name="Image 1" descr="sonde 3D lineaire.png"/>
-          <p:cNvPicPr>
-            <a:picLocks noChangeAspect="1"/>
-          </p:cNvPicPr>
-          <p:nvPr/>
-        </p:nvPicPr>
-        <p:blipFill>
-          <a:blip r:embed="rId2">
-            <a:extLst>
-              <a:ext uri="{28A0092B-C50C-407E-A947-70E740481C1C}">
-                <a14:useLocalDpi xmlns:a14="http://schemas.microsoft.com/office/drawing/2010/main" val="0"/>
-              </a:ext>
-            </a:extLst>
-          </a:blip>
-          <a:stretch>
-            <a:fillRect/>
-          </a:stretch>
-        </p:blipFill>
-        <p:spPr>
-          <a:xfrm>
-            <a:off x="7627596" y="1609617"/>
-            <a:ext cx="2328333" cy="3184046"/>
-          </a:xfrm>
-          <a:prstGeom prst="rect">
-            <a:avLst/>
-          </a:prstGeom>
-        </p:spPr>
-      </p:pic>
       <p:grpSp>
         <p:nvGrpSpPr>
           <p:cNvPr id="78" name="Grouper 77"/>
@@ -12551,6 +13393,728 @@
           </p:style>
         </p:cxnSp>
       </p:grpSp>
+      <p:cxnSp>
+        <p:nvCxnSpPr>
+          <p:cNvPr id="131" name="Connecteur droit avec flèche 130"/>
+          <p:cNvCxnSpPr/>
+          <p:nvPr/>
+        </p:nvCxnSpPr>
+        <p:spPr>
+          <a:xfrm flipV="1">
+            <a:off x="6856660" y="4822852"/>
+            <a:ext cx="239228" cy="4416"/>
+          </a:xfrm>
+          <a:prstGeom prst="straightConnector1">
+            <a:avLst/>
+          </a:prstGeom>
+          <a:ln w="9525">
+            <a:solidFill>
+              <a:schemeClr val="tx1"/>
+            </a:solidFill>
+            <a:headEnd type="triangle"/>
+            <a:tailEnd type="none"/>
+          </a:ln>
+          <a:effectLst/>
+        </p:spPr>
+        <p:style>
+          <a:lnRef idx="2">
+            <a:schemeClr val="accent1"/>
+          </a:lnRef>
+          <a:fillRef idx="0">
+            <a:schemeClr val="accent1"/>
+          </a:fillRef>
+          <a:effectRef idx="1">
+            <a:schemeClr val="accent1"/>
+          </a:effectRef>
+          <a:fontRef idx="minor">
+            <a:schemeClr val="tx1"/>
+          </a:fontRef>
+        </p:style>
+      </p:cxnSp>
+      <p:cxnSp>
+        <p:nvCxnSpPr>
+          <p:cNvPr id="133" name="Connecteur droit avec flèche 132"/>
+          <p:cNvCxnSpPr/>
+          <p:nvPr/>
+        </p:nvCxnSpPr>
+        <p:spPr>
+          <a:xfrm flipH="1">
+            <a:off x="6683493" y="4826160"/>
+            <a:ext cx="103595" cy="0"/>
+          </a:xfrm>
+          <a:prstGeom prst="straightConnector1">
+            <a:avLst/>
+          </a:prstGeom>
+          <a:ln w="9525">
+            <a:solidFill>
+              <a:schemeClr val="tx1"/>
+            </a:solidFill>
+            <a:headEnd type="triangle"/>
+            <a:tailEnd type="none"/>
+          </a:ln>
+          <a:effectLst/>
+        </p:spPr>
+        <p:style>
+          <a:lnRef idx="2">
+            <a:schemeClr val="accent1"/>
+          </a:lnRef>
+          <a:fillRef idx="0">
+            <a:schemeClr val="accent1"/>
+          </a:fillRef>
+          <a:effectRef idx="1">
+            <a:schemeClr val="accent1"/>
+          </a:effectRef>
+          <a:fontRef idx="minor">
+            <a:schemeClr val="tx1"/>
+          </a:fontRef>
+        </p:style>
+      </p:cxnSp>
+      <p:cxnSp>
+        <p:nvCxnSpPr>
+          <p:cNvPr id="134" name="Connecteur droit 133"/>
+          <p:cNvCxnSpPr/>
+          <p:nvPr/>
+        </p:nvCxnSpPr>
+        <p:spPr>
+          <a:xfrm>
+            <a:off x="6723255" y="4826177"/>
+            <a:ext cx="176315" cy="0"/>
+          </a:xfrm>
+          <a:prstGeom prst="line">
+            <a:avLst/>
+          </a:prstGeom>
+          <a:ln w="9525">
+            <a:solidFill>
+              <a:schemeClr val="tx1"/>
+            </a:solidFill>
+          </a:ln>
+          <a:effectLst/>
+        </p:spPr>
+        <p:style>
+          <a:lnRef idx="2">
+            <a:schemeClr val="accent1"/>
+          </a:lnRef>
+          <a:fillRef idx="0">
+            <a:schemeClr val="accent1"/>
+          </a:fillRef>
+          <a:effectRef idx="1">
+            <a:schemeClr val="accent1"/>
+          </a:effectRef>
+          <a:fontRef idx="minor">
+            <a:schemeClr val="tx1"/>
+          </a:fontRef>
+        </p:style>
+      </p:cxnSp>
+      <p:pic>
+        <p:nvPicPr>
+          <p:cNvPr id="135" name="Image 134" descr="latex-image-1.pdf"/>
+          <p:cNvPicPr>
+            <a:picLocks noChangeAspect="1"/>
+          </p:cNvPicPr>
+          <p:nvPr/>
+        </p:nvPicPr>
+        <p:blipFill>
+          <a:blip r:embed="rId2">
+            <a:extLst>
+              <a:ext uri="{28A0092B-C50C-407E-A947-70E740481C1C}">
+                <a14:useLocalDpi xmlns:a14="http://schemas.microsoft.com/office/drawing/2010/main" val="0"/>
+              </a:ext>
+            </a:extLst>
+          </a:blip>
+          <a:stretch>
+            <a:fillRect/>
+          </a:stretch>
+        </p:blipFill>
+        <p:spPr>
+          <a:xfrm>
+            <a:off x="7014607" y="4640820"/>
+            <a:ext cx="114300" cy="139700"/>
+          </a:xfrm>
+          <a:prstGeom prst="rect">
+            <a:avLst/>
+          </a:prstGeom>
+        </p:spPr>
+      </p:pic>
+      <p:cxnSp>
+        <p:nvCxnSpPr>
+          <p:cNvPr id="136" name="Connecteur droit 135"/>
+          <p:cNvCxnSpPr/>
+          <p:nvPr/>
+        </p:nvCxnSpPr>
+        <p:spPr>
+          <a:xfrm flipV="1">
+            <a:off x="6851838" y="4642161"/>
+            <a:ext cx="0" cy="289563"/>
+          </a:xfrm>
+          <a:prstGeom prst="line">
+            <a:avLst/>
+          </a:prstGeom>
+          <a:ln w="6350">
+            <a:solidFill>
+              <a:schemeClr val="tx1"/>
+            </a:solidFill>
+            <a:prstDash val="dash"/>
+          </a:ln>
+          <a:effectLst/>
+        </p:spPr>
+        <p:style>
+          <a:lnRef idx="2">
+            <a:schemeClr val="accent1"/>
+          </a:lnRef>
+          <a:fillRef idx="0">
+            <a:schemeClr val="accent1"/>
+          </a:fillRef>
+          <a:effectRef idx="1">
+            <a:schemeClr val="accent1"/>
+          </a:effectRef>
+          <a:fontRef idx="minor">
+            <a:schemeClr val="tx1"/>
+          </a:fontRef>
+        </p:style>
+      </p:cxnSp>
+      <p:cxnSp>
+        <p:nvCxnSpPr>
+          <p:cNvPr id="138" name="Connecteur droit 137"/>
+          <p:cNvCxnSpPr/>
+          <p:nvPr/>
+        </p:nvCxnSpPr>
+        <p:spPr>
+          <a:xfrm flipV="1">
+            <a:off x="6787752" y="4640820"/>
+            <a:ext cx="0" cy="289563"/>
+          </a:xfrm>
+          <a:prstGeom prst="line">
+            <a:avLst/>
+          </a:prstGeom>
+          <a:ln w="6350">
+            <a:solidFill>
+              <a:schemeClr val="tx1"/>
+            </a:solidFill>
+            <a:prstDash val="dash"/>
+          </a:ln>
+          <a:effectLst/>
+        </p:spPr>
+        <p:style>
+          <a:lnRef idx="2">
+            <a:schemeClr val="accent1"/>
+          </a:lnRef>
+          <a:fillRef idx="0">
+            <a:schemeClr val="accent1"/>
+          </a:fillRef>
+          <a:effectRef idx="1">
+            <a:schemeClr val="accent1"/>
+          </a:effectRef>
+          <a:fontRef idx="minor">
+            <a:schemeClr val="tx1"/>
+          </a:fontRef>
+        </p:style>
+      </p:cxnSp>
+      <p:grpSp>
+        <p:nvGrpSpPr>
+          <p:cNvPr id="143" name="Grouper 142"/>
+          <p:cNvGrpSpPr/>
+          <p:nvPr/>
+        </p:nvGrpSpPr>
+        <p:grpSpPr>
+          <a:xfrm>
+            <a:off x="5429191" y="2989588"/>
+            <a:ext cx="902811" cy="523220"/>
+            <a:chOff x="1320291" y="1547671"/>
+            <a:chExt cx="902811" cy="523220"/>
+          </a:xfrm>
+        </p:grpSpPr>
+        <p:sp>
+          <p:nvSpPr>
+            <p:cNvPr id="140" name="ZoneTexte 139"/>
+            <p:cNvSpPr txBox="1"/>
+            <p:nvPr/>
+          </p:nvSpPr>
+          <p:spPr>
+            <a:xfrm>
+              <a:off x="1320291" y="1547671"/>
+              <a:ext cx="902811" cy="523220"/>
+            </a:xfrm>
+            <a:prstGeom prst="rect">
+              <a:avLst/>
+            </a:prstGeom>
+            <a:noFill/>
+          </p:spPr>
+          <p:txBody>
+            <a:bodyPr wrap="none" rtlCol="0">
+              <a:spAutoFit/>
+            </a:bodyPr>
+            <a:lstStyle/>
+            <a:p>
+              <a:r>
+                <a:rPr lang="en-GB" sz="1400" dirty="0" smtClean="0"/>
+                <a:t>    : Frame</a:t>
+              </a:r>
+            </a:p>
+            <a:p>
+              <a:r>
+                <a:rPr lang="en-GB" sz="1400" dirty="0" smtClean="0"/>
+                <a:t>pitch (m)</a:t>
+              </a:r>
+              <a:endParaRPr lang="en-GB" sz="1400" dirty="0"/>
+            </a:p>
+          </p:txBody>
+        </p:sp>
+        <p:pic>
+          <p:nvPicPr>
+            <p:cNvPr id="142" name="Image 141" descr="latex-image-1.pdf"/>
+            <p:cNvPicPr>
+              <a:picLocks noChangeAspect="1"/>
+            </p:cNvPicPr>
+            <p:nvPr/>
+          </p:nvPicPr>
+          <p:blipFill>
+            <a:blip r:embed="rId2">
+              <a:extLst>
+                <a:ext uri="{28A0092B-C50C-407E-A947-70E740481C1C}">
+                  <a14:useLocalDpi xmlns:a14="http://schemas.microsoft.com/office/drawing/2010/main" val="0"/>
+                </a:ext>
+              </a:extLst>
+            </a:blip>
+            <a:stretch>
+              <a:fillRect/>
+            </a:stretch>
+          </p:blipFill>
+          <p:spPr>
+            <a:xfrm>
+              <a:off x="1410136" y="1685300"/>
+              <a:ext cx="114300" cy="139700"/>
+            </a:xfrm>
+            <a:prstGeom prst="rect">
+              <a:avLst/>
+            </a:prstGeom>
+          </p:spPr>
+        </p:pic>
+      </p:grpSp>
+      <p:sp>
+        <p:nvSpPr>
+          <p:cNvPr id="144" name="ZoneTexte 143"/>
+          <p:cNvSpPr txBox="1"/>
+          <p:nvPr/>
+        </p:nvSpPr>
+        <p:spPr>
+          <a:xfrm>
+            <a:off x="5865286" y="1232715"/>
+            <a:ext cx="1973104" cy="523220"/>
+          </a:xfrm>
+          <a:prstGeom prst="rect">
+            <a:avLst/>
+          </a:prstGeom>
+          <a:noFill/>
+        </p:spPr>
+        <p:txBody>
+          <a:bodyPr wrap="none" rtlCol="0">
+            <a:spAutoFit/>
+          </a:bodyPr>
+          <a:lstStyle/>
+          <a:p>
+            <a:pPr algn="ctr"/>
+            <a:r>
+              <a:rPr lang="en-GB" sz="1400" b="1" dirty="0" smtClean="0"/>
+              <a:t>Linear probe motor</a:t>
+            </a:r>
+          </a:p>
+          <a:p>
+            <a:pPr algn="ctr"/>
+            <a:r>
+              <a:rPr lang="en-GB" sz="1400" b="1" dirty="0" smtClean="0"/>
+              <a:t>Linear probe </a:t>
+            </a:r>
+            <a:r>
+              <a:rPr lang="en-GB" sz="1400" b="1" dirty="0"/>
+              <a:t>transducer</a:t>
+            </a:r>
+            <a:r>
+              <a:rPr lang="en-GB" sz="1400" b="1" dirty="0" smtClean="0"/>
+              <a:t> </a:t>
+            </a:r>
+            <a:endParaRPr lang="en-GB" sz="1400" b="1" dirty="0"/>
+          </a:p>
+        </p:txBody>
+      </p:sp>
+      <p:cxnSp>
+        <p:nvCxnSpPr>
+          <p:cNvPr id="145" name="Connecteur droit 144"/>
+          <p:cNvCxnSpPr/>
+          <p:nvPr/>
+        </p:nvCxnSpPr>
+        <p:spPr>
+          <a:xfrm flipV="1">
+            <a:off x="3039589" y="3571945"/>
+            <a:ext cx="0" cy="1060230"/>
+          </a:xfrm>
+          <a:prstGeom prst="line">
+            <a:avLst/>
+          </a:prstGeom>
+          <a:ln w="6350">
+            <a:solidFill>
+              <a:schemeClr val="tx1"/>
+            </a:solidFill>
+          </a:ln>
+          <a:effectLst/>
+        </p:spPr>
+        <p:style>
+          <a:lnRef idx="2">
+            <a:schemeClr val="accent1"/>
+          </a:lnRef>
+          <a:fillRef idx="0">
+            <a:schemeClr val="accent1"/>
+          </a:fillRef>
+          <a:effectRef idx="1">
+            <a:schemeClr val="accent1"/>
+          </a:effectRef>
+          <a:fontRef idx="minor">
+            <a:schemeClr val="tx1"/>
+          </a:fontRef>
+        </p:style>
+      </p:cxnSp>
+      <p:cxnSp>
+        <p:nvCxnSpPr>
+          <p:cNvPr id="146" name="Connecteur droit 145"/>
+          <p:cNvCxnSpPr/>
+          <p:nvPr/>
+        </p:nvCxnSpPr>
+        <p:spPr>
+          <a:xfrm flipV="1">
+            <a:off x="3040892" y="2886967"/>
+            <a:ext cx="0" cy="2250017"/>
+          </a:xfrm>
+          <a:prstGeom prst="line">
+            <a:avLst/>
+          </a:prstGeom>
+          <a:ln w="6350">
+            <a:solidFill>
+              <a:schemeClr val="tx1"/>
+            </a:solidFill>
+            <a:prstDash val="dash"/>
+          </a:ln>
+          <a:effectLst/>
+        </p:spPr>
+        <p:style>
+          <a:lnRef idx="2">
+            <a:schemeClr val="accent1"/>
+          </a:lnRef>
+          <a:fillRef idx="0">
+            <a:schemeClr val="accent1"/>
+          </a:fillRef>
+          <a:effectRef idx="1">
+            <a:schemeClr val="accent1"/>
+          </a:effectRef>
+          <a:fontRef idx="minor">
+            <a:schemeClr val="tx1"/>
+          </a:fontRef>
+        </p:style>
+      </p:cxnSp>
+      <p:cxnSp>
+        <p:nvCxnSpPr>
+          <p:cNvPr id="151" name="Connecteur droit 150"/>
+          <p:cNvCxnSpPr/>
+          <p:nvPr/>
+        </p:nvCxnSpPr>
+        <p:spPr>
+          <a:xfrm flipV="1">
+            <a:off x="1620063" y="4680000"/>
+            <a:ext cx="3421852" cy="1"/>
+          </a:xfrm>
+          <a:prstGeom prst="line">
+            <a:avLst/>
+          </a:prstGeom>
+          <a:ln w="6350">
+            <a:solidFill>
+              <a:schemeClr val="tx1"/>
+            </a:solidFill>
+            <a:prstDash val="dash"/>
+          </a:ln>
+          <a:effectLst/>
+        </p:spPr>
+        <p:style>
+          <a:lnRef idx="2">
+            <a:schemeClr val="accent1"/>
+          </a:lnRef>
+          <a:fillRef idx="0">
+            <a:schemeClr val="accent1"/>
+          </a:fillRef>
+          <a:effectRef idx="1">
+            <a:schemeClr val="accent1"/>
+          </a:effectRef>
+          <a:fontRef idx="minor">
+            <a:schemeClr val="tx1"/>
+          </a:fontRef>
+        </p:style>
+      </p:cxnSp>
+      <p:cxnSp>
+        <p:nvCxnSpPr>
+          <p:cNvPr id="154" name="Connecteur droit 153"/>
+          <p:cNvCxnSpPr/>
+          <p:nvPr/>
+        </p:nvCxnSpPr>
+        <p:spPr>
+          <a:xfrm flipV="1">
+            <a:off x="1513417" y="3240000"/>
+            <a:ext cx="3421852" cy="1"/>
+          </a:xfrm>
+          <a:prstGeom prst="line">
+            <a:avLst/>
+          </a:prstGeom>
+          <a:ln w="6350">
+            <a:solidFill>
+              <a:schemeClr val="tx1"/>
+            </a:solidFill>
+            <a:prstDash val="dash"/>
+          </a:ln>
+          <a:effectLst/>
+        </p:spPr>
+        <p:style>
+          <a:lnRef idx="2">
+            <a:schemeClr val="accent1"/>
+          </a:lnRef>
+          <a:fillRef idx="0">
+            <a:schemeClr val="accent1"/>
+          </a:fillRef>
+          <a:effectRef idx="1">
+            <a:schemeClr val="accent1"/>
+          </a:effectRef>
+          <a:fontRef idx="minor">
+            <a:schemeClr val="tx1"/>
+          </a:fontRef>
+        </p:style>
+      </p:cxnSp>
+      <p:sp>
+        <p:nvSpPr>
+          <p:cNvPr id="155" name="Ellipse 154"/>
+          <p:cNvSpPr>
+            <a:spLocks noChangeAspect="1"/>
+          </p:cNvSpPr>
+          <p:nvPr/>
+        </p:nvSpPr>
+        <p:spPr>
+          <a:xfrm>
+            <a:off x="1595551" y="1800000"/>
+            <a:ext cx="2880000" cy="2880000"/>
+          </a:xfrm>
+          <a:prstGeom prst="ellipse">
+            <a:avLst/>
+          </a:prstGeom>
+          <a:noFill/>
+          <a:ln w="6350">
+            <a:solidFill>
+              <a:schemeClr val="tx1"/>
+            </a:solidFill>
+          </a:ln>
+          <a:effectLst/>
+        </p:spPr>
+        <p:style>
+          <a:lnRef idx="1">
+            <a:schemeClr val="accent1"/>
+          </a:lnRef>
+          <a:fillRef idx="3">
+            <a:schemeClr val="accent1"/>
+          </a:fillRef>
+          <a:effectRef idx="2">
+            <a:schemeClr val="accent1"/>
+          </a:effectRef>
+          <a:fontRef idx="minor">
+            <a:schemeClr val="lt1"/>
+          </a:fontRef>
+        </p:style>
+        <p:txBody>
+          <a:bodyPr rtlCol="0" anchor="ctr"/>
+          <a:lstStyle/>
+          <a:p>
+            <a:pPr algn="ctr"/>
+            <a:endParaRPr lang="fr-FR"/>
+          </a:p>
+        </p:txBody>
+      </p:sp>
+      <p:cxnSp>
+        <p:nvCxnSpPr>
+          <p:cNvPr id="156" name="Connecteur droit 155"/>
+          <p:cNvCxnSpPr/>
+          <p:nvPr/>
+        </p:nvCxnSpPr>
+        <p:spPr>
+          <a:xfrm flipH="1" flipV="1">
+            <a:off x="3040892" y="3240002"/>
+            <a:ext cx="288000" cy="1999604"/>
+          </a:xfrm>
+          <a:prstGeom prst="line">
+            <a:avLst/>
+          </a:prstGeom>
+          <a:ln w="6350">
+            <a:solidFill>
+              <a:schemeClr val="tx1"/>
+            </a:solidFill>
+            <a:prstDash val="dash"/>
+          </a:ln>
+          <a:effectLst/>
+        </p:spPr>
+        <p:style>
+          <a:lnRef idx="2">
+            <a:schemeClr val="accent1"/>
+          </a:lnRef>
+          <a:fillRef idx="0">
+            <a:schemeClr val="accent1"/>
+          </a:fillRef>
+          <a:effectRef idx="1">
+            <a:schemeClr val="accent1"/>
+          </a:effectRef>
+          <a:fontRef idx="minor">
+            <a:schemeClr val="tx1"/>
+          </a:fontRef>
+        </p:style>
+      </p:cxnSp>
+      <p:cxnSp>
+        <p:nvCxnSpPr>
+          <p:cNvPr id="159" name="Connecteur droit 158"/>
+          <p:cNvCxnSpPr/>
+          <p:nvPr/>
+        </p:nvCxnSpPr>
+        <p:spPr>
+          <a:xfrm flipV="1">
+            <a:off x="2751555" y="3240000"/>
+            <a:ext cx="288000" cy="2080222"/>
+          </a:xfrm>
+          <a:prstGeom prst="line">
+            <a:avLst/>
+          </a:prstGeom>
+          <a:ln w="6350">
+            <a:solidFill>
+              <a:schemeClr val="tx1"/>
+            </a:solidFill>
+            <a:prstDash val="dash"/>
+          </a:ln>
+          <a:effectLst/>
+        </p:spPr>
+        <p:style>
+          <a:lnRef idx="2">
+            <a:schemeClr val="accent1"/>
+          </a:lnRef>
+          <a:fillRef idx="0">
+            <a:schemeClr val="accent1"/>
+          </a:fillRef>
+          <a:effectRef idx="1">
+            <a:schemeClr val="accent1"/>
+          </a:effectRef>
+          <a:fontRef idx="minor">
+            <a:schemeClr val="tx1"/>
+          </a:fontRef>
+        </p:style>
+      </p:cxnSp>
+      <p:cxnSp>
+        <p:nvCxnSpPr>
+          <p:cNvPr id="163" name="Connecteur droit 162"/>
+          <p:cNvCxnSpPr/>
+          <p:nvPr/>
+        </p:nvCxnSpPr>
+        <p:spPr>
+          <a:xfrm flipH="1" flipV="1">
+            <a:off x="3040892" y="3240000"/>
+            <a:ext cx="612000" cy="2080222"/>
+          </a:xfrm>
+          <a:prstGeom prst="line">
+            <a:avLst/>
+          </a:prstGeom>
+          <a:ln w="6350">
+            <a:solidFill>
+              <a:schemeClr val="tx1"/>
+            </a:solidFill>
+            <a:prstDash val="dash"/>
+          </a:ln>
+          <a:effectLst/>
+        </p:spPr>
+        <p:style>
+          <a:lnRef idx="2">
+            <a:schemeClr val="accent1"/>
+          </a:lnRef>
+          <a:fillRef idx="0">
+            <a:schemeClr val="accent1"/>
+          </a:fillRef>
+          <a:effectRef idx="1">
+            <a:schemeClr val="accent1"/>
+          </a:effectRef>
+          <a:fontRef idx="minor">
+            <a:schemeClr val="tx1"/>
+          </a:fontRef>
+        </p:style>
+      </p:cxnSp>
+      <p:cxnSp>
+        <p:nvCxnSpPr>
+          <p:cNvPr id="166" name="Connecteur droit 165"/>
+          <p:cNvCxnSpPr/>
+          <p:nvPr/>
+        </p:nvCxnSpPr>
+        <p:spPr>
+          <a:xfrm flipV="1">
+            <a:off x="2425066" y="3240000"/>
+            <a:ext cx="612000" cy="2034905"/>
+          </a:xfrm>
+          <a:prstGeom prst="line">
+            <a:avLst/>
+          </a:prstGeom>
+          <a:ln w="6350">
+            <a:solidFill>
+              <a:schemeClr val="tx1"/>
+            </a:solidFill>
+            <a:prstDash val="dash"/>
+          </a:ln>
+          <a:effectLst/>
+        </p:spPr>
+        <p:style>
+          <a:lnRef idx="2">
+            <a:schemeClr val="accent1"/>
+          </a:lnRef>
+          <a:fillRef idx="0">
+            <a:schemeClr val="accent1"/>
+          </a:fillRef>
+          <a:effectRef idx="1">
+            <a:schemeClr val="accent1"/>
+          </a:effectRef>
+          <a:fontRef idx="minor">
+            <a:schemeClr val="tx1"/>
+          </a:fontRef>
+        </p:style>
+      </p:cxnSp>
+    </p:spTree>
+    <p:extLst>
+      <p:ext uri="{BB962C8B-B14F-4D97-AF65-F5344CB8AC3E}">
+        <p14:creationId xmlns:p14="http://schemas.microsoft.com/office/powerpoint/2010/main" val="2470635882"/>
+      </p:ext>
+    </p:extLst>
+  </p:cSld>
+  <p:clrMapOvr>
+    <a:masterClrMapping/>
+  </p:clrMapOvr>
+  <p:timing>
+    <p:tnLst>
+      <p:par>
+        <p:cTn xmlns:p14="http://schemas.microsoft.com/office/powerpoint/2010/main" id="1" dur="indefinite" restart="never" nodeType="tmRoot"/>
+      </p:par>
+    </p:tnLst>
+  </p:timing>
+</p:sld>
+</file>
+
+<file path=ppt/slides/slide6.xml><?xml version="1.0" encoding="utf-8"?>
+<p:sld xmlns:a="http://schemas.openxmlformats.org/drawingml/2006/main" xmlns:r="http://schemas.openxmlformats.org/officeDocument/2006/relationships" xmlns:p="http://schemas.openxmlformats.org/presentationml/2006/main">
+  <p:cSld>
+    <p:spTree>
+      <p:nvGrpSpPr>
+        <p:cNvPr id="1" name=""/>
+        <p:cNvGrpSpPr/>
+        <p:nvPr/>
+      </p:nvGrpSpPr>
+      <p:grpSpPr>
+        <a:xfrm>
+          <a:off x="0" y="0"/>
+          <a:ext cx="0" cy="0"/>
+          <a:chOff x="0" y="0"/>
+          <a:chExt cx="0" cy="0"/>
+        </a:xfrm>
+      </p:grpSpPr>
       <p:grpSp>
         <p:nvGrpSpPr>
           <p:cNvPr id="101" name="Grouper 100"/>
@@ -13142,16 +14706,2023 @@
           </p:style>
         </p:cxnSp>
       </p:grpSp>
+      <p:sp>
+        <p:nvSpPr>
+          <p:cNvPr id="144" name="ZoneTexte 143"/>
+          <p:cNvSpPr txBox="1"/>
+          <p:nvPr/>
+        </p:nvSpPr>
+        <p:spPr>
+          <a:xfrm>
+            <a:off x="6438118" y="2017851"/>
+            <a:ext cx="1973104" cy="738664"/>
+          </a:xfrm>
+          <a:prstGeom prst="rect">
+            <a:avLst/>
+          </a:prstGeom>
+          <a:noFill/>
+        </p:spPr>
+        <p:txBody>
+          <a:bodyPr wrap="none" rtlCol="0">
+            <a:spAutoFit/>
+          </a:bodyPr>
+          <a:lstStyle/>
+          <a:p>
+            <a:pPr algn="ctr"/>
+            <a:r>
+              <a:rPr lang="en-GB" sz="1400" b="1" dirty="0"/>
+              <a:t>RF image 3D </a:t>
+            </a:r>
+          </a:p>
+          <a:p>
+            <a:pPr algn="ctr"/>
+            <a:r>
+              <a:rPr lang="en-GB" sz="1400" b="1" dirty="0" smtClean="0"/>
+              <a:t>Linear probe motor</a:t>
+            </a:r>
+          </a:p>
+          <a:p>
+            <a:pPr algn="ctr"/>
+            <a:r>
+              <a:rPr lang="en-GB" sz="1400" b="1" dirty="0" smtClean="0"/>
+              <a:t>Linear probe transducer</a:t>
+            </a:r>
+          </a:p>
+        </p:txBody>
+      </p:sp>
+      <p:sp>
+        <p:nvSpPr>
+          <p:cNvPr id="65" name="ZoneTexte 64"/>
+          <p:cNvSpPr txBox="1"/>
+          <p:nvPr/>
+        </p:nvSpPr>
+        <p:spPr>
+          <a:xfrm>
+            <a:off x="6299699" y="3838943"/>
+            <a:ext cx="929724" cy="523220"/>
+          </a:xfrm>
+          <a:prstGeom prst="rect">
+            <a:avLst/>
+          </a:prstGeom>
+          <a:noFill/>
+        </p:spPr>
+        <p:txBody>
+          <a:bodyPr wrap="none" rtlCol="0">
+            <a:spAutoFit/>
+          </a:bodyPr>
+          <a:lstStyle/>
+          <a:p>
+            <a:pPr algn="ctr"/>
+            <a:r>
+              <a:rPr lang="en-GB" sz="1400" dirty="0" smtClean="0"/>
+              <a:t>RF sample</a:t>
+            </a:r>
+          </a:p>
+          <a:p>
+            <a:pPr algn="ctr"/>
+            <a:r>
+              <a:rPr lang="en-GB" sz="1400" dirty="0" smtClean="0"/>
+              <a:t>number</a:t>
+            </a:r>
+            <a:endParaRPr lang="en-GB" sz="1400" dirty="0"/>
+          </a:p>
+        </p:txBody>
+      </p:sp>
+      <p:cxnSp>
+        <p:nvCxnSpPr>
+          <p:cNvPr id="69" name="Connecteur droit avec flèche 68"/>
+          <p:cNvCxnSpPr/>
+          <p:nvPr/>
+        </p:nvCxnSpPr>
+        <p:spPr>
+          <a:xfrm flipV="1">
+            <a:off x="7236700" y="3552992"/>
+            <a:ext cx="0" cy="1062359"/>
+          </a:xfrm>
+          <a:prstGeom prst="straightConnector1">
+            <a:avLst/>
+          </a:prstGeom>
+          <a:ln w="9525">
+            <a:solidFill>
+              <a:schemeClr val="tx1"/>
+            </a:solidFill>
+            <a:headEnd type="triangle"/>
+            <a:tailEnd type="triangle"/>
+          </a:ln>
+          <a:effectLst/>
+        </p:spPr>
+        <p:style>
+          <a:lnRef idx="2">
+            <a:schemeClr val="accent1"/>
+          </a:lnRef>
+          <a:fillRef idx="0">
+            <a:schemeClr val="accent1"/>
+          </a:fillRef>
+          <a:effectRef idx="1">
+            <a:schemeClr val="accent1"/>
+          </a:effectRef>
+          <a:fontRef idx="minor">
+            <a:schemeClr val="tx1"/>
+          </a:fontRef>
+        </p:style>
+      </p:cxnSp>
+      <p:sp>
+        <p:nvSpPr>
+          <p:cNvPr id="73" name="ZoneTexte 72"/>
+          <p:cNvSpPr txBox="1"/>
+          <p:nvPr/>
+        </p:nvSpPr>
+        <p:spPr>
+          <a:xfrm>
+            <a:off x="6438977" y="3039791"/>
+            <a:ext cx="830050" cy="523220"/>
+          </a:xfrm>
+          <a:prstGeom prst="rect">
+            <a:avLst/>
+          </a:prstGeom>
+          <a:noFill/>
+        </p:spPr>
+        <p:txBody>
+          <a:bodyPr wrap="none" rtlCol="0">
+            <a:spAutoFit/>
+          </a:bodyPr>
+          <a:lstStyle/>
+          <a:p>
+            <a:pPr algn="ctr"/>
+            <a:r>
+              <a:rPr lang="en-GB" sz="1400" dirty="0" smtClean="0"/>
+              <a:t>Scan line</a:t>
+            </a:r>
+          </a:p>
+          <a:p>
+            <a:pPr algn="ctr"/>
+            <a:r>
+              <a:rPr lang="en-GB" sz="1400" dirty="0" smtClean="0"/>
+              <a:t>number</a:t>
+            </a:r>
+            <a:endParaRPr lang="en-GB" sz="1400" dirty="0"/>
+          </a:p>
+        </p:txBody>
+      </p:sp>
+      <p:sp>
+        <p:nvSpPr>
+          <p:cNvPr id="79" name="ZoneTexte 78"/>
+          <p:cNvSpPr txBox="1"/>
+          <p:nvPr/>
+        </p:nvSpPr>
+        <p:spPr>
+          <a:xfrm>
+            <a:off x="7184133" y="4937300"/>
+            <a:ext cx="762987" cy="523220"/>
+          </a:xfrm>
+          <a:prstGeom prst="rect">
+            <a:avLst/>
+          </a:prstGeom>
+          <a:noFill/>
+        </p:spPr>
+        <p:txBody>
+          <a:bodyPr wrap="none" rtlCol="0">
+            <a:spAutoFit/>
+          </a:bodyPr>
+          <a:lstStyle/>
+          <a:p>
+            <a:pPr algn="ctr"/>
+            <a:r>
+              <a:rPr lang="en-GB" sz="1400" dirty="0" smtClean="0"/>
+              <a:t>Frame</a:t>
+            </a:r>
+          </a:p>
+          <a:p>
+            <a:pPr algn="ctr"/>
+            <a:r>
+              <a:rPr lang="en-GB" sz="1400" dirty="0" smtClean="0"/>
+              <a:t>number</a:t>
+            </a:r>
+            <a:endParaRPr lang="en-GB" sz="1400" dirty="0"/>
+          </a:p>
+        </p:txBody>
+      </p:sp>
+      <p:cxnSp>
+        <p:nvCxnSpPr>
+          <p:cNvPr id="80" name="Connecteur droit avec flèche 79"/>
+          <p:cNvCxnSpPr/>
+          <p:nvPr/>
+        </p:nvCxnSpPr>
+        <p:spPr>
+          <a:xfrm flipV="1">
+            <a:off x="7430705" y="4877881"/>
+            <a:ext cx="199008" cy="1"/>
+          </a:xfrm>
+          <a:prstGeom prst="straightConnector1">
+            <a:avLst/>
+          </a:prstGeom>
+          <a:ln w="9525">
+            <a:solidFill>
+              <a:schemeClr val="tx1"/>
+            </a:solidFill>
+            <a:headEnd type="triangle"/>
+            <a:tailEnd type="triangle"/>
+          </a:ln>
+          <a:effectLst/>
+        </p:spPr>
+        <p:style>
+          <a:lnRef idx="2">
+            <a:schemeClr val="accent1"/>
+          </a:lnRef>
+          <a:fillRef idx="0">
+            <a:schemeClr val="accent1"/>
+          </a:fillRef>
+          <a:effectRef idx="1">
+            <a:schemeClr val="accent1"/>
+          </a:effectRef>
+          <a:fontRef idx="minor">
+            <a:schemeClr val="tx1"/>
+          </a:fontRef>
+        </p:style>
+      </p:cxnSp>
+      <p:cxnSp>
+        <p:nvCxnSpPr>
+          <p:cNvPr id="81" name="Connecteur droit 80"/>
+          <p:cNvCxnSpPr/>
+          <p:nvPr/>
+        </p:nvCxnSpPr>
+        <p:spPr>
+          <a:xfrm flipV="1">
+            <a:off x="7430705" y="4615351"/>
+            <a:ext cx="0" cy="321949"/>
+          </a:xfrm>
+          <a:prstGeom prst="line">
+            <a:avLst/>
+          </a:prstGeom>
+          <a:ln w="6350">
+            <a:solidFill>
+              <a:schemeClr val="tx1"/>
+            </a:solidFill>
+            <a:prstDash val="dash"/>
+          </a:ln>
+          <a:effectLst/>
+        </p:spPr>
+        <p:style>
+          <a:lnRef idx="2">
+            <a:schemeClr val="accent1"/>
+          </a:lnRef>
+          <a:fillRef idx="0">
+            <a:schemeClr val="accent1"/>
+          </a:fillRef>
+          <a:effectRef idx="1">
+            <a:schemeClr val="accent1"/>
+          </a:effectRef>
+          <a:fontRef idx="minor">
+            <a:schemeClr val="tx1"/>
+          </a:fontRef>
+        </p:style>
+      </p:cxnSp>
+      <p:cxnSp>
+        <p:nvCxnSpPr>
+          <p:cNvPr id="82" name="Connecteur droit 81"/>
+          <p:cNvCxnSpPr/>
+          <p:nvPr/>
+        </p:nvCxnSpPr>
+        <p:spPr>
+          <a:xfrm flipV="1">
+            <a:off x="7629713" y="4627951"/>
+            <a:ext cx="0" cy="321949"/>
+          </a:xfrm>
+          <a:prstGeom prst="line">
+            <a:avLst/>
+          </a:prstGeom>
+          <a:ln w="6350">
+            <a:solidFill>
+              <a:schemeClr val="tx1"/>
+            </a:solidFill>
+            <a:prstDash val="dash"/>
+          </a:ln>
+          <a:effectLst/>
+        </p:spPr>
+        <p:style>
+          <a:lnRef idx="2">
+            <a:schemeClr val="accent1"/>
+          </a:lnRef>
+          <a:fillRef idx="0">
+            <a:schemeClr val="accent1"/>
+          </a:fillRef>
+          <a:effectRef idx="1">
+            <a:schemeClr val="accent1"/>
+          </a:effectRef>
+          <a:fontRef idx="minor">
+            <a:schemeClr val="tx1"/>
+          </a:fontRef>
+        </p:style>
+      </p:cxnSp>
+      <p:cxnSp>
+        <p:nvCxnSpPr>
+          <p:cNvPr id="85" name="Connecteur droit 84"/>
+          <p:cNvCxnSpPr/>
+          <p:nvPr/>
+        </p:nvCxnSpPr>
+        <p:spPr>
+          <a:xfrm flipH="1">
+            <a:off x="7109767" y="4627283"/>
+            <a:ext cx="314903" cy="1"/>
+          </a:xfrm>
+          <a:prstGeom prst="line">
+            <a:avLst/>
+          </a:prstGeom>
+          <a:ln w="6350">
+            <a:solidFill>
+              <a:schemeClr val="tx1"/>
+            </a:solidFill>
+            <a:prstDash val="dash"/>
+          </a:ln>
+          <a:effectLst/>
+        </p:spPr>
+        <p:style>
+          <a:lnRef idx="2">
+            <a:schemeClr val="accent1"/>
+          </a:lnRef>
+          <a:fillRef idx="0">
+            <a:schemeClr val="accent1"/>
+          </a:fillRef>
+          <a:effectRef idx="1">
+            <a:schemeClr val="accent1"/>
+          </a:effectRef>
+          <a:fontRef idx="minor">
+            <a:schemeClr val="tx1"/>
+          </a:fontRef>
+        </p:style>
+      </p:cxnSp>
+      <p:cxnSp>
+        <p:nvCxnSpPr>
+          <p:cNvPr id="86" name="Connecteur droit 85"/>
+          <p:cNvCxnSpPr/>
+          <p:nvPr/>
+        </p:nvCxnSpPr>
+        <p:spPr>
+          <a:xfrm flipH="1">
+            <a:off x="7113127" y="3556918"/>
+            <a:ext cx="314903" cy="1"/>
+          </a:xfrm>
+          <a:prstGeom prst="line">
+            <a:avLst/>
+          </a:prstGeom>
+          <a:ln w="6350">
+            <a:solidFill>
+              <a:schemeClr val="tx1"/>
+            </a:solidFill>
+            <a:prstDash val="dash"/>
+          </a:ln>
+          <a:effectLst/>
+        </p:spPr>
+        <p:style>
+          <a:lnRef idx="2">
+            <a:schemeClr val="accent1"/>
+          </a:lnRef>
+          <a:fillRef idx="0">
+            <a:schemeClr val="accent1"/>
+          </a:fillRef>
+          <a:effectRef idx="1">
+            <a:schemeClr val="accent1"/>
+          </a:effectRef>
+          <a:fontRef idx="minor">
+            <a:schemeClr val="tx1"/>
+          </a:fontRef>
+        </p:style>
+      </p:cxnSp>
+      <p:cxnSp>
+        <p:nvCxnSpPr>
+          <p:cNvPr id="89" name="Connecteur droit 88"/>
+          <p:cNvCxnSpPr/>
+          <p:nvPr/>
+        </p:nvCxnSpPr>
+        <p:spPr>
+          <a:xfrm flipH="1">
+            <a:off x="7436210" y="3097990"/>
+            <a:ext cx="314903" cy="1"/>
+          </a:xfrm>
+          <a:prstGeom prst="line">
+            <a:avLst/>
+          </a:prstGeom>
+          <a:ln w="6350">
+            <a:solidFill>
+              <a:schemeClr val="tx1"/>
+            </a:solidFill>
+            <a:prstDash val="dash"/>
+          </a:ln>
+          <a:effectLst/>
+        </p:spPr>
+        <p:style>
+          <a:lnRef idx="2">
+            <a:schemeClr val="accent1"/>
+          </a:lnRef>
+          <a:fillRef idx="0">
+            <a:schemeClr val="accent1"/>
+          </a:fillRef>
+          <a:effectRef idx="1">
+            <a:schemeClr val="accent1"/>
+          </a:effectRef>
+          <a:fontRef idx="minor">
+            <a:schemeClr val="tx1"/>
+          </a:fontRef>
+        </p:style>
+      </p:cxnSp>
+      <p:cxnSp>
+        <p:nvCxnSpPr>
+          <p:cNvPr id="91" name="Connecteur droit 90"/>
+          <p:cNvCxnSpPr/>
+          <p:nvPr/>
+        </p:nvCxnSpPr>
+        <p:spPr>
+          <a:xfrm flipH="1">
+            <a:off x="7235292" y="3095862"/>
+            <a:ext cx="320408" cy="457130"/>
+          </a:xfrm>
+          <a:prstGeom prst="line">
+            <a:avLst/>
+          </a:prstGeom>
+          <a:ln w="9525">
+            <a:solidFill>
+              <a:schemeClr val="tx1"/>
+            </a:solidFill>
+            <a:headEnd type="triangle"/>
+            <a:tailEnd type="triangle"/>
+          </a:ln>
+          <a:effectLst/>
+        </p:spPr>
+        <p:style>
+          <a:lnRef idx="2">
+            <a:schemeClr val="accent1"/>
+          </a:lnRef>
+          <a:fillRef idx="0">
+            <a:schemeClr val="accent1"/>
+          </a:fillRef>
+          <a:effectRef idx="1">
+            <a:schemeClr val="accent1"/>
+          </a:effectRef>
+          <a:fontRef idx="minor">
+            <a:schemeClr val="tx1"/>
+          </a:fontRef>
+        </p:style>
+      </p:cxnSp>
     </p:spTree>
     <p:extLst>
       <p:ext uri="{BB962C8B-B14F-4D97-AF65-F5344CB8AC3E}">
-        <p14:creationId xmlns:p14="http://schemas.microsoft.com/office/powerpoint/2010/main" val="2470635882"/>
+        <p14:creationId xmlns:p14="http://schemas.microsoft.com/office/powerpoint/2010/main" val="3448788503"/>
       </p:ext>
     </p:extLst>
   </p:cSld>
   <p:clrMapOvr>
     <a:masterClrMapping/>
   </p:clrMapOvr>
+  <p:timing>
+    <p:tnLst>
+      <p:par>
+        <p:cTn xmlns:p14="http://schemas.microsoft.com/office/powerpoint/2010/main" id="1" dur="indefinite" restart="never" nodeType="tmRoot"/>
+      </p:par>
+    </p:tnLst>
+  </p:timing>
+</p:sld>
+</file>
+
+<file path=ppt/slides/slide7.xml><?xml version="1.0" encoding="utf-8"?>
+<p:sld xmlns:a="http://schemas.openxmlformats.org/drawingml/2006/main" xmlns:r="http://schemas.openxmlformats.org/officeDocument/2006/relationships" xmlns:p="http://schemas.openxmlformats.org/presentationml/2006/main">
+  <p:cSld>
+    <p:spTree>
+      <p:nvGrpSpPr>
+        <p:cNvPr id="1" name=""/>
+        <p:cNvGrpSpPr/>
+        <p:nvPr/>
+      </p:nvGrpSpPr>
+      <p:grpSpPr>
+        <a:xfrm>
+          <a:off x="0" y="0"/>
+          <a:ext cx="0" cy="0"/>
+          <a:chOff x="0" y="0"/>
+          <a:chExt cx="0" cy="0"/>
+        </a:xfrm>
+      </p:grpSpPr>
+      <p:cxnSp>
+        <p:nvCxnSpPr>
+          <p:cNvPr id="102" name="Connecteur droit 101"/>
+          <p:cNvCxnSpPr/>
+          <p:nvPr/>
+        </p:nvCxnSpPr>
+        <p:spPr>
+          <a:xfrm flipH="1">
+            <a:off x="7430705" y="3097991"/>
+            <a:ext cx="320408" cy="457130"/>
+          </a:xfrm>
+          <a:prstGeom prst="line">
+            <a:avLst/>
+          </a:prstGeom>
+          <a:ln w="9525">
+            <a:solidFill>
+              <a:schemeClr val="tx1"/>
+            </a:solidFill>
+          </a:ln>
+          <a:effectLst/>
+        </p:spPr>
+        <p:style>
+          <a:lnRef idx="2">
+            <a:schemeClr val="accent1"/>
+          </a:lnRef>
+          <a:fillRef idx="0">
+            <a:schemeClr val="accent1"/>
+          </a:fillRef>
+          <a:effectRef idx="1">
+            <a:schemeClr val="accent1"/>
+          </a:effectRef>
+          <a:fontRef idx="minor">
+            <a:schemeClr val="tx1"/>
+          </a:fontRef>
+        </p:style>
+      </p:cxnSp>
+      <p:cxnSp>
+        <p:nvCxnSpPr>
+          <p:cNvPr id="103" name="Connecteur droit 102"/>
+          <p:cNvCxnSpPr/>
+          <p:nvPr/>
+        </p:nvCxnSpPr>
+        <p:spPr>
+          <a:xfrm flipV="1">
+            <a:off x="7430705" y="3555121"/>
+            <a:ext cx="0" cy="1060230"/>
+          </a:xfrm>
+          <a:prstGeom prst="line">
+            <a:avLst/>
+          </a:prstGeom>
+          <a:ln w="9525">
+            <a:solidFill>
+              <a:schemeClr val="tx1"/>
+            </a:solidFill>
+          </a:ln>
+          <a:effectLst/>
+        </p:spPr>
+        <p:style>
+          <a:lnRef idx="2">
+            <a:schemeClr val="accent1"/>
+          </a:lnRef>
+          <a:fillRef idx="0">
+            <a:schemeClr val="accent1"/>
+          </a:fillRef>
+          <a:effectRef idx="1">
+            <a:schemeClr val="accent1"/>
+          </a:effectRef>
+          <a:fontRef idx="minor">
+            <a:schemeClr val="tx1"/>
+          </a:fontRef>
+        </p:style>
+      </p:cxnSp>
+      <p:cxnSp>
+        <p:nvCxnSpPr>
+          <p:cNvPr id="104" name="Connecteur droit 103"/>
+          <p:cNvCxnSpPr/>
+          <p:nvPr/>
+        </p:nvCxnSpPr>
+        <p:spPr>
+          <a:xfrm flipH="1">
+            <a:off x="7427089" y="4259733"/>
+            <a:ext cx="258640" cy="359236"/>
+          </a:xfrm>
+          <a:prstGeom prst="line">
+            <a:avLst/>
+          </a:prstGeom>
+          <a:ln w="9525">
+            <a:solidFill>
+              <a:schemeClr val="tx1"/>
+            </a:solidFill>
+          </a:ln>
+          <a:effectLst/>
+        </p:spPr>
+        <p:style>
+          <a:lnRef idx="2">
+            <a:schemeClr val="accent1"/>
+          </a:lnRef>
+          <a:fillRef idx="0">
+            <a:schemeClr val="accent1"/>
+          </a:fillRef>
+          <a:effectRef idx="1">
+            <a:schemeClr val="accent1"/>
+          </a:effectRef>
+          <a:fontRef idx="minor">
+            <a:schemeClr val="tx1"/>
+          </a:fontRef>
+        </p:style>
+      </p:cxnSp>
+      <p:cxnSp>
+        <p:nvCxnSpPr>
+          <p:cNvPr id="105" name="Connecteur droit 104"/>
+          <p:cNvCxnSpPr/>
+          <p:nvPr/>
+        </p:nvCxnSpPr>
+        <p:spPr>
+          <a:xfrm>
+            <a:off x="7751113" y="3097991"/>
+            <a:ext cx="8265" cy="360000"/>
+          </a:xfrm>
+          <a:prstGeom prst="line">
+            <a:avLst/>
+          </a:prstGeom>
+          <a:ln w="9525">
+            <a:solidFill>
+              <a:schemeClr val="tx1"/>
+            </a:solidFill>
+          </a:ln>
+          <a:effectLst/>
+        </p:spPr>
+        <p:style>
+          <a:lnRef idx="2">
+            <a:schemeClr val="accent1"/>
+          </a:lnRef>
+          <a:fillRef idx="0">
+            <a:schemeClr val="accent1"/>
+          </a:fillRef>
+          <a:effectRef idx="1">
+            <a:schemeClr val="accent1"/>
+          </a:effectRef>
+          <a:fontRef idx="minor">
+            <a:schemeClr val="tx1"/>
+          </a:fontRef>
+        </p:style>
+      </p:cxnSp>
+      <p:cxnSp>
+        <p:nvCxnSpPr>
+          <p:cNvPr id="106" name="Connecteur droit 105"/>
+          <p:cNvCxnSpPr/>
+          <p:nvPr/>
+        </p:nvCxnSpPr>
+        <p:spPr>
+          <a:xfrm flipH="1">
+            <a:off x="7683650" y="3104766"/>
+            <a:ext cx="320408" cy="457130"/>
+          </a:xfrm>
+          <a:prstGeom prst="line">
+            <a:avLst/>
+          </a:prstGeom>
+          <a:ln w="9525">
+            <a:solidFill>
+              <a:schemeClr val="tx1"/>
+            </a:solidFill>
+          </a:ln>
+          <a:effectLst/>
+        </p:spPr>
+        <p:style>
+          <a:lnRef idx="2">
+            <a:schemeClr val="accent1"/>
+          </a:lnRef>
+          <a:fillRef idx="0">
+            <a:schemeClr val="accent1"/>
+          </a:fillRef>
+          <a:effectRef idx="1">
+            <a:schemeClr val="accent1"/>
+          </a:effectRef>
+          <a:fontRef idx="minor">
+            <a:schemeClr val="tx1"/>
+          </a:fontRef>
+        </p:style>
+      </p:cxnSp>
+      <p:cxnSp>
+        <p:nvCxnSpPr>
+          <p:cNvPr id="107" name="Connecteur droit 106"/>
+          <p:cNvCxnSpPr/>
+          <p:nvPr/>
+        </p:nvCxnSpPr>
+        <p:spPr>
+          <a:xfrm flipV="1">
+            <a:off x="7683650" y="3561896"/>
+            <a:ext cx="0" cy="1060230"/>
+          </a:xfrm>
+          <a:prstGeom prst="line">
+            <a:avLst/>
+          </a:prstGeom>
+          <a:ln w="9525">
+            <a:solidFill>
+              <a:schemeClr val="tx1"/>
+            </a:solidFill>
+          </a:ln>
+          <a:effectLst/>
+        </p:spPr>
+        <p:style>
+          <a:lnRef idx="2">
+            <a:schemeClr val="accent1"/>
+          </a:lnRef>
+          <a:fillRef idx="0">
+            <a:schemeClr val="accent1"/>
+          </a:fillRef>
+          <a:effectRef idx="1">
+            <a:schemeClr val="accent1"/>
+          </a:effectRef>
+          <a:fontRef idx="minor">
+            <a:schemeClr val="tx1"/>
+          </a:fontRef>
+        </p:style>
+      </p:cxnSp>
+      <p:cxnSp>
+        <p:nvCxnSpPr>
+          <p:cNvPr id="108" name="Connecteur droit 107"/>
+          <p:cNvCxnSpPr/>
+          <p:nvPr/>
+        </p:nvCxnSpPr>
+        <p:spPr>
+          <a:xfrm flipH="1">
+            <a:off x="7685729" y="4259733"/>
+            <a:ext cx="238683" cy="362393"/>
+          </a:xfrm>
+          <a:prstGeom prst="line">
+            <a:avLst/>
+          </a:prstGeom>
+          <a:ln w="9525">
+            <a:solidFill>
+              <a:schemeClr val="tx1"/>
+            </a:solidFill>
+          </a:ln>
+          <a:effectLst/>
+        </p:spPr>
+        <p:style>
+          <a:lnRef idx="2">
+            <a:schemeClr val="accent1"/>
+          </a:lnRef>
+          <a:fillRef idx="0">
+            <a:schemeClr val="accent1"/>
+          </a:fillRef>
+          <a:effectRef idx="1">
+            <a:schemeClr val="accent1"/>
+          </a:effectRef>
+          <a:fontRef idx="minor">
+            <a:schemeClr val="tx1"/>
+          </a:fontRef>
+        </p:style>
+      </p:cxnSp>
+      <p:cxnSp>
+        <p:nvCxnSpPr>
+          <p:cNvPr id="109" name="Connecteur droit 108"/>
+          <p:cNvCxnSpPr/>
+          <p:nvPr/>
+        </p:nvCxnSpPr>
+        <p:spPr>
+          <a:xfrm flipH="1">
+            <a:off x="7930107" y="3110591"/>
+            <a:ext cx="320408" cy="457130"/>
+          </a:xfrm>
+          <a:prstGeom prst="line">
+            <a:avLst/>
+          </a:prstGeom>
+          <a:ln w="9525">
+            <a:solidFill>
+              <a:schemeClr val="tx1"/>
+            </a:solidFill>
+          </a:ln>
+          <a:effectLst/>
+        </p:spPr>
+        <p:style>
+          <a:lnRef idx="2">
+            <a:schemeClr val="accent1"/>
+          </a:lnRef>
+          <a:fillRef idx="0">
+            <a:schemeClr val="accent1"/>
+          </a:fillRef>
+          <a:effectRef idx="1">
+            <a:schemeClr val="accent1"/>
+          </a:effectRef>
+          <a:fontRef idx="minor">
+            <a:schemeClr val="tx1"/>
+          </a:fontRef>
+        </p:style>
+      </p:cxnSp>
+      <p:cxnSp>
+        <p:nvCxnSpPr>
+          <p:cNvPr id="110" name="Connecteur droit 109"/>
+          <p:cNvCxnSpPr/>
+          <p:nvPr/>
+        </p:nvCxnSpPr>
+        <p:spPr>
+          <a:xfrm flipV="1">
+            <a:off x="7930107" y="3567721"/>
+            <a:ext cx="0" cy="1060230"/>
+          </a:xfrm>
+          <a:prstGeom prst="line">
+            <a:avLst/>
+          </a:prstGeom>
+          <a:ln w="9525">
+            <a:solidFill>
+              <a:schemeClr val="tx1"/>
+            </a:solidFill>
+          </a:ln>
+          <a:effectLst/>
+        </p:spPr>
+        <p:style>
+          <a:lnRef idx="2">
+            <a:schemeClr val="accent1"/>
+          </a:lnRef>
+          <a:fillRef idx="0">
+            <a:schemeClr val="accent1"/>
+          </a:fillRef>
+          <a:effectRef idx="1">
+            <a:schemeClr val="accent1"/>
+          </a:effectRef>
+          <a:fontRef idx="minor">
+            <a:schemeClr val="tx1"/>
+          </a:fontRef>
+        </p:style>
+      </p:cxnSp>
+      <p:cxnSp>
+        <p:nvCxnSpPr>
+          <p:cNvPr id="111" name="Connecteur droit 110"/>
+          <p:cNvCxnSpPr/>
+          <p:nvPr/>
+        </p:nvCxnSpPr>
+        <p:spPr>
+          <a:xfrm flipH="1">
+            <a:off x="7930108" y="4259733"/>
+            <a:ext cx="257715" cy="368218"/>
+          </a:xfrm>
+          <a:prstGeom prst="line">
+            <a:avLst/>
+          </a:prstGeom>
+          <a:ln w="9525">
+            <a:solidFill>
+              <a:schemeClr val="tx1"/>
+            </a:solidFill>
+          </a:ln>
+          <a:effectLst/>
+        </p:spPr>
+        <p:style>
+          <a:lnRef idx="2">
+            <a:schemeClr val="accent1"/>
+          </a:lnRef>
+          <a:fillRef idx="0">
+            <a:schemeClr val="accent1"/>
+          </a:fillRef>
+          <a:effectRef idx="1">
+            <a:schemeClr val="accent1"/>
+          </a:effectRef>
+          <a:fontRef idx="minor">
+            <a:schemeClr val="tx1"/>
+          </a:fontRef>
+        </p:style>
+      </p:cxnSp>
+      <p:cxnSp>
+        <p:nvCxnSpPr>
+          <p:cNvPr id="112" name="Connecteur droit 111"/>
+          <p:cNvCxnSpPr/>
+          <p:nvPr/>
+        </p:nvCxnSpPr>
+        <p:spPr>
+          <a:xfrm flipH="1">
+            <a:off x="8187823" y="3110591"/>
+            <a:ext cx="320408" cy="457130"/>
+          </a:xfrm>
+          <a:prstGeom prst="line">
+            <a:avLst/>
+          </a:prstGeom>
+          <a:ln w="9525">
+            <a:solidFill>
+              <a:schemeClr val="tx1"/>
+            </a:solidFill>
+          </a:ln>
+          <a:effectLst/>
+        </p:spPr>
+        <p:style>
+          <a:lnRef idx="2">
+            <a:schemeClr val="accent1"/>
+          </a:lnRef>
+          <a:fillRef idx="0">
+            <a:schemeClr val="accent1"/>
+          </a:fillRef>
+          <a:effectRef idx="1">
+            <a:schemeClr val="accent1"/>
+          </a:effectRef>
+          <a:fontRef idx="minor">
+            <a:schemeClr val="tx1"/>
+          </a:fontRef>
+        </p:style>
+      </p:cxnSp>
+      <p:cxnSp>
+        <p:nvCxnSpPr>
+          <p:cNvPr id="113" name="Connecteur droit 112"/>
+          <p:cNvCxnSpPr/>
+          <p:nvPr/>
+        </p:nvCxnSpPr>
+        <p:spPr>
+          <a:xfrm flipV="1">
+            <a:off x="8187823" y="3567721"/>
+            <a:ext cx="0" cy="1060230"/>
+          </a:xfrm>
+          <a:prstGeom prst="line">
+            <a:avLst/>
+          </a:prstGeom>
+          <a:ln w="9525">
+            <a:solidFill>
+              <a:schemeClr val="tx1"/>
+            </a:solidFill>
+          </a:ln>
+          <a:effectLst/>
+        </p:spPr>
+        <p:style>
+          <a:lnRef idx="2">
+            <a:schemeClr val="accent1"/>
+          </a:lnRef>
+          <a:fillRef idx="0">
+            <a:schemeClr val="accent1"/>
+          </a:fillRef>
+          <a:effectRef idx="1">
+            <a:schemeClr val="accent1"/>
+          </a:effectRef>
+          <a:fontRef idx="minor">
+            <a:schemeClr val="tx1"/>
+          </a:fontRef>
+        </p:style>
+      </p:cxnSp>
+      <p:cxnSp>
+        <p:nvCxnSpPr>
+          <p:cNvPr id="114" name="Connecteur droit 113"/>
+          <p:cNvCxnSpPr/>
+          <p:nvPr/>
+        </p:nvCxnSpPr>
+        <p:spPr>
+          <a:xfrm>
+            <a:off x="8508231" y="3110591"/>
+            <a:ext cx="0" cy="1063050"/>
+          </a:xfrm>
+          <a:prstGeom prst="line">
+            <a:avLst/>
+          </a:prstGeom>
+          <a:ln w="9525">
+            <a:solidFill>
+              <a:schemeClr val="tx1"/>
+            </a:solidFill>
+          </a:ln>
+          <a:effectLst/>
+        </p:spPr>
+        <p:style>
+          <a:lnRef idx="2">
+            <a:schemeClr val="accent1"/>
+          </a:lnRef>
+          <a:fillRef idx="0">
+            <a:schemeClr val="accent1"/>
+          </a:fillRef>
+          <a:effectRef idx="1">
+            <a:schemeClr val="accent1"/>
+          </a:effectRef>
+          <a:fontRef idx="minor">
+            <a:schemeClr val="tx1"/>
+          </a:fontRef>
+        </p:style>
+      </p:cxnSp>
+      <p:cxnSp>
+        <p:nvCxnSpPr>
+          <p:cNvPr id="115" name="Connecteur droit 114"/>
+          <p:cNvCxnSpPr/>
+          <p:nvPr/>
+        </p:nvCxnSpPr>
+        <p:spPr>
+          <a:xfrm>
+            <a:off x="8004058" y="3104766"/>
+            <a:ext cx="0" cy="360000"/>
+          </a:xfrm>
+          <a:prstGeom prst="line">
+            <a:avLst/>
+          </a:prstGeom>
+          <a:ln w="9525">
+            <a:solidFill>
+              <a:schemeClr val="tx1"/>
+            </a:solidFill>
+          </a:ln>
+          <a:effectLst/>
+        </p:spPr>
+        <p:style>
+          <a:lnRef idx="2">
+            <a:schemeClr val="accent1"/>
+          </a:lnRef>
+          <a:fillRef idx="0">
+            <a:schemeClr val="accent1"/>
+          </a:fillRef>
+          <a:effectRef idx="1">
+            <a:schemeClr val="accent1"/>
+          </a:effectRef>
+          <a:fontRef idx="minor">
+            <a:schemeClr val="tx1"/>
+          </a:fontRef>
+        </p:style>
+      </p:cxnSp>
+      <p:cxnSp>
+        <p:nvCxnSpPr>
+          <p:cNvPr id="116" name="Connecteur droit 115"/>
+          <p:cNvCxnSpPr/>
+          <p:nvPr/>
+        </p:nvCxnSpPr>
+        <p:spPr>
+          <a:xfrm>
+            <a:off x="8248278" y="3110591"/>
+            <a:ext cx="2237" cy="360000"/>
+          </a:xfrm>
+          <a:prstGeom prst="line">
+            <a:avLst/>
+          </a:prstGeom>
+          <a:ln w="9525">
+            <a:solidFill>
+              <a:schemeClr val="tx1"/>
+            </a:solidFill>
+          </a:ln>
+          <a:effectLst/>
+        </p:spPr>
+        <p:style>
+          <a:lnRef idx="2">
+            <a:schemeClr val="accent1"/>
+          </a:lnRef>
+          <a:fillRef idx="0">
+            <a:schemeClr val="accent1"/>
+          </a:fillRef>
+          <a:effectRef idx="1">
+            <a:schemeClr val="accent1"/>
+          </a:effectRef>
+          <a:fontRef idx="minor">
+            <a:schemeClr val="tx1"/>
+          </a:fontRef>
+        </p:style>
+      </p:cxnSp>
+      <p:cxnSp>
+        <p:nvCxnSpPr>
+          <p:cNvPr id="117" name="Connecteur droit 116"/>
+          <p:cNvCxnSpPr/>
+          <p:nvPr/>
+        </p:nvCxnSpPr>
+        <p:spPr>
+          <a:xfrm flipH="1">
+            <a:off x="8187823" y="4173641"/>
+            <a:ext cx="320408" cy="457130"/>
+          </a:xfrm>
+          <a:prstGeom prst="line">
+            <a:avLst/>
+          </a:prstGeom>
+          <a:ln w="9525">
+            <a:solidFill>
+              <a:schemeClr val="tx1"/>
+            </a:solidFill>
+          </a:ln>
+          <a:effectLst/>
+        </p:spPr>
+        <p:style>
+          <a:lnRef idx="2">
+            <a:schemeClr val="accent1"/>
+          </a:lnRef>
+          <a:fillRef idx="0">
+            <a:schemeClr val="accent1"/>
+          </a:fillRef>
+          <a:effectRef idx="1">
+            <a:schemeClr val="accent1"/>
+          </a:effectRef>
+          <a:fontRef idx="minor">
+            <a:schemeClr val="tx1"/>
+          </a:fontRef>
+        </p:style>
+      </p:cxnSp>
+      <p:sp>
+        <p:nvSpPr>
+          <p:cNvPr id="144" name="ZoneTexte 143"/>
+          <p:cNvSpPr txBox="1"/>
+          <p:nvPr/>
+        </p:nvSpPr>
+        <p:spPr>
+          <a:xfrm>
+            <a:off x="6438118" y="2017851"/>
+            <a:ext cx="1973104" cy="738664"/>
+          </a:xfrm>
+          <a:prstGeom prst="rect">
+            <a:avLst/>
+          </a:prstGeom>
+          <a:noFill/>
+        </p:spPr>
+        <p:txBody>
+          <a:bodyPr wrap="none" rtlCol="0">
+            <a:spAutoFit/>
+          </a:bodyPr>
+          <a:lstStyle/>
+          <a:p>
+            <a:pPr algn="ctr"/>
+            <a:r>
+              <a:rPr lang="en-GB" sz="1400" b="1" dirty="0" smtClean="0"/>
+              <a:t>Post-scan </a:t>
+            </a:r>
+            <a:r>
+              <a:rPr lang="en-GB" sz="1400" b="1" dirty="0"/>
+              <a:t>image 3D </a:t>
+            </a:r>
+          </a:p>
+          <a:p>
+            <a:pPr algn="ctr"/>
+            <a:r>
+              <a:rPr lang="en-GB" sz="1400" b="1" dirty="0" smtClean="0"/>
+              <a:t>Linear probe motor</a:t>
+            </a:r>
+          </a:p>
+          <a:p>
+            <a:pPr algn="ctr"/>
+            <a:r>
+              <a:rPr lang="en-GB" sz="1400" b="1" dirty="0" smtClean="0"/>
+              <a:t>Linear probe transducer</a:t>
+            </a:r>
+          </a:p>
+        </p:txBody>
+      </p:sp>
+      <p:sp>
+        <p:nvSpPr>
+          <p:cNvPr id="65" name="ZoneTexte 64"/>
+          <p:cNvSpPr txBox="1"/>
+          <p:nvPr/>
+        </p:nvSpPr>
+        <p:spPr>
+          <a:xfrm>
+            <a:off x="6239037" y="3877863"/>
+            <a:ext cx="595035" cy="307777"/>
+          </a:xfrm>
+          <a:prstGeom prst="rect">
+            <a:avLst/>
+          </a:prstGeom>
+          <a:noFill/>
+        </p:spPr>
+        <p:txBody>
+          <a:bodyPr wrap="none" rtlCol="0">
+            <a:spAutoFit/>
+          </a:bodyPr>
+          <a:lstStyle/>
+          <a:p>
+            <a:pPr algn="ctr"/>
+            <a:r>
+              <a:rPr lang="en-GB" sz="1400" dirty="0"/>
+              <a:t>d</a:t>
+            </a:r>
+            <a:r>
+              <a:rPr lang="en-GB" sz="1400" dirty="0" smtClean="0"/>
+              <a:t>im Y</a:t>
+            </a:r>
+            <a:endParaRPr lang="en-GB" sz="1400" dirty="0"/>
+          </a:p>
+        </p:txBody>
+      </p:sp>
+      <p:cxnSp>
+        <p:nvCxnSpPr>
+          <p:cNvPr id="69" name="Connecteur droit avec flèche 68"/>
+          <p:cNvCxnSpPr/>
+          <p:nvPr/>
+        </p:nvCxnSpPr>
+        <p:spPr>
+          <a:xfrm flipV="1">
+            <a:off x="6775405" y="3552992"/>
+            <a:ext cx="0" cy="1062359"/>
+          </a:xfrm>
+          <a:prstGeom prst="straightConnector1">
+            <a:avLst/>
+          </a:prstGeom>
+          <a:ln w="9525">
+            <a:solidFill>
+              <a:schemeClr val="tx1"/>
+            </a:solidFill>
+            <a:headEnd type="triangle"/>
+            <a:tailEnd type="triangle"/>
+          </a:ln>
+          <a:effectLst/>
+        </p:spPr>
+        <p:style>
+          <a:lnRef idx="2">
+            <a:schemeClr val="accent1"/>
+          </a:lnRef>
+          <a:fillRef idx="0">
+            <a:schemeClr val="accent1"/>
+          </a:fillRef>
+          <a:effectRef idx="1">
+            <a:schemeClr val="accent1"/>
+          </a:effectRef>
+          <a:fontRef idx="minor">
+            <a:schemeClr val="tx1"/>
+          </a:fontRef>
+        </p:style>
+      </p:cxnSp>
+      <p:sp>
+        <p:nvSpPr>
+          <p:cNvPr id="73" name="ZoneTexte 72"/>
+          <p:cNvSpPr txBox="1"/>
+          <p:nvPr/>
+        </p:nvSpPr>
+        <p:spPr>
+          <a:xfrm>
+            <a:off x="6393386" y="3104766"/>
+            <a:ext cx="597389" cy="307777"/>
+          </a:xfrm>
+          <a:prstGeom prst="rect">
+            <a:avLst/>
+          </a:prstGeom>
+          <a:noFill/>
+        </p:spPr>
+        <p:txBody>
+          <a:bodyPr wrap="none" rtlCol="0">
+            <a:spAutoFit/>
+          </a:bodyPr>
+          <a:lstStyle/>
+          <a:p>
+            <a:pPr algn="ctr"/>
+            <a:r>
+              <a:rPr lang="en-GB" sz="1400" dirty="0"/>
+              <a:t>d</a:t>
+            </a:r>
+            <a:r>
+              <a:rPr lang="en-GB" sz="1400" dirty="0" smtClean="0"/>
+              <a:t>im X</a:t>
+            </a:r>
+          </a:p>
+        </p:txBody>
+      </p:sp>
+      <p:sp>
+        <p:nvSpPr>
+          <p:cNvPr id="79" name="ZoneTexte 78"/>
+          <p:cNvSpPr txBox="1"/>
+          <p:nvPr/>
+        </p:nvSpPr>
+        <p:spPr>
+          <a:xfrm>
+            <a:off x="7552922" y="5069999"/>
+            <a:ext cx="595035" cy="307777"/>
+          </a:xfrm>
+          <a:prstGeom prst="rect">
+            <a:avLst/>
+          </a:prstGeom>
+          <a:noFill/>
+        </p:spPr>
+        <p:txBody>
+          <a:bodyPr wrap="none" rtlCol="0">
+            <a:spAutoFit/>
+          </a:bodyPr>
+          <a:lstStyle/>
+          <a:p>
+            <a:pPr algn="ctr"/>
+            <a:r>
+              <a:rPr lang="en-GB" sz="1400" dirty="0"/>
+              <a:t>d</a:t>
+            </a:r>
+            <a:r>
+              <a:rPr lang="en-GB" sz="1400" dirty="0" smtClean="0"/>
+              <a:t>im Z</a:t>
+            </a:r>
+            <a:endParaRPr lang="en-GB" sz="1400" dirty="0"/>
+          </a:p>
+        </p:txBody>
+      </p:sp>
+      <p:cxnSp>
+        <p:nvCxnSpPr>
+          <p:cNvPr id="80" name="Connecteur droit avec flèche 79"/>
+          <p:cNvCxnSpPr/>
+          <p:nvPr/>
+        </p:nvCxnSpPr>
+        <p:spPr>
+          <a:xfrm flipV="1">
+            <a:off x="7430705" y="5010580"/>
+            <a:ext cx="757118" cy="2"/>
+          </a:xfrm>
+          <a:prstGeom prst="straightConnector1">
+            <a:avLst/>
+          </a:prstGeom>
+          <a:ln w="9525">
+            <a:solidFill>
+              <a:schemeClr val="tx1"/>
+            </a:solidFill>
+            <a:headEnd type="triangle"/>
+            <a:tailEnd type="triangle"/>
+          </a:ln>
+          <a:effectLst/>
+        </p:spPr>
+        <p:style>
+          <a:lnRef idx="2">
+            <a:schemeClr val="accent1"/>
+          </a:lnRef>
+          <a:fillRef idx="0">
+            <a:schemeClr val="accent1"/>
+          </a:fillRef>
+          <a:effectRef idx="1">
+            <a:schemeClr val="accent1"/>
+          </a:effectRef>
+          <a:fontRef idx="minor">
+            <a:schemeClr val="tx1"/>
+          </a:fontRef>
+        </p:style>
+      </p:cxnSp>
+      <p:cxnSp>
+        <p:nvCxnSpPr>
+          <p:cNvPr id="91" name="Connecteur droit 90"/>
+          <p:cNvCxnSpPr/>
+          <p:nvPr/>
+        </p:nvCxnSpPr>
+        <p:spPr>
+          <a:xfrm flipH="1">
+            <a:off x="6773997" y="3095862"/>
+            <a:ext cx="320408" cy="457130"/>
+          </a:xfrm>
+          <a:prstGeom prst="line">
+            <a:avLst/>
+          </a:prstGeom>
+          <a:ln w="9525">
+            <a:solidFill>
+              <a:schemeClr val="tx1"/>
+            </a:solidFill>
+            <a:headEnd type="triangle"/>
+            <a:tailEnd type="triangle"/>
+          </a:ln>
+          <a:effectLst/>
+        </p:spPr>
+        <p:style>
+          <a:lnRef idx="2">
+            <a:schemeClr val="accent1"/>
+          </a:lnRef>
+          <a:fillRef idx="0">
+            <a:schemeClr val="accent1"/>
+          </a:fillRef>
+          <a:effectRef idx="1">
+            <a:schemeClr val="accent1"/>
+          </a:effectRef>
+          <a:fontRef idx="minor">
+            <a:schemeClr val="tx1"/>
+          </a:fontRef>
+        </p:style>
+      </p:cxnSp>
+      <p:cxnSp>
+        <p:nvCxnSpPr>
+          <p:cNvPr id="31" name="Connecteur droit avec flèche 30"/>
+          <p:cNvCxnSpPr/>
+          <p:nvPr/>
+        </p:nvCxnSpPr>
+        <p:spPr>
+          <a:xfrm>
+            <a:off x="7148210" y="3562026"/>
+            <a:ext cx="288000" cy="0"/>
+          </a:xfrm>
+          <a:prstGeom prst="straightConnector1">
+            <a:avLst/>
+          </a:prstGeom>
+          <a:ln w="22225">
+            <a:solidFill>
+              <a:schemeClr val="tx1"/>
+            </a:solidFill>
+            <a:headEnd type="triangle"/>
+            <a:tailEnd type="none"/>
+          </a:ln>
+          <a:effectLst/>
+        </p:spPr>
+        <p:style>
+          <a:lnRef idx="2">
+            <a:schemeClr val="accent1"/>
+          </a:lnRef>
+          <a:fillRef idx="0">
+            <a:schemeClr val="accent1"/>
+          </a:fillRef>
+          <a:effectRef idx="1">
+            <a:schemeClr val="accent1"/>
+          </a:effectRef>
+          <a:fontRef idx="minor">
+            <a:schemeClr val="tx1"/>
+          </a:fontRef>
+        </p:style>
+      </p:cxnSp>
+      <p:cxnSp>
+        <p:nvCxnSpPr>
+          <p:cNvPr id="32" name="Connecteur droit avec flèche 31"/>
+          <p:cNvCxnSpPr/>
+          <p:nvPr/>
+        </p:nvCxnSpPr>
+        <p:spPr>
+          <a:xfrm flipV="1">
+            <a:off x="7424670" y="3412543"/>
+            <a:ext cx="108000" cy="155178"/>
+          </a:xfrm>
+          <a:prstGeom prst="straightConnector1">
+            <a:avLst/>
+          </a:prstGeom>
+          <a:ln w="22225">
+            <a:solidFill>
+              <a:schemeClr val="tx1"/>
+            </a:solidFill>
+            <a:tailEnd type="triangle"/>
+          </a:ln>
+          <a:effectLst/>
+        </p:spPr>
+        <p:style>
+          <a:lnRef idx="2">
+            <a:schemeClr val="accent1"/>
+          </a:lnRef>
+          <a:fillRef idx="0">
+            <a:schemeClr val="accent1"/>
+          </a:fillRef>
+          <a:effectRef idx="1">
+            <a:schemeClr val="accent1"/>
+          </a:effectRef>
+          <a:fontRef idx="minor">
+            <a:schemeClr val="tx1"/>
+          </a:fontRef>
+        </p:style>
+      </p:cxnSp>
+      <p:cxnSp>
+        <p:nvCxnSpPr>
+          <p:cNvPr id="34" name="Connecteur droit avec flèche 33"/>
+          <p:cNvCxnSpPr/>
+          <p:nvPr/>
+        </p:nvCxnSpPr>
+        <p:spPr>
+          <a:xfrm>
+            <a:off x="7432592" y="3561896"/>
+            <a:ext cx="0" cy="289040"/>
+          </a:xfrm>
+          <a:prstGeom prst="straightConnector1">
+            <a:avLst/>
+          </a:prstGeom>
+          <a:ln w="22225">
+            <a:solidFill>
+              <a:schemeClr val="tx1"/>
+            </a:solidFill>
+            <a:tailEnd type="triangle"/>
+          </a:ln>
+          <a:effectLst/>
+        </p:spPr>
+        <p:style>
+          <a:lnRef idx="2">
+            <a:schemeClr val="accent1"/>
+          </a:lnRef>
+          <a:fillRef idx="0">
+            <a:schemeClr val="accent1"/>
+          </a:fillRef>
+          <a:effectRef idx="1">
+            <a:schemeClr val="accent1"/>
+          </a:effectRef>
+          <a:fontRef idx="minor">
+            <a:schemeClr val="tx1"/>
+          </a:fontRef>
+        </p:style>
+      </p:cxnSp>
+      <p:pic>
+        <p:nvPicPr>
+          <p:cNvPr id="4" name="Image 3" descr="latex-image-1.pdf"/>
+          <p:cNvPicPr>
+            <a:picLocks noChangeAspect="1"/>
+          </p:cNvPicPr>
+          <p:nvPr/>
+        </p:nvPicPr>
+        <p:blipFill>
+          <a:blip r:embed="rId2">
+            <a:extLst>
+              <a:ext uri="{28A0092B-C50C-407E-A947-70E740481C1C}">
+                <a14:useLocalDpi xmlns:a14="http://schemas.microsoft.com/office/drawing/2010/main" val="0"/>
+              </a:ext>
+            </a:extLst>
+          </a:blip>
+          <a:stretch>
+            <a:fillRect/>
+          </a:stretch>
+        </p:blipFill>
+        <p:spPr>
+          <a:xfrm>
+            <a:off x="7337413" y="3368991"/>
+            <a:ext cx="114300" cy="101600"/>
+          </a:xfrm>
+          <a:prstGeom prst="rect">
+            <a:avLst/>
+          </a:prstGeom>
+        </p:spPr>
+      </p:pic>
+      <p:pic>
+        <p:nvPicPr>
+          <p:cNvPr id="5" name="Image 4" descr="latex-image-1.pdf"/>
+          <p:cNvPicPr>
+            <a:picLocks noChangeAspect="1"/>
+          </p:cNvPicPr>
+          <p:nvPr/>
+        </p:nvPicPr>
+        <p:blipFill>
+          <a:blip r:embed="rId3">
+            <a:extLst>
+              <a:ext uri="{28A0092B-C50C-407E-A947-70E740481C1C}">
+                <a14:useLocalDpi xmlns:a14="http://schemas.microsoft.com/office/drawing/2010/main" val="0"/>
+              </a:ext>
+            </a:extLst>
+          </a:blip>
+          <a:stretch>
+            <a:fillRect/>
+          </a:stretch>
+        </p:blipFill>
+        <p:spPr>
+          <a:xfrm>
+            <a:off x="7279815" y="3749336"/>
+            <a:ext cx="101600" cy="101600"/>
+          </a:xfrm>
+          <a:prstGeom prst="rect">
+            <a:avLst/>
+          </a:prstGeom>
+        </p:spPr>
+      </p:pic>
+      <p:pic>
+        <p:nvPicPr>
+          <p:cNvPr id="6" name="Image 5" descr="latex-image-1.pdf"/>
+          <p:cNvPicPr>
+            <a:picLocks noChangeAspect="1"/>
+          </p:cNvPicPr>
+          <p:nvPr/>
+        </p:nvPicPr>
+        <p:blipFill>
+          <a:blip r:embed="rId4">
+            <a:extLst>
+              <a:ext uri="{28A0092B-C50C-407E-A947-70E740481C1C}">
+                <a14:useLocalDpi xmlns:a14="http://schemas.microsoft.com/office/drawing/2010/main" val="0"/>
+              </a:ext>
+            </a:extLst>
+          </a:blip>
+          <a:stretch>
+            <a:fillRect/>
+          </a:stretch>
+        </p:blipFill>
+        <p:spPr>
+          <a:xfrm>
+            <a:off x="7087228" y="3419791"/>
+            <a:ext cx="139700" cy="101600"/>
+          </a:xfrm>
+          <a:prstGeom prst="rect">
+            <a:avLst/>
+          </a:prstGeom>
+        </p:spPr>
+      </p:pic>
+      <p:cxnSp>
+        <p:nvCxnSpPr>
+          <p:cNvPr id="37" name="Connecteur droit avec flèche 36"/>
+          <p:cNvCxnSpPr/>
+          <p:nvPr/>
+        </p:nvCxnSpPr>
+        <p:spPr>
+          <a:xfrm>
+            <a:off x="7658324" y="3354768"/>
+            <a:ext cx="288000" cy="0"/>
+          </a:xfrm>
+          <a:prstGeom prst="straightConnector1">
+            <a:avLst/>
+          </a:prstGeom>
+          <a:ln w="22225">
+            <a:solidFill>
+              <a:schemeClr val="tx2"/>
+            </a:solidFill>
+            <a:headEnd type="triangle"/>
+            <a:tailEnd type="none"/>
+          </a:ln>
+          <a:effectLst/>
+        </p:spPr>
+        <p:style>
+          <a:lnRef idx="2">
+            <a:schemeClr val="accent1"/>
+          </a:lnRef>
+          <a:fillRef idx="0">
+            <a:schemeClr val="accent1"/>
+          </a:fillRef>
+          <a:effectRef idx="1">
+            <a:schemeClr val="accent1"/>
+          </a:effectRef>
+          <a:fontRef idx="minor">
+            <a:schemeClr val="tx1"/>
+          </a:fontRef>
+        </p:style>
+      </p:cxnSp>
+      <p:cxnSp>
+        <p:nvCxnSpPr>
+          <p:cNvPr id="47" name="Connecteur droit avec flèche 46"/>
+          <p:cNvCxnSpPr/>
+          <p:nvPr/>
+        </p:nvCxnSpPr>
+        <p:spPr>
+          <a:xfrm flipV="1">
+            <a:off x="7947313" y="3199590"/>
+            <a:ext cx="108000" cy="155178"/>
+          </a:xfrm>
+          <a:prstGeom prst="straightConnector1">
+            <a:avLst/>
+          </a:prstGeom>
+          <a:ln w="22225">
+            <a:solidFill>
+              <a:srgbClr val="FF0000"/>
+            </a:solidFill>
+            <a:tailEnd type="triangle"/>
+          </a:ln>
+          <a:effectLst/>
+        </p:spPr>
+        <p:style>
+          <a:lnRef idx="2">
+            <a:schemeClr val="accent1"/>
+          </a:lnRef>
+          <a:fillRef idx="0">
+            <a:schemeClr val="accent1"/>
+          </a:fillRef>
+          <a:effectRef idx="1">
+            <a:schemeClr val="accent1"/>
+          </a:effectRef>
+          <a:fontRef idx="minor">
+            <a:schemeClr val="tx1"/>
+          </a:fontRef>
+        </p:style>
+      </p:cxnSp>
+      <p:cxnSp>
+        <p:nvCxnSpPr>
+          <p:cNvPr id="48" name="Connecteur droit avec flèche 47"/>
+          <p:cNvCxnSpPr/>
+          <p:nvPr/>
+        </p:nvCxnSpPr>
+        <p:spPr>
+          <a:xfrm>
+            <a:off x="7947313" y="3354768"/>
+            <a:ext cx="0" cy="289040"/>
+          </a:xfrm>
+          <a:prstGeom prst="straightConnector1">
+            <a:avLst/>
+          </a:prstGeom>
+          <a:ln w="22225">
+            <a:solidFill>
+              <a:srgbClr val="008000"/>
+            </a:solidFill>
+            <a:tailEnd type="triangle"/>
+          </a:ln>
+          <a:effectLst/>
+        </p:spPr>
+        <p:style>
+          <a:lnRef idx="2">
+            <a:schemeClr val="accent1"/>
+          </a:lnRef>
+          <a:fillRef idx="0">
+            <a:schemeClr val="accent1"/>
+          </a:fillRef>
+          <a:effectRef idx="1">
+            <a:schemeClr val="accent1"/>
+          </a:effectRef>
+          <a:fontRef idx="minor">
+            <a:schemeClr val="tx1"/>
+          </a:fontRef>
+        </p:style>
+      </p:cxnSp>
+      <p:pic>
+        <p:nvPicPr>
+          <p:cNvPr id="28" name="Image 27" descr="latex-image-1.pdf"/>
+          <p:cNvPicPr>
+            <a:picLocks noChangeAspect="1"/>
+          </p:cNvPicPr>
+          <p:nvPr/>
+        </p:nvPicPr>
+        <p:blipFill>
+          <a:blip r:embed="rId5">
+            <a:extLst>
+              <a:ext uri="{28A0092B-C50C-407E-A947-70E740481C1C}">
+                <a14:useLocalDpi xmlns:a14="http://schemas.microsoft.com/office/drawing/2010/main" val="0"/>
+              </a:ext>
+            </a:extLst>
+          </a:blip>
+          <a:stretch>
+            <a:fillRect/>
+          </a:stretch>
+        </p:blipFill>
+        <p:spPr>
+          <a:xfrm>
+            <a:off x="8026838" y="3004742"/>
+            <a:ext cx="114300" cy="101600"/>
+          </a:xfrm>
+          <a:prstGeom prst="rect">
+            <a:avLst/>
+          </a:prstGeom>
+        </p:spPr>
+      </p:pic>
+      <p:pic>
+        <p:nvPicPr>
+          <p:cNvPr id="29" name="Image 28" descr="latex-image-1.pdf"/>
+          <p:cNvPicPr>
+            <a:picLocks noChangeAspect="1"/>
+          </p:cNvPicPr>
+          <p:nvPr/>
+        </p:nvPicPr>
+        <p:blipFill>
+          <a:blip r:embed="rId6">
+            <a:extLst>
+              <a:ext uri="{28A0092B-C50C-407E-A947-70E740481C1C}">
+                <a14:useLocalDpi xmlns:a14="http://schemas.microsoft.com/office/drawing/2010/main" val="0"/>
+              </a:ext>
+            </a:extLst>
+          </a:blip>
+          <a:stretch>
+            <a:fillRect/>
+          </a:stretch>
+        </p:blipFill>
+        <p:spPr>
+          <a:xfrm>
+            <a:off x="8004058" y="3643808"/>
+            <a:ext cx="101600" cy="139700"/>
+          </a:xfrm>
+          <a:prstGeom prst="rect">
+            <a:avLst/>
+          </a:prstGeom>
+        </p:spPr>
+      </p:pic>
+      <p:pic>
+        <p:nvPicPr>
+          <p:cNvPr id="30" name="Image 29" descr="latex-image-1.pdf"/>
+          <p:cNvPicPr>
+            <a:picLocks noChangeAspect="1"/>
+          </p:cNvPicPr>
+          <p:nvPr/>
+        </p:nvPicPr>
+        <p:blipFill>
+          <a:blip r:embed="rId7">
+            <a:extLst>
+              <a:ext uri="{28A0092B-C50C-407E-A947-70E740481C1C}">
+                <a14:useLocalDpi xmlns:a14="http://schemas.microsoft.com/office/drawing/2010/main" val="0"/>
+              </a:ext>
+            </a:extLst>
+          </a:blip>
+          <a:stretch>
+            <a:fillRect/>
+          </a:stretch>
+        </p:blipFill>
+        <p:spPr>
+          <a:xfrm>
+            <a:off x="7584129" y="3388213"/>
+            <a:ext cx="101600" cy="101600"/>
+          </a:xfrm>
+          <a:prstGeom prst="rect">
+            <a:avLst/>
+          </a:prstGeom>
+        </p:spPr>
+      </p:pic>
+      <p:cxnSp>
+        <p:nvCxnSpPr>
+          <p:cNvPr id="67" name="Connecteur droit 66"/>
+          <p:cNvCxnSpPr/>
+          <p:nvPr/>
+        </p:nvCxnSpPr>
+        <p:spPr>
+          <a:xfrm flipH="1">
+            <a:off x="7803452" y="3103531"/>
+            <a:ext cx="320408" cy="457130"/>
+          </a:xfrm>
+          <a:prstGeom prst="line">
+            <a:avLst/>
+          </a:prstGeom>
+          <a:ln w="3175">
+            <a:solidFill>
+              <a:schemeClr val="tx1"/>
+            </a:solidFill>
+            <a:prstDash val="dashDot"/>
+          </a:ln>
+          <a:effectLst/>
+        </p:spPr>
+        <p:style>
+          <a:lnRef idx="2">
+            <a:schemeClr val="accent1"/>
+          </a:lnRef>
+          <a:fillRef idx="0">
+            <a:schemeClr val="accent1"/>
+          </a:fillRef>
+          <a:effectRef idx="1">
+            <a:schemeClr val="accent1"/>
+          </a:effectRef>
+          <a:fontRef idx="minor">
+            <a:schemeClr val="tx1"/>
+          </a:fontRef>
+        </p:style>
+      </p:cxnSp>
+      <p:cxnSp>
+        <p:nvCxnSpPr>
+          <p:cNvPr id="68" name="Connecteur droit 67"/>
+          <p:cNvCxnSpPr/>
+          <p:nvPr/>
+        </p:nvCxnSpPr>
+        <p:spPr>
+          <a:xfrm flipV="1">
+            <a:off x="7803452" y="3560661"/>
+            <a:ext cx="0" cy="1060230"/>
+          </a:xfrm>
+          <a:prstGeom prst="line">
+            <a:avLst/>
+          </a:prstGeom>
+          <a:ln w="3175">
+            <a:solidFill>
+              <a:schemeClr val="tx1"/>
+            </a:solidFill>
+            <a:prstDash val="dashDot"/>
+          </a:ln>
+          <a:effectLst/>
+        </p:spPr>
+        <p:style>
+          <a:lnRef idx="2">
+            <a:schemeClr val="accent1"/>
+          </a:lnRef>
+          <a:fillRef idx="0">
+            <a:schemeClr val="accent1"/>
+          </a:fillRef>
+          <a:effectRef idx="1">
+            <a:schemeClr val="accent1"/>
+          </a:effectRef>
+          <a:fontRef idx="minor">
+            <a:schemeClr val="tx1"/>
+          </a:fontRef>
+        </p:style>
+      </p:cxnSp>
+      <p:cxnSp>
+        <p:nvCxnSpPr>
+          <p:cNvPr id="70" name="Connecteur droit 69"/>
+          <p:cNvCxnSpPr/>
+          <p:nvPr/>
+        </p:nvCxnSpPr>
+        <p:spPr>
+          <a:xfrm flipH="1">
+            <a:off x="7803454" y="4430578"/>
+            <a:ext cx="126653" cy="190313"/>
+          </a:xfrm>
+          <a:prstGeom prst="line">
+            <a:avLst/>
+          </a:prstGeom>
+          <a:ln w="3175">
+            <a:solidFill>
+              <a:schemeClr val="tx1"/>
+            </a:solidFill>
+            <a:prstDash val="dashDot"/>
+          </a:ln>
+          <a:effectLst/>
+        </p:spPr>
+        <p:style>
+          <a:lnRef idx="2">
+            <a:schemeClr val="accent1"/>
+          </a:lnRef>
+          <a:fillRef idx="0">
+            <a:schemeClr val="accent1"/>
+          </a:fillRef>
+          <a:effectRef idx="1">
+            <a:schemeClr val="accent1"/>
+          </a:effectRef>
+          <a:fontRef idx="minor">
+            <a:schemeClr val="tx1"/>
+          </a:fontRef>
+        </p:style>
+      </p:cxnSp>
+      <p:cxnSp>
+        <p:nvCxnSpPr>
+          <p:cNvPr id="71" name="Connecteur droit 70"/>
+          <p:cNvCxnSpPr/>
+          <p:nvPr/>
+        </p:nvCxnSpPr>
+        <p:spPr>
+          <a:xfrm>
+            <a:off x="8121623" y="3103531"/>
+            <a:ext cx="0" cy="193776"/>
+          </a:xfrm>
+          <a:prstGeom prst="line">
+            <a:avLst/>
+          </a:prstGeom>
+          <a:ln w="3175">
+            <a:solidFill>
+              <a:schemeClr val="tx1"/>
+            </a:solidFill>
+            <a:prstDash val="dashDot"/>
+          </a:ln>
+          <a:effectLst/>
+        </p:spPr>
+        <p:style>
+          <a:lnRef idx="2">
+            <a:schemeClr val="accent1"/>
+          </a:lnRef>
+          <a:fillRef idx="0">
+            <a:schemeClr val="accent1"/>
+          </a:fillRef>
+          <a:effectRef idx="1">
+            <a:schemeClr val="accent1"/>
+          </a:effectRef>
+          <a:fontRef idx="minor">
+            <a:schemeClr val="tx1"/>
+          </a:fontRef>
+        </p:style>
+      </p:cxnSp>
+      <p:cxnSp>
+        <p:nvCxnSpPr>
+          <p:cNvPr id="75" name="Connecteur droit 74"/>
+          <p:cNvCxnSpPr/>
+          <p:nvPr/>
+        </p:nvCxnSpPr>
+        <p:spPr>
+          <a:xfrm>
+            <a:off x="7565431" y="3354768"/>
+            <a:ext cx="768261" cy="0"/>
+          </a:xfrm>
+          <a:prstGeom prst="line">
+            <a:avLst/>
+          </a:prstGeom>
+          <a:ln w="3175">
+            <a:solidFill>
+              <a:schemeClr val="tx1"/>
+            </a:solidFill>
+            <a:prstDash val="dashDot"/>
+          </a:ln>
+          <a:effectLst/>
+        </p:spPr>
+        <p:style>
+          <a:lnRef idx="2">
+            <a:schemeClr val="accent1"/>
+          </a:lnRef>
+          <a:fillRef idx="0">
+            <a:schemeClr val="accent1"/>
+          </a:fillRef>
+          <a:effectRef idx="1">
+            <a:schemeClr val="accent1"/>
+          </a:effectRef>
+          <a:fontRef idx="minor">
+            <a:schemeClr val="tx1"/>
+          </a:fontRef>
+        </p:style>
+      </p:cxnSp>
+      <p:sp>
+        <p:nvSpPr>
+          <p:cNvPr id="51" name="ZoneTexte 50"/>
+          <p:cNvSpPr txBox="1"/>
+          <p:nvPr/>
+        </p:nvSpPr>
+        <p:spPr>
+          <a:xfrm>
+            <a:off x="5998489" y="4783411"/>
+            <a:ext cx="1096987" cy="307777"/>
+          </a:xfrm>
+          <a:prstGeom prst="rect">
+            <a:avLst/>
+          </a:prstGeom>
+          <a:noFill/>
+        </p:spPr>
+        <p:txBody>
+          <a:bodyPr wrap="none" rtlCol="0">
+            <a:spAutoFit/>
+          </a:bodyPr>
+          <a:lstStyle/>
+          <a:p>
+            <a:pPr algn="ctr"/>
+            <a:r>
+              <a:rPr lang="en-GB" sz="1400" dirty="0"/>
+              <a:t>v</a:t>
+            </a:r>
+            <a:r>
+              <a:rPr lang="en-GB" sz="1400" dirty="0" smtClean="0"/>
+              <a:t>irtual plane</a:t>
+            </a:r>
+            <a:endParaRPr lang="en-GB" sz="1400" dirty="0"/>
+          </a:p>
+        </p:txBody>
+      </p:sp>
+      <p:cxnSp>
+        <p:nvCxnSpPr>
+          <p:cNvPr id="52" name="Connecteur droit avec flèche 51"/>
+          <p:cNvCxnSpPr>
+            <a:stCxn id="51" idx="3"/>
+          </p:cNvCxnSpPr>
+          <p:nvPr/>
+        </p:nvCxnSpPr>
+        <p:spPr>
+          <a:xfrm flipV="1">
+            <a:off x="7095476" y="4630772"/>
+            <a:ext cx="707978" cy="306528"/>
+          </a:xfrm>
+          <a:prstGeom prst="straightConnector1">
+            <a:avLst/>
+          </a:prstGeom>
+          <a:ln w="9525">
+            <a:solidFill>
+              <a:schemeClr val="tx1"/>
+            </a:solidFill>
+            <a:headEnd type="none"/>
+            <a:tailEnd type="stealth"/>
+          </a:ln>
+          <a:effectLst/>
+        </p:spPr>
+        <p:style>
+          <a:lnRef idx="2">
+            <a:schemeClr val="accent1"/>
+          </a:lnRef>
+          <a:fillRef idx="0">
+            <a:schemeClr val="accent1"/>
+          </a:fillRef>
+          <a:effectRef idx="1">
+            <a:schemeClr val="accent1"/>
+          </a:effectRef>
+          <a:fontRef idx="minor">
+            <a:schemeClr val="tx1"/>
+          </a:fontRef>
+        </p:style>
+      </p:cxnSp>
+    </p:spTree>
+    <p:extLst>
+      <p:ext uri="{BB962C8B-B14F-4D97-AF65-F5344CB8AC3E}">
+        <p14:creationId xmlns:p14="http://schemas.microsoft.com/office/powerpoint/2010/main" val="2363675820"/>
+      </p:ext>
+    </p:extLst>
+  </p:cSld>
+  <p:clrMapOvr>
+    <a:masterClrMapping/>
+  </p:clrMapOvr>
+  <p:timing>
+    <p:tnLst>
+      <p:par>
+        <p:cTn xmlns:p14="http://schemas.microsoft.com/office/powerpoint/2010/main" id="1" dur="indefinite" restart="never" nodeType="tmRoot"/>
+      </p:par>
+    </p:tnLst>
+  </p:timing>
 </p:sld>
 </file>
 
@@ -13452,7 +17023,15 @@
       </a:style>
     </a:spDef>
     <a:lnDef>
-      <a:spPr/>
+      <a:spPr>
+        <a:ln w="22225">
+          <a:solidFill>
+            <a:schemeClr val="tx1"/>
+          </a:solidFill>
+          <a:tailEnd type="triangle"/>
+        </a:ln>
+        <a:effectLst/>
+      </a:spPr>
       <a:bodyPr/>
       <a:lstStyle/>
       <a:style>

</xml_diff>

<commit_message>
Fix dimX and dimY inversion in 3D post-scan images
</commit_message>
<xml_diff>
--- a/doc/image/img-usProbeSettings.pptx
+++ b/doc/image/img-usProbeSettings.pptx
@@ -296,7 +296,7 @@
           <a:p>
             <a:fld id="{49D103BC-6271-874A-98DE-6B966EAA6738}" type="datetimeFigureOut">
               <a:rPr lang="fr-FR" smtClean="0"/>
-              <a:t>14/11/16</a:t>
+              <a:t>13/02/17</a:t>
             </a:fld>
             <a:endParaRPr lang="fr-FR"/>
           </a:p>
@@ -466,7 +466,7 @@
           <a:p>
             <a:fld id="{49D103BC-6271-874A-98DE-6B966EAA6738}" type="datetimeFigureOut">
               <a:rPr lang="fr-FR" smtClean="0"/>
-              <a:t>14/11/16</a:t>
+              <a:t>13/02/17</a:t>
             </a:fld>
             <a:endParaRPr lang="fr-FR"/>
           </a:p>
@@ -646,7 +646,7 @@
           <a:p>
             <a:fld id="{49D103BC-6271-874A-98DE-6B966EAA6738}" type="datetimeFigureOut">
               <a:rPr lang="fr-FR" smtClean="0"/>
-              <a:t>14/11/16</a:t>
+              <a:t>13/02/17</a:t>
             </a:fld>
             <a:endParaRPr lang="fr-FR"/>
           </a:p>
@@ -816,7 +816,7 @@
           <a:p>
             <a:fld id="{49D103BC-6271-874A-98DE-6B966EAA6738}" type="datetimeFigureOut">
               <a:rPr lang="fr-FR" smtClean="0"/>
-              <a:t>14/11/16</a:t>
+              <a:t>13/02/17</a:t>
             </a:fld>
             <a:endParaRPr lang="fr-FR"/>
           </a:p>
@@ -1062,7 +1062,7 @@
           <a:p>
             <a:fld id="{49D103BC-6271-874A-98DE-6B966EAA6738}" type="datetimeFigureOut">
               <a:rPr lang="fr-FR" smtClean="0"/>
-              <a:t>14/11/16</a:t>
+              <a:t>13/02/17</a:t>
             </a:fld>
             <a:endParaRPr lang="fr-FR"/>
           </a:p>
@@ -1350,7 +1350,7 @@
           <a:p>
             <a:fld id="{49D103BC-6271-874A-98DE-6B966EAA6738}" type="datetimeFigureOut">
               <a:rPr lang="fr-FR" smtClean="0"/>
-              <a:t>14/11/16</a:t>
+              <a:t>13/02/17</a:t>
             </a:fld>
             <a:endParaRPr lang="fr-FR"/>
           </a:p>
@@ -1772,7 +1772,7 @@
           <a:p>
             <a:fld id="{49D103BC-6271-874A-98DE-6B966EAA6738}" type="datetimeFigureOut">
               <a:rPr lang="fr-FR" smtClean="0"/>
-              <a:t>14/11/16</a:t>
+              <a:t>13/02/17</a:t>
             </a:fld>
             <a:endParaRPr lang="fr-FR"/>
           </a:p>
@@ -1890,7 +1890,7 @@
           <a:p>
             <a:fld id="{49D103BC-6271-874A-98DE-6B966EAA6738}" type="datetimeFigureOut">
               <a:rPr lang="fr-FR" smtClean="0"/>
-              <a:t>14/11/16</a:t>
+              <a:t>13/02/17</a:t>
             </a:fld>
             <a:endParaRPr lang="fr-FR"/>
           </a:p>
@@ -1985,7 +1985,7 @@
           <a:p>
             <a:fld id="{49D103BC-6271-874A-98DE-6B966EAA6738}" type="datetimeFigureOut">
               <a:rPr lang="fr-FR" smtClean="0"/>
-              <a:t>14/11/16</a:t>
+              <a:t>13/02/17</a:t>
             </a:fld>
             <a:endParaRPr lang="fr-FR"/>
           </a:p>
@@ -2262,7 +2262,7 @@
           <a:p>
             <a:fld id="{49D103BC-6271-874A-98DE-6B966EAA6738}" type="datetimeFigureOut">
               <a:rPr lang="fr-FR" smtClean="0"/>
-              <a:t>14/11/16</a:t>
+              <a:t>13/02/17</a:t>
             </a:fld>
             <a:endParaRPr lang="fr-FR"/>
           </a:p>
@@ -2515,7 +2515,7 @@
           <a:p>
             <a:fld id="{49D103BC-6271-874A-98DE-6B966EAA6738}" type="datetimeFigureOut">
               <a:rPr lang="fr-FR" smtClean="0"/>
-              <a:t>14/11/16</a:t>
+              <a:t>13/02/17</a:t>
             </a:fld>
             <a:endParaRPr lang="fr-FR"/>
           </a:p>
@@ -2728,7 +2728,7 @@
           <a:p>
             <a:fld id="{49D103BC-6271-874A-98DE-6B966EAA6738}" type="datetimeFigureOut">
               <a:rPr lang="fr-FR" smtClean="0"/>
-              <a:t>14/11/16</a:t>
+              <a:t>13/02/17</a:t>
             </a:fld>
             <a:endParaRPr lang="fr-FR"/>
           </a:p>
@@ -5548,11 +5548,7 @@
               <a:p>
                 <a:r>
                   <a:rPr lang="en-GB" sz="1400" dirty="0" smtClean="0"/>
-                  <a:t>       </a:t>
-                </a:r>
-                <a:r>
-                  <a:rPr lang="en-GB" sz="1400" dirty="0" smtClean="0"/>
-                  <a:t>: Transducer radius (m) </a:t>
+                  <a:t>       : Transducer radius (m) </a:t>
                 </a:r>
               </a:p>
             </p:txBody>
@@ -7533,11 +7529,7 @@
             <a:p>
               <a:r>
                 <a:rPr lang="en-GB" sz="1400" dirty="0" smtClean="0"/>
-                <a:t> : Axial resolution (m</a:t>
-              </a:r>
-              <a:r>
-                <a:rPr lang="en-GB" sz="1400" dirty="0" smtClean="0"/>
-                <a:t>) between two RF samples</a:t>
+                <a:t> : Axial resolution (m) between two RF samples</a:t>
               </a:r>
               <a:endParaRPr lang="en-GB" sz="1400" dirty="0"/>
             </a:p>
@@ -13344,11 +13336,7 @@
             <a:p>
               <a:r>
                 <a:rPr lang="en-GB" sz="1400" dirty="0" smtClean="0"/>
-                <a:t> : Axial resolution (m</a:t>
-              </a:r>
-              <a:r>
-                <a:rPr lang="en-GB" sz="1400" dirty="0" smtClean="0"/>
-                <a:t>) between two B-Mode samples</a:t>
+                <a:t> : Axial resolution (m) between two B-Mode samples</a:t>
               </a:r>
               <a:endParaRPr lang="en-GB" sz="1400" dirty="0"/>
             </a:p>
@@ -18404,21 +18392,8 @@
               <a:pPr algn="ctr"/>
               <a:r>
                 <a:rPr lang="en-GB" sz="1400" b="1" dirty="0" smtClean="0"/>
-                <a:t>Linear</a:t>
+                <a:t>Linear probe motor</a:t>
               </a:r>
-              <a:r>
-                <a:rPr lang="en-GB" sz="1400" b="1" dirty="0" smtClean="0"/>
-                <a:t> </a:t>
-              </a:r>
-              <a:r>
-                <a:rPr lang="en-GB" sz="1400" b="1" dirty="0" smtClean="0"/>
-                <a:t>probe </a:t>
-              </a:r>
-              <a:r>
-                <a:rPr lang="en-GB" sz="1400" b="1" dirty="0" smtClean="0"/>
-                <a:t>motor</a:t>
-              </a:r>
-              <a:endParaRPr lang="en-GB" sz="1400" b="1" dirty="0" smtClean="0"/>
             </a:p>
           </p:txBody>
         </p:sp>
@@ -18446,11 +18421,7 @@
             <a:p>
               <a:r>
                 <a:rPr lang="en-GB" sz="1400" dirty="0" smtClean="0"/>
-                <a:t>: Frame pitch </a:t>
-              </a:r>
-              <a:r>
-                <a:rPr lang="en-GB" sz="1400" dirty="0" smtClean="0"/>
-                <a:t>(m)</a:t>
+                <a:t>: Frame pitch (m)</a:t>
               </a:r>
               <a:endParaRPr lang="en-GB" sz="1400" dirty="0"/>
             </a:p>
@@ -20073,13 +20044,8 @@
               <a:pPr algn="ctr"/>
               <a:r>
                 <a:rPr lang="en-GB" sz="1400" b="1" dirty="0" smtClean="0"/>
-                <a:t>Tilting probe </a:t>
+                <a:t>Tilting probe motor</a:t>
               </a:r>
-              <a:r>
-                <a:rPr lang="en-GB" sz="1400" b="1" dirty="0" smtClean="0"/>
-                <a:t>motor</a:t>
-              </a:r>
-              <a:endParaRPr lang="en-GB" sz="1400" b="1" dirty="0" smtClean="0"/>
             </a:p>
           </p:txBody>
         </p:sp>
@@ -20137,19 +20103,7 @@
             <a:p>
               <a:r>
                 <a:rPr lang="en-GB" sz="1400" dirty="0" smtClean="0"/>
-                <a:t>: </a:t>
-              </a:r>
-              <a:r>
-                <a:rPr lang="en-GB" sz="1400" dirty="0" smtClean="0"/>
-                <a:t>Motor</a:t>
-              </a:r>
-              <a:r>
-                <a:rPr lang="en-GB" sz="1400" dirty="0" smtClean="0"/>
-                <a:t> </a:t>
-              </a:r>
-              <a:r>
-                <a:rPr lang="en-GB" sz="1400" dirty="0" smtClean="0"/>
-                <a:t>radius (m) </a:t>
+                <a:t>: Motor radius (m) </a:t>
               </a:r>
             </a:p>
           </p:txBody>
@@ -24196,7 +24150,6 @@
                 <a:rPr lang="en-GB" sz="1400" dirty="0" smtClean="0"/>
                 <a:t>im Y</a:t>
               </a:r>
-              <a:endParaRPr lang="en-GB" sz="1400" dirty="0" smtClean="0"/>
             </a:p>
           </p:txBody>
         </p:sp>
@@ -24928,15 +24881,7 @@
                 <a:pPr algn="ctr"/>
                 <a:r>
                   <a:rPr lang="en-GB" sz="1400" dirty="0" smtClean="0"/>
-                  <a:t>Frame </a:t>
-                </a:r>
-                <a:r>
-                  <a:rPr lang="en-GB" sz="1400" dirty="0" smtClean="0"/>
-                  <a:t>n</a:t>
-                </a:r>
-                <a:r>
-                  <a:rPr lang="en-GB" sz="1400" dirty="0" smtClean="0"/>
-                  <a:t>umber</a:t>
+                  <a:t>Frame number</a:t>
                 </a:r>
               </a:p>
               <a:p>
@@ -28048,7 +27993,6 @@
                 <a:rPr lang="en-GB" sz="1400" dirty="0" smtClean="0"/>
                 <a:t>im Y</a:t>
               </a:r>
-              <a:endParaRPr lang="en-GB" sz="1400" dirty="0" smtClean="0"/>
             </a:p>
           </p:txBody>
         </p:sp>
@@ -28098,10 +28042,10 @@
         </p:nvGrpSpPr>
         <p:grpSpPr>
           <a:xfrm>
-            <a:off x="4609570" y="2254527"/>
-            <a:ext cx="4452406" cy="4169057"/>
-            <a:chOff x="4609570" y="2254527"/>
-            <a:chExt cx="4452406" cy="4169057"/>
+            <a:off x="4610747" y="2254527"/>
+            <a:ext cx="4451229" cy="4169057"/>
+            <a:chOff x="4610747" y="2254527"/>
+            <a:chExt cx="4451229" cy="4169057"/>
           </a:xfrm>
         </p:grpSpPr>
         <p:grpSp>
@@ -28112,10 +28056,10 @@
           </p:nvGrpSpPr>
           <p:grpSpPr>
             <a:xfrm>
-              <a:off x="4609570" y="2254527"/>
-              <a:ext cx="4452406" cy="4169057"/>
-              <a:chOff x="4417135" y="2254527"/>
-              <a:chExt cx="4452406" cy="4169057"/>
+              <a:off x="4610747" y="2254527"/>
+              <a:ext cx="4451229" cy="4169057"/>
+              <a:chOff x="4418312" y="2254527"/>
+              <a:chExt cx="4451229" cy="4169057"/>
             </a:xfrm>
           </p:grpSpPr>
           <p:cxnSp>
@@ -29532,8 +29476,8 @@
             </p:nvSpPr>
             <p:spPr>
               <a:xfrm>
-                <a:off x="4417135" y="4723013"/>
-                <a:ext cx="597389" cy="307777"/>
+                <a:off x="4418312" y="4723013"/>
+                <a:ext cx="595035" cy="307777"/>
               </a:xfrm>
               <a:prstGeom prst="rect">
                 <a:avLst/>
@@ -29553,7 +29497,7 @@
                 </a:r>
                 <a:r>
                   <a:rPr lang="en-GB" sz="1400" dirty="0" smtClean="0"/>
-                  <a:t>im X</a:t>
+                  <a:t>im Y</a:t>
                 </a:r>
                 <a:endParaRPr lang="en-GB" sz="1400" dirty="0"/>
               </a:p>
@@ -29678,8 +29622,8 @@
             </p:nvSpPr>
             <p:spPr>
               <a:xfrm>
-                <a:off x="6366122" y="5569049"/>
-                <a:ext cx="595035" cy="307777"/>
+                <a:off x="6364945" y="5569049"/>
+                <a:ext cx="597389" cy="307777"/>
               </a:xfrm>
               <a:prstGeom prst="rect">
                 <a:avLst/>
@@ -29699,7 +29643,7 @@
                 </a:r>
                 <a:r>
                   <a:rPr lang="en-GB" sz="1400" dirty="0" smtClean="0"/>
-                  <a:t>im Y</a:t>
+                  <a:t>im X</a:t>
                 </a:r>
                 <a:endParaRPr lang="en-GB" sz="1400" dirty="0" smtClean="0"/>
               </a:p>
@@ -29821,10 +29765,10 @@
         </p:nvGrpSpPr>
         <p:grpSpPr>
           <a:xfrm>
-            <a:off x="-37358" y="1320439"/>
-            <a:ext cx="4941540" cy="5105137"/>
-            <a:chOff x="-37358" y="1320439"/>
-            <a:chExt cx="4941540" cy="5105137"/>
+            <a:off x="-36181" y="1320439"/>
+            <a:ext cx="4940363" cy="5105137"/>
+            <a:chOff x="-36181" y="1320439"/>
+            <a:chExt cx="4940363" cy="5105137"/>
           </a:xfrm>
         </p:grpSpPr>
         <p:grpSp>
@@ -32521,10 +32465,10 @@
           </p:nvGrpSpPr>
           <p:grpSpPr>
             <a:xfrm>
-              <a:off x="-37358" y="3740884"/>
-              <a:ext cx="4472674" cy="2684692"/>
-              <a:chOff x="-37358" y="3740884"/>
-              <a:chExt cx="4472674" cy="2684692"/>
+              <a:off x="-36181" y="3740884"/>
+              <a:ext cx="4471497" cy="2684692"/>
+              <a:chOff x="-36181" y="3740884"/>
+              <a:chExt cx="4471497" cy="2684692"/>
             </a:xfrm>
           </p:grpSpPr>
           <p:cxnSp>
@@ -32573,8 +32517,8 @@
             </p:nvSpPr>
             <p:spPr>
               <a:xfrm>
-                <a:off x="-37358" y="4721477"/>
-                <a:ext cx="597389" cy="307777"/>
+                <a:off x="-36181" y="4721477"/>
+                <a:ext cx="595035" cy="307777"/>
               </a:xfrm>
               <a:prstGeom prst="rect">
                 <a:avLst/>
@@ -32594,7 +32538,7 @@
                 </a:r>
                 <a:r>
                   <a:rPr lang="en-GB" sz="1400" dirty="0" smtClean="0"/>
-                  <a:t>im X</a:t>
+                  <a:t>im Y</a:t>
                 </a:r>
                 <a:endParaRPr lang="en-GB" sz="1400" dirty="0"/>
               </a:p>
@@ -32719,8 +32663,8 @@
             </p:nvSpPr>
             <p:spPr>
               <a:xfrm>
-                <a:off x="1931897" y="5571041"/>
-                <a:ext cx="595035" cy="307777"/>
+                <a:off x="1930720" y="5571041"/>
+                <a:ext cx="597389" cy="307777"/>
               </a:xfrm>
               <a:prstGeom prst="rect">
                 <a:avLst/>
@@ -32740,7 +32684,7 @@
                 </a:r>
                 <a:r>
                   <a:rPr lang="en-GB" sz="1400" dirty="0" smtClean="0"/>
-                  <a:t>im Y</a:t>
+                  <a:t>im X</a:t>
                 </a:r>
                 <a:endParaRPr lang="en-GB" sz="1400" dirty="0" smtClean="0"/>
               </a:p>
@@ -32899,10 +32843,10 @@
         </p:nvGrpSpPr>
         <p:grpSpPr>
           <a:xfrm>
-            <a:off x="775526" y="1368000"/>
-            <a:ext cx="3939248" cy="4096704"/>
-            <a:chOff x="2884504" y="1388732"/>
-            <a:chExt cx="3939248" cy="4096704"/>
+            <a:off x="776703" y="1368000"/>
+            <a:ext cx="3938071" cy="4096704"/>
+            <a:chOff x="2885681" y="1388732"/>
+            <a:chExt cx="3938071" cy="4096704"/>
           </a:xfrm>
         </p:grpSpPr>
         <p:sp>
@@ -34898,8 +34842,8 @@
           </p:nvSpPr>
           <p:spPr>
             <a:xfrm rot="2149157">
-              <a:off x="3947767" y="4771123"/>
-              <a:ext cx="595035" cy="307777"/>
+              <a:off x="3946590" y="4771123"/>
+              <a:ext cx="597389" cy="307777"/>
             </a:xfrm>
             <a:prstGeom prst="rect">
               <a:avLst/>
@@ -34919,7 +34863,11 @@
               </a:r>
               <a:r>
                 <a:rPr lang="en-GB" sz="1400" dirty="0" smtClean="0"/>
-                <a:t>im Y</a:t>
+                <a:t>im </a:t>
+              </a:r>
+              <a:r>
+                <a:rPr lang="en-GB" sz="1400" dirty="0" smtClean="0"/>
+                <a:t>X</a:t>
               </a:r>
               <a:endParaRPr lang="en-GB" sz="1400" dirty="0"/>
             </a:p>
@@ -35081,8 +35029,8 @@
           </p:nvSpPr>
           <p:spPr>
             <a:xfrm>
-              <a:off x="2884504" y="3434972"/>
-              <a:ext cx="597389" cy="307777"/>
+              <a:off x="2885681" y="3434972"/>
+              <a:ext cx="595035" cy="307777"/>
             </a:xfrm>
             <a:prstGeom prst="rect">
               <a:avLst/>
@@ -35102,7 +35050,11 @@
               </a:r>
               <a:r>
                 <a:rPr lang="en-GB" sz="1400" dirty="0" smtClean="0"/>
-                <a:t>im X</a:t>
+                <a:t>im </a:t>
+              </a:r>
+              <a:r>
+                <a:rPr lang="en-GB" sz="1400" dirty="0" smtClean="0"/>
+                <a:t>Y</a:t>
               </a:r>
               <a:endParaRPr lang="en-GB" sz="1400" dirty="0"/>
             </a:p>
@@ -35181,15 +35133,7 @@
               <a:pPr algn="ctr"/>
               <a:r>
                 <a:rPr lang="en-GB" sz="1400" b="1" dirty="0" smtClean="0"/>
-                <a:t>Convex</a:t>
-              </a:r>
-              <a:r>
-                <a:rPr lang="en-GB" sz="1400" b="1" dirty="0" smtClean="0"/>
-                <a:t> </a:t>
-              </a:r>
-              <a:r>
-                <a:rPr lang="en-GB" sz="1400" b="1" dirty="0" smtClean="0"/>
-                <a:t>probe motor</a:t>
+                <a:t>Convex probe motor</a:t>
               </a:r>
             </a:p>
             <a:p>
@@ -35241,10 +35185,10 @@
         </p:nvGrpSpPr>
         <p:grpSpPr>
           <a:xfrm>
-            <a:off x="4821974" y="1368000"/>
-            <a:ext cx="3381907" cy="4096704"/>
-            <a:chOff x="2884504" y="1388732"/>
-            <a:chExt cx="3381907" cy="4096704"/>
+            <a:off x="4823151" y="1368000"/>
+            <a:ext cx="3380730" cy="4096704"/>
+            <a:chOff x="2885681" y="1388732"/>
+            <a:chExt cx="3380730" cy="4096704"/>
           </a:xfrm>
         </p:grpSpPr>
         <p:sp>
@@ -36932,8 +36876,8 @@
           </p:nvSpPr>
           <p:spPr>
             <a:xfrm rot="2149157">
-              <a:off x="3947767" y="4771123"/>
-              <a:ext cx="595035" cy="307777"/>
+              <a:off x="3946590" y="4771123"/>
+              <a:ext cx="597389" cy="307777"/>
             </a:xfrm>
             <a:prstGeom prst="rect">
               <a:avLst/>
@@ -36953,7 +36897,11 @@
               </a:r>
               <a:r>
                 <a:rPr lang="en-GB" sz="1400" dirty="0" smtClean="0"/>
-                <a:t>im Y</a:t>
+                <a:t>im </a:t>
+              </a:r>
+              <a:r>
+                <a:rPr lang="en-GB" sz="1400" dirty="0" smtClean="0"/>
+                <a:t>X</a:t>
               </a:r>
               <a:endParaRPr lang="en-GB" sz="1400" dirty="0"/>
             </a:p>
@@ -37115,8 +37063,8 @@
           </p:nvSpPr>
           <p:spPr>
             <a:xfrm>
-              <a:off x="2884504" y="3434972"/>
-              <a:ext cx="597389" cy="307777"/>
+              <a:off x="2885681" y="3434972"/>
+              <a:ext cx="595035" cy="307777"/>
             </a:xfrm>
             <a:prstGeom prst="rect">
               <a:avLst/>
@@ -37131,12 +37079,16 @@
             <a:p>
               <a:pPr algn="ctr"/>
               <a:r>
-                <a:rPr lang="en-GB" sz="1400" dirty="0"/>
+                <a:rPr lang="en-GB" sz="1400"/>
                 <a:t>d</a:t>
               </a:r>
               <a:r>
-                <a:rPr lang="en-GB" sz="1400" dirty="0" smtClean="0"/>
-                <a:t>im X</a:t>
+                <a:rPr lang="en-GB" sz="1400" smtClean="0"/>
+                <a:t>im </a:t>
+              </a:r>
+              <a:r>
+                <a:rPr lang="en-GB" sz="1400" smtClean="0"/>
+                <a:t>Y</a:t>
               </a:r>
               <a:endParaRPr lang="en-GB" sz="1400" dirty="0"/>
             </a:p>
@@ -37215,30 +37167,14 @@
               <a:pPr algn="ctr"/>
               <a:r>
                 <a:rPr lang="en-GB" sz="1400" b="1" dirty="0" smtClean="0"/>
-                <a:t>Convex</a:t>
-              </a:r>
-              <a:r>
-                <a:rPr lang="en-GB" sz="1400" b="1" dirty="0" smtClean="0"/>
-                <a:t> </a:t>
-              </a:r>
-              <a:r>
-                <a:rPr lang="en-GB" sz="1400" b="1" dirty="0" smtClean="0"/>
-                <a:t>probe motor</a:t>
+                <a:t>Convex probe motor</a:t>
               </a:r>
             </a:p>
             <a:p>
               <a:pPr algn="ctr"/>
               <a:r>
                 <a:rPr lang="en-GB" sz="1400" b="1" dirty="0" smtClean="0"/>
-                <a:t>Linear</a:t>
-              </a:r>
-              <a:r>
-                <a:rPr lang="en-GB" sz="1400" b="1" dirty="0" smtClean="0"/>
-                <a:t> </a:t>
-              </a:r>
-              <a:r>
-                <a:rPr lang="en-GB" sz="1400" b="1" dirty="0" smtClean="0"/>
-                <a:t>probe transducer</a:t>
+                <a:t>Linear probe transducer</a:t>
               </a:r>
             </a:p>
           </p:txBody>

</xml_diff>

<commit_message>
updating post-scan 3D frames schemas
</commit_message>
<xml_diff>
--- a/doc/image/img-usProbeSettings.pptx
+++ b/doc/image/img-usProbeSettings.pptx
@@ -749,7 +749,7 @@
           <a:p>
             <a:fld id="{49D103BC-6271-874A-98DE-6B966EAA6738}" type="datetimeFigureOut">
               <a:rPr lang="fr-FR" smtClean="0"/>
-              <a:t>05/02/2018</a:t>
+              <a:t>06/02/2018</a:t>
             </a:fld>
             <a:endParaRPr lang="fr-FR"/>
           </a:p>
@@ -919,7 +919,7 @@
           <a:p>
             <a:fld id="{49D103BC-6271-874A-98DE-6B966EAA6738}" type="datetimeFigureOut">
               <a:rPr lang="fr-FR" smtClean="0"/>
-              <a:t>05/02/2018</a:t>
+              <a:t>06/02/2018</a:t>
             </a:fld>
             <a:endParaRPr lang="fr-FR"/>
           </a:p>
@@ -1099,7 +1099,7 @@
           <a:p>
             <a:fld id="{49D103BC-6271-874A-98DE-6B966EAA6738}" type="datetimeFigureOut">
               <a:rPr lang="fr-FR" smtClean="0"/>
-              <a:t>05/02/2018</a:t>
+              <a:t>06/02/2018</a:t>
             </a:fld>
             <a:endParaRPr lang="fr-FR"/>
           </a:p>
@@ -1269,7 +1269,7 @@
           <a:p>
             <a:fld id="{49D103BC-6271-874A-98DE-6B966EAA6738}" type="datetimeFigureOut">
               <a:rPr lang="fr-FR" smtClean="0"/>
-              <a:t>05/02/2018</a:t>
+              <a:t>06/02/2018</a:t>
             </a:fld>
             <a:endParaRPr lang="fr-FR"/>
           </a:p>
@@ -1515,7 +1515,7 @@
           <a:p>
             <a:fld id="{49D103BC-6271-874A-98DE-6B966EAA6738}" type="datetimeFigureOut">
               <a:rPr lang="fr-FR" smtClean="0"/>
-              <a:t>05/02/2018</a:t>
+              <a:t>06/02/2018</a:t>
             </a:fld>
             <a:endParaRPr lang="fr-FR"/>
           </a:p>
@@ -1803,7 +1803,7 @@
           <a:p>
             <a:fld id="{49D103BC-6271-874A-98DE-6B966EAA6738}" type="datetimeFigureOut">
               <a:rPr lang="fr-FR" smtClean="0"/>
-              <a:t>05/02/2018</a:t>
+              <a:t>06/02/2018</a:t>
             </a:fld>
             <a:endParaRPr lang="fr-FR"/>
           </a:p>
@@ -2225,7 +2225,7 @@
           <a:p>
             <a:fld id="{49D103BC-6271-874A-98DE-6B966EAA6738}" type="datetimeFigureOut">
               <a:rPr lang="fr-FR" smtClean="0"/>
-              <a:t>05/02/2018</a:t>
+              <a:t>06/02/2018</a:t>
             </a:fld>
             <a:endParaRPr lang="fr-FR"/>
           </a:p>
@@ -2343,7 +2343,7 @@
           <a:p>
             <a:fld id="{49D103BC-6271-874A-98DE-6B966EAA6738}" type="datetimeFigureOut">
               <a:rPr lang="fr-FR" smtClean="0"/>
-              <a:t>05/02/2018</a:t>
+              <a:t>06/02/2018</a:t>
             </a:fld>
             <a:endParaRPr lang="fr-FR"/>
           </a:p>
@@ -2438,7 +2438,7 @@
           <a:p>
             <a:fld id="{49D103BC-6271-874A-98DE-6B966EAA6738}" type="datetimeFigureOut">
               <a:rPr lang="fr-FR" smtClean="0"/>
-              <a:t>05/02/2018</a:t>
+              <a:t>06/02/2018</a:t>
             </a:fld>
             <a:endParaRPr lang="fr-FR"/>
           </a:p>
@@ -2715,7 +2715,7 @@
           <a:p>
             <a:fld id="{49D103BC-6271-874A-98DE-6B966EAA6738}" type="datetimeFigureOut">
               <a:rPr lang="fr-FR" smtClean="0"/>
-              <a:t>05/02/2018</a:t>
+              <a:t>06/02/2018</a:t>
             </a:fld>
             <a:endParaRPr lang="fr-FR"/>
           </a:p>
@@ -2968,7 +2968,7 @@
           <a:p>
             <a:fld id="{49D103BC-6271-874A-98DE-6B966EAA6738}" type="datetimeFigureOut">
               <a:rPr lang="fr-FR" smtClean="0"/>
-              <a:t>05/02/2018</a:t>
+              <a:t>06/02/2018</a:t>
             </a:fld>
             <a:endParaRPr lang="fr-FR"/>
           </a:p>
@@ -3181,7 +3181,7 @@
           <a:p>
             <a:fld id="{49D103BC-6271-874A-98DE-6B966EAA6738}" type="datetimeFigureOut">
               <a:rPr lang="fr-FR" smtClean="0"/>
-              <a:t>05/02/2018</a:t>
+              <a:t>06/02/2018</a:t>
             </a:fld>
             <a:endParaRPr lang="fr-FR"/>
           </a:p>
@@ -13279,11 +13279,7 @@
                 <a:p>
                   <a:r>
                     <a:rPr lang="en-GB" sz="1400" dirty="0" smtClean="0"/>
-                    <a:t>B-Mode </a:t>
-                  </a:r>
-                  <a:r>
-                    <a:rPr lang="en-GB" sz="1400" dirty="0" smtClean="0"/>
-                    <a:t>sample</a:t>
+                    <a:t>B-Mode sample</a:t>
                   </a:r>
                   <a:endParaRPr lang="en-GB" sz="1400" dirty="0"/>
                 </a:p>
@@ -18604,8 +18600,8 @@
         </p:nvSpPr>
         <p:spPr>
           <a:xfrm>
-            <a:off x="578868" y="2179565"/>
-            <a:ext cx="121688" cy="215444"/>
+            <a:off x="542925" y="2207111"/>
+            <a:ext cx="305830" cy="215444"/>
           </a:xfrm>
           <a:prstGeom prst="rect">
             <a:avLst/>
@@ -18621,7 +18617,7 @@
             <a:pPr algn="ctr"/>
             <a:r>
               <a:rPr lang="fr-FR" sz="800" dirty="0" smtClean="0"/>
-              <a:t>j</a:t>
+              <a:t>= j</a:t>
             </a:r>
             <a:endParaRPr lang="fr-FR" sz="800" dirty="0"/>
           </a:p>
@@ -18635,8 +18631,8 @@
         </p:nvSpPr>
         <p:spPr>
           <a:xfrm>
-            <a:off x="369169" y="2518425"/>
-            <a:ext cx="121688" cy="215444"/>
+            <a:off x="267168" y="2518425"/>
+            <a:ext cx="294807" cy="215444"/>
           </a:xfrm>
           <a:prstGeom prst="rect">
             <a:avLst/>
@@ -18652,22 +18648,82 @@
             <a:pPr algn="ctr"/>
             <a:r>
               <a:rPr lang="fr-FR" sz="800" dirty="0" smtClean="0"/>
-              <a:t>i</a:t>
+              <a:t>= i</a:t>
             </a:r>
             <a:endParaRPr lang="fr-FR" sz="800" dirty="0"/>
           </a:p>
         </p:txBody>
       </p:sp>
+      <p:pic>
+        <p:nvPicPr>
+          <p:cNvPr id="72" name="Image 71" descr="latex-image-1.pdf"/>
+          <p:cNvPicPr>
+            <a:picLocks noChangeAspect="1"/>
+          </p:cNvPicPr>
+          <p:nvPr/>
+        </p:nvPicPr>
+        <p:blipFill>
+          <a:blip r:embed="rId10">
+            <a:extLst>
+              <a:ext uri="{28A0092B-C50C-407E-A947-70E740481C1C}">
+                <a14:useLocalDpi xmlns:a14="http://schemas.microsoft.com/office/drawing/2010/main" val="0"/>
+              </a:ext>
+            </a:extLst>
+          </a:blip>
+          <a:stretch>
+            <a:fillRect/>
+          </a:stretch>
+        </p:blipFill>
+        <p:spPr>
+          <a:xfrm>
+            <a:off x="495300" y="2264261"/>
+            <a:ext cx="114300" cy="101600"/>
+          </a:xfrm>
+          <a:prstGeom prst="rect">
+            <a:avLst/>
+          </a:prstGeom>
+        </p:spPr>
+      </p:pic>
+      <p:pic>
+        <p:nvPicPr>
+          <p:cNvPr id="73" name="Image 72" descr="latex-image-1.pdf"/>
+          <p:cNvPicPr>
+            <a:picLocks noChangeAspect="1"/>
+          </p:cNvPicPr>
+          <p:nvPr/>
+        </p:nvPicPr>
+        <p:blipFill>
+          <a:blip r:embed="rId11">
+            <a:extLst>
+              <a:ext uri="{28A0092B-C50C-407E-A947-70E740481C1C}">
+                <a14:useLocalDpi xmlns:a14="http://schemas.microsoft.com/office/drawing/2010/main" val="0"/>
+              </a:ext>
+            </a:extLst>
+          </a:blip>
+          <a:stretch>
+            <a:fillRect/>
+          </a:stretch>
+        </p:blipFill>
+        <p:spPr>
+          <a:xfrm>
+            <a:off x="237005" y="2569188"/>
+            <a:ext cx="101600" cy="101600"/>
+          </a:xfrm>
+          <a:prstGeom prst="rect">
+            <a:avLst/>
+          </a:prstGeom>
+        </p:spPr>
+      </p:pic>
       <p:sp>
         <p:nvSpPr>
-          <p:cNvPr id="74" name="ZoneTexte 73"/>
+          <p:cNvPr id="76" name="ZoneTexte 75"/>
           <p:cNvSpPr txBox="1"/>
           <p:nvPr/>
         </p:nvSpPr>
         <p:spPr>
           <a:xfrm>
-            <a:off x="3988818" y="2236715"/>
-            <a:ext cx="121688" cy="215444"/>
+            <a:off x="4027018" y="2245069"/>
+            <a:ext cx="305830" cy="215444"/>
           </a:xfrm>
           <a:prstGeom prst="rect">
             <a:avLst/>
@@ -18683,7 +18739,7 @@
             <a:pPr algn="ctr"/>
             <a:r>
               <a:rPr lang="fr-FR" sz="800" dirty="0" smtClean="0"/>
-              <a:t>j</a:t>
+              <a:t>= j</a:t>
             </a:r>
             <a:endParaRPr lang="fr-FR" sz="800" dirty="0"/>
           </a:p>
@@ -18691,14 +18747,14 @@
       </p:sp>
       <p:sp>
         <p:nvSpPr>
-          <p:cNvPr id="75" name="ZoneTexte 74"/>
+          <p:cNvPr id="77" name="ZoneTexte 76"/>
           <p:cNvSpPr txBox="1"/>
           <p:nvPr/>
         </p:nvSpPr>
         <p:spPr>
           <a:xfrm>
-            <a:off x="3779119" y="2575575"/>
-            <a:ext cx="121688" cy="215444"/>
+            <a:off x="3751261" y="2556383"/>
+            <a:ext cx="294807" cy="215444"/>
           </a:xfrm>
           <a:prstGeom prst="rect">
             <a:avLst/>
@@ -18714,12 +18770,72 @@
             <a:pPr algn="ctr"/>
             <a:r>
               <a:rPr lang="fr-FR" sz="800" dirty="0" smtClean="0"/>
-              <a:t>i</a:t>
+              <a:t>= i</a:t>
             </a:r>
             <a:endParaRPr lang="fr-FR" sz="800" dirty="0"/>
           </a:p>
         </p:txBody>
       </p:sp>
+      <p:pic>
+        <p:nvPicPr>
+          <p:cNvPr id="78" name="Image 77" descr="latex-image-1.pdf"/>
+          <p:cNvPicPr>
+            <a:picLocks noChangeAspect="1"/>
+          </p:cNvPicPr>
+          <p:nvPr/>
+        </p:nvPicPr>
+        <p:blipFill>
+          <a:blip r:embed="rId10">
+            <a:extLst>
+              <a:ext uri="{28A0092B-C50C-407E-A947-70E740481C1C}">
+                <a14:useLocalDpi xmlns:a14="http://schemas.microsoft.com/office/drawing/2010/main" val="0"/>
+              </a:ext>
+            </a:extLst>
+          </a:blip>
+          <a:stretch>
+            <a:fillRect/>
+          </a:stretch>
+        </p:blipFill>
+        <p:spPr>
+          <a:xfrm>
+            <a:off x="3979393" y="2302219"/>
+            <a:ext cx="114300" cy="101600"/>
+          </a:xfrm>
+          <a:prstGeom prst="rect">
+            <a:avLst/>
+          </a:prstGeom>
+        </p:spPr>
+      </p:pic>
+      <p:pic>
+        <p:nvPicPr>
+          <p:cNvPr id="79" name="Image 78" descr="latex-image-1.pdf"/>
+          <p:cNvPicPr>
+            <a:picLocks noChangeAspect="1"/>
+          </p:cNvPicPr>
+          <p:nvPr/>
+        </p:nvPicPr>
+        <p:blipFill>
+          <a:blip r:embed="rId11">
+            <a:extLst>
+              <a:ext uri="{28A0092B-C50C-407E-A947-70E740481C1C}">
+                <a14:useLocalDpi xmlns:a14="http://schemas.microsoft.com/office/drawing/2010/main" val="0"/>
+              </a:ext>
+            </a:extLst>
+          </a:blip>
+          <a:stretch>
+            <a:fillRect/>
+          </a:stretch>
+        </p:blipFill>
+        <p:spPr>
+          <a:xfrm>
+            <a:off x="3721098" y="2607146"/>
+            <a:ext cx="101600" cy="101600"/>
+          </a:xfrm>
+          <a:prstGeom prst="rect">
+            <a:avLst/>
+          </a:prstGeom>
+        </p:spPr>
+      </p:pic>
     </p:spTree>
     <p:extLst>
       <p:ext uri="{BB962C8B-B14F-4D97-AF65-F5344CB8AC3E}">
@@ -22571,13 +22687,8 @@
                 <a:pPr algn="ctr"/>
                 <a:r>
                   <a:rPr lang="en-GB" sz="1400" dirty="0" smtClean="0"/>
-                  <a:t>Frame </a:t>
+                  <a:t>Frame number</a:t>
                 </a:r>
-                <a:r>
-                  <a:rPr lang="en-GB" sz="1400" dirty="0" smtClean="0"/>
-                  <a:t>number</a:t>
-                </a:r>
-                <a:endParaRPr lang="en-GB" sz="1400" dirty="0" smtClean="0"/>
               </a:p>
             </p:txBody>
           </p:sp>
@@ -24727,7 +24838,6 @@
                 <a:rPr lang="en-GB" sz="1400" dirty="0" smtClean="0"/>
                 <a:t>width</a:t>
               </a:r>
-              <a:endParaRPr lang="en-GB" sz="1400" dirty="0" smtClean="0"/>
             </a:p>
           </p:txBody>
         </p:sp>
@@ -27931,13 +28041,8 @@
                 <a:pPr algn="ctr"/>
                 <a:r>
                   <a:rPr lang="en-GB" sz="1400" dirty="0" smtClean="0"/>
-                  <a:t>Frame </a:t>
+                  <a:t>Frame number</a:t>
                 </a:r>
-                <a:r>
-                  <a:rPr lang="en-GB" sz="1400" dirty="0" smtClean="0"/>
-                  <a:t>number</a:t>
-                </a:r>
-                <a:endParaRPr lang="en-GB" sz="1400" dirty="0" smtClean="0"/>
               </a:p>
             </p:txBody>
           </p:sp>
@@ -29605,7 +29710,6 @@
                 <a:rPr lang="en-GB" sz="1400" dirty="0" smtClean="0"/>
                 <a:t>width</a:t>
               </a:r>
-              <a:endParaRPr lang="en-GB" sz="1400" dirty="0" smtClean="0"/>
             </a:p>
           </p:txBody>
         </p:sp>
@@ -32490,10 +32594,10 @@
         </p:nvGrpSpPr>
         <p:grpSpPr>
           <a:xfrm>
-            <a:off x="4610747" y="2254527"/>
-            <a:ext cx="4451229" cy="4169057"/>
-            <a:chOff x="4610747" y="2254527"/>
-            <a:chExt cx="4451229" cy="4169057"/>
+            <a:off x="4574712" y="2254527"/>
+            <a:ext cx="4487264" cy="4169057"/>
+            <a:chOff x="4574712" y="2254527"/>
+            <a:chExt cx="4487264" cy="4169057"/>
           </a:xfrm>
         </p:grpSpPr>
         <p:grpSp>
@@ -32504,10 +32608,10 @@
           </p:nvGrpSpPr>
           <p:grpSpPr>
             <a:xfrm>
-              <a:off x="4610747" y="2254527"/>
-              <a:ext cx="4451229" cy="4169057"/>
-              <a:chOff x="4418312" y="2254527"/>
-              <a:chExt cx="4451229" cy="4169057"/>
+              <a:off x="4574712" y="2254527"/>
+              <a:ext cx="4487264" cy="4169057"/>
+              <a:chOff x="4382277" y="2254527"/>
+              <a:chExt cx="4487264" cy="4169057"/>
             </a:xfrm>
           </p:grpSpPr>
           <p:cxnSp>
@@ -32557,10 +32661,10 @@
             </p:nvGrpSpPr>
             <p:grpSpPr>
               <a:xfrm>
-                <a:off x="5329381" y="2254527"/>
-                <a:ext cx="3462290" cy="3274475"/>
-                <a:chOff x="1046043" y="2358687"/>
-                <a:chExt cx="3462290" cy="3274475"/>
+                <a:off x="5024421" y="2254527"/>
+                <a:ext cx="3767250" cy="3274475"/>
+                <a:chOff x="741083" y="2358687"/>
+                <a:chExt cx="3767250" cy="3274475"/>
               </a:xfrm>
             </p:grpSpPr>
             <p:grpSp>
@@ -32571,10 +32675,10 @@
               </p:nvGrpSpPr>
               <p:grpSpPr>
                 <a:xfrm>
-                  <a:off x="1051517" y="4327667"/>
-                  <a:ext cx="2662967" cy="1305495"/>
-                  <a:chOff x="1941970" y="2455312"/>
-                  <a:chExt cx="2662967" cy="1305495"/>
+                  <a:off x="741083" y="4327667"/>
+                  <a:ext cx="2973401" cy="1305495"/>
+                  <a:chOff x="1631536" y="2455312"/>
+                  <a:chExt cx="2973401" cy="1305495"/>
                 </a:xfrm>
               </p:grpSpPr>
               <p:sp>
@@ -32972,7 +33076,7 @@
                 </p:blipFill>
                 <p:spPr>
                   <a:xfrm>
-                    <a:off x="1993126" y="2731805"/>
+                    <a:off x="1631536" y="2561446"/>
                     <a:ext cx="101600" cy="101600"/>
                   </a:xfrm>
                   <a:prstGeom prst="rect">
@@ -33620,7 +33724,7 @@
               </p:blipFill>
               <p:spPr>
                 <a:xfrm>
-                  <a:off x="1167538" y="4095664"/>
+                  <a:off x="991002" y="4122838"/>
                   <a:ext cx="139700" cy="101600"/>
                 </a:xfrm>
                 <a:prstGeom prst="rect">
@@ -33924,8 +34028,8 @@
             </p:nvSpPr>
             <p:spPr>
               <a:xfrm>
-                <a:off x="4418312" y="4723013"/>
-                <a:ext cx="595035" cy="307777"/>
+                <a:off x="4382277" y="4723013"/>
+                <a:ext cx="667106" cy="307777"/>
               </a:xfrm>
               <a:prstGeom prst="rect">
                 <a:avLst/>
@@ -33941,11 +34045,7 @@
                 <a:pPr algn="ctr"/>
                 <a:r>
                   <a:rPr lang="en-GB" sz="1400" dirty="0"/>
-                  <a:t>d</a:t>
-                </a:r>
-                <a:r>
-                  <a:rPr lang="en-GB" sz="1400" dirty="0" smtClean="0"/>
-                  <a:t>im Y</a:t>
+                  <a:t>Height</a:t>
                 </a:r>
                 <a:endParaRPr lang="en-GB" sz="1400" dirty="0"/>
               </a:p>
@@ -33989,41 +34089,6 @@
               </a:fontRef>
             </p:style>
           </p:cxnSp>
-          <p:sp>
-            <p:nvSpPr>
-              <p:cNvPr id="216" name="ZoneTexte 215"/>
-              <p:cNvSpPr txBox="1"/>
-              <p:nvPr/>
-            </p:nvSpPr>
-            <p:spPr>
-              <a:xfrm>
-                <a:off x="4830876" y="3744452"/>
-                <a:ext cx="595035" cy="307777"/>
-              </a:xfrm>
-              <a:prstGeom prst="rect">
-                <a:avLst/>
-              </a:prstGeom>
-              <a:noFill/>
-            </p:spPr>
-            <p:txBody>
-              <a:bodyPr wrap="none" rtlCol="0">
-                <a:spAutoFit/>
-              </a:bodyPr>
-              <a:lstStyle/>
-              <a:p>
-                <a:pPr algn="ctr"/>
-                <a:r>
-                  <a:rPr lang="en-GB" sz="1400" dirty="0"/>
-                  <a:t>d</a:t>
-                </a:r>
-                <a:r>
-                  <a:rPr lang="en-GB" sz="1400" dirty="0" smtClean="0"/>
-                  <a:t>im Z</a:t>
-                </a:r>
-                <a:endParaRPr lang="en-GB" sz="1400" dirty="0"/>
-              </a:p>
-            </p:txBody>
-          </p:sp>
           <p:cxnSp>
             <p:nvCxnSpPr>
               <p:cNvPr id="218" name="Connecteur droit 217"/>
@@ -34070,8 +34135,8 @@
             </p:nvSpPr>
             <p:spPr>
               <a:xfrm>
-                <a:off x="6364945" y="5569049"/>
-                <a:ext cx="597389" cy="307777"/>
+                <a:off x="6345283" y="5569049"/>
+                <a:ext cx="636713" cy="307777"/>
               </a:xfrm>
               <a:prstGeom prst="rect">
                 <a:avLst/>
@@ -34087,11 +34152,7 @@
                 <a:pPr algn="ctr"/>
                 <a:r>
                   <a:rPr lang="en-GB" sz="1400" dirty="0"/>
-                  <a:t>d</a:t>
-                </a:r>
-                <a:r>
-                  <a:rPr lang="en-GB" sz="1400" dirty="0" smtClean="0"/>
-                  <a:t>im X</a:t>
+                  <a:t>Width</a:t>
                 </a:r>
               </a:p>
             </p:txBody>
@@ -34212,10 +34273,10 @@
         </p:nvGrpSpPr>
         <p:grpSpPr>
           <a:xfrm>
-            <a:off x="-36181" y="1320439"/>
-            <a:ext cx="4940363" cy="5105137"/>
-            <a:chOff x="-36181" y="1320439"/>
-            <a:chExt cx="4940363" cy="5105137"/>
+            <a:off x="-72215" y="1320439"/>
+            <a:ext cx="4976397" cy="5105137"/>
+            <a:chOff x="-72215" y="1320439"/>
+            <a:chExt cx="4976397" cy="5105137"/>
           </a:xfrm>
         </p:grpSpPr>
         <p:grpSp>
@@ -34895,7 +34956,7 @@
               </p:blipFill>
               <p:spPr>
                 <a:xfrm>
-                  <a:off x="2011264" y="2728583"/>
+                  <a:off x="1612941" y="2591924"/>
                   <a:ext cx="101600" cy="101600"/>
                 </a:xfrm>
                 <a:prstGeom prst="rect">
@@ -36534,7 +36595,7 @@
             </p:blipFill>
             <p:spPr>
               <a:xfrm>
-                <a:off x="1155808" y="4090342"/>
+                <a:off x="984127" y="4093302"/>
                 <a:ext cx="139700" cy="101600"/>
               </a:xfrm>
               <a:prstGeom prst="rect">
@@ -36912,10 +36973,10 @@
           </p:nvGrpSpPr>
           <p:grpSpPr>
             <a:xfrm>
-              <a:off x="-36181" y="3740884"/>
-              <a:ext cx="4471497" cy="2684692"/>
-              <a:chOff x="-36181" y="3740884"/>
-              <a:chExt cx="4471497" cy="2684692"/>
+              <a:off x="-72215" y="3502149"/>
+              <a:ext cx="4507531" cy="2923427"/>
+              <a:chOff x="-72215" y="3502149"/>
+              <a:chExt cx="4507531" cy="2923427"/>
             </a:xfrm>
           </p:grpSpPr>
           <p:cxnSp>
@@ -36964,8 +37025,8 @@
             </p:nvSpPr>
             <p:spPr>
               <a:xfrm>
-                <a:off x="-36181" y="4721477"/>
-                <a:ext cx="595035" cy="307777"/>
+                <a:off x="-72215" y="4721477"/>
+                <a:ext cx="667106" cy="307777"/>
               </a:xfrm>
               <a:prstGeom prst="rect">
                 <a:avLst/>
@@ -36980,12 +37041,8 @@
               <a:p>
                 <a:pPr algn="ctr"/>
                 <a:r>
-                  <a:rPr lang="en-GB" sz="1400" dirty="0"/>
-                  <a:t>d</a:t>
-                </a:r>
-                <a:r>
                   <a:rPr lang="en-GB" sz="1400" dirty="0" smtClean="0"/>
-                  <a:t>im Y</a:t>
+                  <a:t>Height</a:t>
                 </a:r>
                 <a:endParaRPr lang="en-GB" sz="1400" dirty="0"/>
               </a:p>
@@ -37037,8 +37094,8 @@
             </p:nvSpPr>
             <p:spPr>
               <a:xfrm>
-                <a:off x="376383" y="3742916"/>
-                <a:ext cx="595035" cy="307777"/>
+                <a:off x="30254" y="3502149"/>
+                <a:ext cx="973343" cy="523220"/>
               </a:xfrm>
               <a:prstGeom prst="rect">
                 <a:avLst/>
@@ -37053,12 +37110,15 @@
               <a:p>
                 <a:pPr algn="ctr"/>
                 <a:r>
-                  <a:rPr lang="en-GB" sz="1400" dirty="0"/>
-                  <a:t>d</a:t>
+                  <a:rPr lang="en-GB" sz="1400" dirty="0" smtClean="0"/>
+                  <a:t>Number of</a:t>
                 </a:r>
+              </a:p>
+              <a:p>
+                <a:pPr algn="ctr"/>
                 <a:r>
                   <a:rPr lang="en-GB" sz="1400" dirty="0" smtClean="0"/>
-                  <a:t>im Z</a:t>
+                  <a:t> frames</a:t>
                 </a:r>
                 <a:endParaRPr lang="en-GB" sz="1400" dirty="0"/>
               </a:p>
@@ -37110,8 +37170,8 @@
             </p:nvSpPr>
             <p:spPr>
               <a:xfrm>
-                <a:off x="1930720" y="5571041"/>
-                <a:ext cx="597389" cy="307777"/>
+                <a:off x="1911057" y="5571041"/>
+                <a:ext cx="636714" cy="307777"/>
               </a:xfrm>
               <a:prstGeom prst="rect">
                 <a:avLst/>
@@ -37127,12 +37187,13 @@
                 <a:pPr algn="ctr"/>
                 <a:r>
                   <a:rPr lang="en-GB" sz="1400" dirty="0"/>
-                  <a:t>d</a:t>
+                  <a:t>W</a:t>
                 </a:r>
                 <a:r>
                   <a:rPr lang="en-GB" sz="1400" dirty="0" smtClean="0"/>
-                  <a:t>im X</a:t>
+                  <a:t>idth</a:t>
                 </a:r>
+                <a:endParaRPr lang="en-GB" sz="1400" dirty="0" smtClean="0"/>
               </a:p>
             </p:txBody>
           </p:sp>
@@ -37244,6 +37305,230 @@
           </p:sp>
         </p:grpSp>
       </p:grpSp>
+      <p:sp>
+        <p:nvSpPr>
+          <p:cNvPr id="141" name="ZoneTexte 140"/>
+          <p:cNvSpPr txBox="1"/>
+          <p:nvPr/>
+        </p:nvSpPr>
+        <p:spPr>
+          <a:xfrm>
+            <a:off x="1099883" y="4242187"/>
+            <a:ext cx="305830" cy="215444"/>
+          </a:xfrm>
+          <a:prstGeom prst="rect">
+            <a:avLst/>
+          </a:prstGeom>
+          <a:noFill/>
+        </p:spPr>
+        <p:txBody>
+          <a:bodyPr wrap="square" rtlCol="0">
+            <a:spAutoFit/>
+          </a:bodyPr>
+          <a:lstStyle/>
+          <a:p>
+            <a:pPr algn="ctr"/>
+            <a:r>
+              <a:rPr lang="fr-FR" sz="800" dirty="0" smtClean="0"/>
+              <a:t>= j</a:t>
+            </a:r>
+            <a:endParaRPr lang="fr-FR" sz="800" dirty="0"/>
+          </a:p>
+        </p:txBody>
+      </p:sp>
+      <p:sp>
+        <p:nvSpPr>
+          <p:cNvPr id="142" name="ZoneTexte 141"/>
+          <p:cNvSpPr txBox="1"/>
+          <p:nvPr/>
+        </p:nvSpPr>
+        <p:spPr>
+          <a:xfrm>
+            <a:off x="618051" y="4305637"/>
+            <a:ext cx="294807" cy="215444"/>
+          </a:xfrm>
+          <a:prstGeom prst="rect">
+            <a:avLst/>
+          </a:prstGeom>
+          <a:noFill/>
+        </p:spPr>
+        <p:txBody>
+          <a:bodyPr wrap="square" rtlCol="0">
+            <a:spAutoFit/>
+          </a:bodyPr>
+          <a:lstStyle/>
+          <a:p>
+            <a:pPr algn="ctr"/>
+            <a:r>
+              <a:rPr lang="fr-FR" sz="800" dirty="0" smtClean="0"/>
+              <a:t>= i</a:t>
+            </a:r>
+            <a:endParaRPr lang="fr-FR" sz="800" dirty="0"/>
+          </a:p>
+        </p:txBody>
+      </p:sp>
+      <p:sp>
+        <p:nvSpPr>
+          <p:cNvPr id="144" name="ZoneTexte 143"/>
+          <p:cNvSpPr txBox="1"/>
+          <p:nvPr/>
+        </p:nvSpPr>
+        <p:spPr>
+          <a:xfrm>
+            <a:off x="922400" y="3916093"/>
+            <a:ext cx="305830" cy="215444"/>
+          </a:xfrm>
+          <a:prstGeom prst="rect">
+            <a:avLst/>
+          </a:prstGeom>
+          <a:noFill/>
+        </p:spPr>
+        <p:txBody>
+          <a:bodyPr wrap="square" rtlCol="0">
+            <a:spAutoFit/>
+          </a:bodyPr>
+          <a:lstStyle/>
+          <a:p>
+            <a:pPr algn="ctr"/>
+            <a:r>
+              <a:rPr lang="fr-FR" sz="800" dirty="0" smtClean="0"/>
+              <a:t>= k</a:t>
+            </a:r>
+            <a:endParaRPr lang="fr-FR" sz="800" dirty="0"/>
+          </a:p>
+        </p:txBody>
+      </p:sp>
+      <p:sp>
+        <p:nvSpPr>
+          <p:cNvPr id="154" name="ZoneTexte 153"/>
+          <p:cNvSpPr txBox="1"/>
+          <p:nvPr/>
+        </p:nvSpPr>
+        <p:spPr>
+          <a:xfrm>
+            <a:off x="4758295" y="3582145"/>
+            <a:ext cx="973343" cy="523220"/>
+          </a:xfrm>
+          <a:prstGeom prst="rect">
+            <a:avLst/>
+          </a:prstGeom>
+          <a:noFill/>
+        </p:spPr>
+        <p:txBody>
+          <a:bodyPr wrap="none" rtlCol="0">
+            <a:spAutoFit/>
+          </a:bodyPr>
+          <a:lstStyle/>
+          <a:p>
+            <a:pPr algn="ctr"/>
+            <a:r>
+              <a:rPr lang="en-GB" sz="1400" dirty="0" smtClean="0"/>
+              <a:t>Number of</a:t>
+            </a:r>
+          </a:p>
+          <a:p>
+            <a:pPr algn="ctr"/>
+            <a:r>
+              <a:rPr lang="en-GB" sz="1400" dirty="0" smtClean="0"/>
+              <a:t> frames</a:t>
+            </a:r>
+            <a:endParaRPr lang="en-GB" sz="1400" dirty="0"/>
+          </a:p>
+        </p:txBody>
+      </p:sp>
+      <p:sp>
+        <p:nvSpPr>
+          <p:cNvPr id="186" name="ZoneTexte 185"/>
+          <p:cNvSpPr txBox="1"/>
+          <p:nvPr/>
+        </p:nvSpPr>
+        <p:spPr>
+          <a:xfrm>
+            <a:off x="5708841" y="4237523"/>
+            <a:ext cx="305830" cy="215444"/>
+          </a:xfrm>
+          <a:prstGeom prst="rect">
+            <a:avLst/>
+          </a:prstGeom>
+          <a:noFill/>
+        </p:spPr>
+        <p:txBody>
+          <a:bodyPr wrap="square" rtlCol="0">
+            <a:spAutoFit/>
+          </a:bodyPr>
+          <a:lstStyle/>
+          <a:p>
+            <a:pPr algn="ctr"/>
+            <a:r>
+              <a:rPr lang="fr-FR" sz="800" dirty="0" smtClean="0"/>
+              <a:t>= j</a:t>
+            </a:r>
+            <a:endParaRPr lang="fr-FR" sz="800" dirty="0"/>
+          </a:p>
+        </p:txBody>
+      </p:sp>
+      <p:sp>
+        <p:nvSpPr>
+          <p:cNvPr id="187" name="ZoneTexte 186"/>
+          <p:cNvSpPr txBox="1"/>
+          <p:nvPr/>
+        </p:nvSpPr>
+        <p:spPr>
+          <a:xfrm>
+            <a:off x="5241818" y="4278790"/>
+            <a:ext cx="294807" cy="215444"/>
+          </a:xfrm>
+          <a:prstGeom prst="rect">
+            <a:avLst/>
+          </a:prstGeom>
+          <a:noFill/>
+        </p:spPr>
+        <p:txBody>
+          <a:bodyPr wrap="square" rtlCol="0">
+            <a:spAutoFit/>
+          </a:bodyPr>
+          <a:lstStyle/>
+          <a:p>
+            <a:pPr algn="ctr"/>
+            <a:r>
+              <a:rPr lang="fr-FR" sz="800" dirty="0" smtClean="0"/>
+              <a:t>= i</a:t>
+            </a:r>
+            <a:endParaRPr lang="fr-FR" sz="800" dirty="0"/>
+          </a:p>
+        </p:txBody>
+      </p:sp>
+      <p:sp>
+        <p:nvSpPr>
+          <p:cNvPr id="188" name="ZoneTexte 187"/>
+          <p:cNvSpPr txBox="1"/>
+          <p:nvPr/>
+        </p:nvSpPr>
+        <p:spPr>
+          <a:xfrm>
+            <a:off x="5539292" y="3952311"/>
+            <a:ext cx="305830" cy="215444"/>
+          </a:xfrm>
+          <a:prstGeom prst="rect">
+            <a:avLst/>
+          </a:prstGeom>
+          <a:noFill/>
+        </p:spPr>
+        <p:txBody>
+          <a:bodyPr wrap="square" rtlCol="0">
+            <a:spAutoFit/>
+          </a:bodyPr>
+          <a:lstStyle/>
+          <a:p>
+            <a:pPr algn="ctr"/>
+            <a:r>
+              <a:rPr lang="fr-FR" sz="800" dirty="0" smtClean="0"/>
+              <a:t>= k</a:t>
+            </a:r>
+            <a:endParaRPr lang="fr-FR" sz="800" dirty="0"/>
+          </a:p>
+        </p:txBody>
+      </p:sp>
     </p:spTree>
     <p:extLst>
       <p:ext uri="{BB962C8B-B14F-4D97-AF65-F5344CB8AC3E}">
@@ -37289,10 +37574,10 @@
         </p:nvGrpSpPr>
         <p:grpSpPr>
           <a:xfrm>
-            <a:off x="776703" y="1368000"/>
-            <a:ext cx="3938071" cy="4096704"/>
-            <a:chOff x="2885681" y="1388732"/>
-            <a:chExt cx="3938071" cy="4096704"/>
+            <a:off x="749484" y="1368000"/>
+            <a:ext cx="3965290" cy="4096704"/>
+            <a:chOff x="2858462" y="1388732"/>
+            <a:chExt cx="3965290" cy="4096704"/>
           </a:xfrm>
         </p:grpSpPr>
         <p:sp>
@@ -39288,8 +39573,8 @@
           </p:nvSpPr>
           <p:spPr>
             <a:xfrm rot="2149157">
-              <a:off x="3946590" y="4771123"/>
-              <a:ext cx="597389" cy="307777"/>
+              <a:off x="3942958" y="4771123"/>
+              <a:ext cx="604653" cy="307777"/>
             </a:xfrm>
             <a:prstGeom prst="rect">
               <a:avLst/>
@@ -39304,12 +39589,8 @@
             <a:p>
               <a:pPr algn="ctr"/>
               <a:r>
-                <a:rPr lang="en-GB" sz="1400" dirty="0"/>
-                <a:t>d</a:t>
-              </a:r>
-              <a:r>
                 <a:rPr lang="en-GB" sz="1400" dirty="0" smtClean="0"/>
-                <a:t>im X</a:t>
+                <a:t>width</a:t>
               </a:r>
               <a:endParaRPr lang="en-GB" sz="1400" dirty="0"/>
             </a:p>
@@ -39323,8 +39604,8 @@
           </p:nvSpPr>
           <p:spPr>
             <a:xfrm rot="19879785">
-              <a:off x="5035799" y="4789078"/>
-              <a:ext cx="595035" cy="307777"/>
+              <a:off x="4649168" y="4805455"/>
+              <a:ext cx="1426288" cy="523220"/>
             </a:xfrm>
             <a:prstGeom prst="rect">
               <a:avLst/>
@@ -39339,12 +39620,19 @@
             <a:p>
               <a:pPr algn="ctr"/>
               <a:r>
-                <a:rPr lang="en-GB" sz="1400" dirty="0"/>
-                <a:t>d</a:t>
+                <a:rPr lang="en-GB" sz="1400" dirty="0" smtClean="0"/>
+                <a:t>number </a:t>
               </a:r>
               <a:r>
-                <a:rPr lang="en-GB" sz="1400" dirty="0" smtClean="0"/>
-                <a:t>im Z</a:t>
+                <a:rPr lang="en-GB" sz="1400" dirty="0"/>
+                <a:t>of </a:t>
+              </a:r>
+            </a:p>
+            <a:p>
+              <a:pPr algn="ctr"/>
+              <a:r>
+                <a:rPr lang="en-GB" sz="1400" dirty="0"/>
+                <a:t>post-scan frames</a:t>
               </a:r>
               <a:endParaRPr lang="en-GB" sz="1400" dirty="0"/>
             </a:p>
@@ -39471,8 +39759,8 @@
           </p:nvSpPr>
           <p:spPr>
             <a:xfrm>
-              <a:off x="2885681" y="3434972"/>
-              <a:ext cx="595035" cy="307777"/>
+              <a:off x="2858462" y="3434972"/>
+              <a:ext cx="649473" cy="307777"/>
             </a:xfrm>
             <a:prstGeom prst="rect">
               <a:avLst/>
@@ -39487,12 +39775,8 @@
             <a:p>
               <a:pPr algn="ctr"/>
               <a:r>
-                <a:rPr lang="en-GB" sz="1400" dirty="0"/>
-                <a:t>d</a:t>
-              </a:r>
-              <a:r>
                 <a:rPr lang="en-GB" sz="1400" dirty="0" smtClean="0"/>
-                <a:t>im Y</a:t>
+                <a:t>height</a:t>
               </a:r>
               <a:endParaRPr lang="en-GB" sz="1400" dirty="0"/>
             </a:p>
@@ -39623,10 +39907,10 @@
         </p:nvGrpSpPr>
         <p:grpSpPr>
           <a:xfrm>
-            <a:off x="4823151" y="1368000"/>
-            <a:ext cx="3380730" cy="4096704"/>
-            <a:chOff x="2885681" y="1388732"/>
-            <a:chExt cx="3380730" cy="4096704"/>
+            <a:off x="4795932" y="1368000"/>
+            <a:ext cx="3407949" cy="4096704"/>
+            <a:chOff x="2858462" y="1388732"/>
+            <a:chExt cx="3407949" cy="4096704"/>
           </a:xfrm>
         </p:grpSpPr>
         <p:sp>
@@ -41314,8 +41598,39 @@
           </p:nvSpPr>
           <p:spPr>
             <a:xfrm rot="2149157">
-              <a:off x="3946590" y="4771123"/>
-              <a:ext cx="597389" cy="307777"/>
+              <a:off x="3942958" y="4771123"/>
+              <a:ext cx="604653" cy="307777"/>
+            </a:xfrm>
+            <a:prstGeom prst="rect">
+              <a:avLst/>
+            </a:prstGeom>
+            <a:noFill/>
+          </p:spPr>
+          <p:txBody>
+            <a:bodyPr wrap="none" rtlCol="0">
+              <a:spAutoFit/>
+            </a:bodyPr>
+            <a:lstStyle/>
+            <a:p>
+              <a:pPr algn="ctr"/>
+              <a:r>
+                <a:rPr lang="en-GB" sz="1400" dirty="0" smtClean="0"/>
+                <a:t>width</a:t>
+              </a:r>
+              <a:endParaRPr lang="en-GB" sz="1400" dirty="0"/>
+            </a:p>
+          </p:txBody>
+        </p:sp>
+        <p:sp>
+          <p:nvSpPr>
+            <p:cNvPr id="241" name="ZoneTexte 240"/>
+            <p:cNvSpPr txBox="1"/>
+            <p:nvPr/>
+          </p:nvSpPr>
+          <p:spPr>
+            <a:xfrm rot="19879785">
+              <a:off x="4649170" y="4817242"/>
+              <a:ext cx="1426288" cy="523220"/>
             </a:xfrm>
             <a:prstGeom prst="rect">
               <a:avLst/>
@@ -41331,46 +41646,22 @@
               <a:pPr algn="ctr"/>
               <a:r>
                 <a:rPr lang="en-GB" sz="1400" dirty="0"/>
-                <a:t>d</a:t>
+                <a:t>n</a:t>
               </a:r>
               <a:r>
                 <a:rPr lang="en-GB" sz="1400" dirty="0" smtClean="0"/>
-                <a:t>im X</a:t>
+                <a:t>umber of </a:t>
               </a:r>
-              <a:endParaRPr lang="en-GB" sz="1400" dirty="0"/>
             </a:p>
-          </p:txBody>
-        </p:sp>
-        <p:sp>
-          <p:nvSpPr>
-            <p:cNvPr id="241" name="ZoneTexte 240"/>
-            <p:cNvSpPr txBox="1"/>
-            <p:nvPr/>
-          </p:nvSpPr>
-          <p:spPr>
-            <a:xfrm rot="19879785">
-              <a:off x="5035799" y="4789078"/>
-              <a:ext cx="595035" cy="307777"/>
-            </a:xfrm>
-            <a:prstGeom prst="rect">
-              <a:avLst/>
-            </a:prstGeom>
-            <a:noFill/>
-          </p:spPr>
-          <p:txBody>
-            <a:bodyPr wrap="none" rtlCol="0">
-              <a:spAutoFit/>
-            </a:bodyPr>
-            <a:lstStyle/>
             <a:p>
               <a:pPr algn="ctr"/>
               <a:r>
-                <a:rPr lang="en-GB" sz="1400" dirty="0"/>
-                <a:t>d</a:t>
+                <a:rPr lang="en-GB" sz="1400" dirty="0" smtClean="0"/>
+                <a:t>pos</a:t>
               </a:r>
               <a:r>
                 <a:rPr lang="en-GB" sz="1400" dirty="0" smtClean="0"/>
-                <a:t>im Z</a:t>
+                <a:t>t-scan frames</a:t>
               </a:r>
               <a:endParaRPr lang="en-GB" sz="1400" dirty="0"/>
             </a:p>
@@ -41497,8 +41788,8 @@
           </p:nvSpPr>
           <p:spPr>
             <a:xfrm>
-              <a:off x="2885681" y="3434972"/>
-              <a:ext cx="595035" cy="307777"/>
+              <a:off x="2858462" y="3434972"/>
+              <a:ext cx="649473" cy="307777"/>
             </a:xfrm>
             <a:prstGeom prst="rect">
               <a:avLst/>
@@ -41513,12 +41804,8 @@
             <a:p>
               <a:pPr algn="ctr"/>
               <a:r>
-                <a:rPr lang="en-GB" sz="1400"/>
-                <a:t>d</a:t>
-              </a:r>
-              <a:r>
-                <a:rPr lang="en-GB" sz="1400" smtClean="0"/>
-                <a:t>im Y</a:t>
+                <a:rPr lang="en-GB" sz="1400" dirty="0" smtClean="0"/>
+                <a:t>height</a:t>
               </a:r>
               <a:endParaRPr lang="en-GB" sz="1400" dirty="0"/>
             </a:p>
@@ -41641,6 +41928,594 @@
           </p:txBody>
         </p:sp>
       </p:grpSp>
+      <p:cxnSp>
+        <p:nvCxnSpPr>
+          <p:cNvPr id="109" name="Connecteur droit avec flèche 108"/>
+          <p:cNvCxnSpPr/>
+          <p:nvPr/>
+        </p:nvCxnSpPr>
+        <p:spPr>
+          <a:xfrm>
+            <a:off x="5604859" y="2854394"/>
+            <a:ext cx="202080" cy="166705"/>
+          </a:xfrm>
+          <a:prstGeom prst="straightConnector1">
+            <a:avLst/>
+          </a:prstGeom>
+          <a:ln w="22225">
+            <a:solidFill>
+              <a:schemeClr val="tx1"/>
+            </a:solidFill>
+            <a:tailEnd type="triangle"/>
+          </a:ln>
+          <a:effectLst/>
+        </p:spPr>
+        <p:style>
+          <a:lnRef idx="2">
+            <a:schemeClr val="accent1"/>
+          </a:lnRef>
+          <a:fillRef idx="0">
+            <a:schemeClr val="accent1"/>
+          </a:fillRef>
+          <a:effectRef idx="1">
+            <a:schemeClr val="accent1"/>
+          </a:effectRef>
+          <a:fontRef idx="minor">
+            <a:schemeClr val="tx1"/>
+          </a:fontRef>
+        </p:style>
+      </p:cxnSp>
+      <p:cxnSp>
+        <p:nvCxnSpPr>
+          <p:cNvPr id="111" name="Connecteur droit avec flèche 110"/>
+          <p:cNvCxnSpPr/>
+          <p:nvPr/>
+        </p:nvCxnSpPr>
+        <p:spPr>
+          <a:xfrm>
+            <a:off x="5612197" y="2868422"/>
+            <a:ext cx="0" cy="288000"/>
+          </a:xfrm>
+          <a:prstGeom prst="straightConnector1">
+            <a:avLst/>
+          </a:prstGeom>
+          <a:ln w="22225">
+            <a:solidFill>
+              <a:schemeClr val="tx1"/>
+            </a:solidFill>
+            <a:tailEnd type="triangle"/>
+          </a:ln>
+          <a:effectLst/>
+        </p:spPr>
+        <p:style>
+          <a:lnRef idx="2">
+            <a:schemeClr val="accent1"/>
+          </a:lnRef>
+          <a:fillRef idx="0">
+            <a:schemeClr val="accent1"/>
+          </a:fillRef>
+          <a:effectRef idx="1">
+            <a:schemeClr val="accent1"/>
+          </a:effectRef>
+          <a:fontRef idx="minor">
+            <a:schemeClr val="tx1"/>
+          </a:fontRef>
+        </p:style>
+      </p:cxnSp>
+      <p:cxnSp>
+        <p:nvCxnSpPr>
+          <p:cNvPr id="112" name="Connecteur droit avec flèche 111"/>
+          <p:cNvCxnSpPr/>
+          <p:nvPr/>
+        </p:nvCxnSpPr>
+        <p:spPr>
+          <a:xfrm flipV="1">
+            <a:off x="5612197" y="2757403"/>
+            <a:ext cx="234345" cy="101064"/>
+          </a:xfrm>
+          <a:prstGeom prst="straightConnector1">
+            <a:avLst/>
+          </a:prstGeom>
+          <a:ln w="22225">
+            <a:solidFill>
+              <a:schemeClr val="tx1"/>
+            </a:solidFill>
+            <a:tailEnd type="triangle"/>
+          </a:ln>
+          <a:effectLst/>
+        </p:spPr>
+        <p:style>
+          <a:lnRef idx="2">
+            <a:schemeClr val="accent1"/>
+          </a:lnRef>
+          <a:fillRef idx="0">
+            <a:schemeClr val="accent1"/>
+          </a:fillRef>
+          <a:effectRef idx="1">
+            <a:schemeClr val="accent1"/>
+          </a:effectRef>
+          <a:fontRef idx="minor">
+            <a:schemeClr val="tx1"/>
+          </a:fontRef>
+        </p:style>
+      </p:cxnSp>
+      <p:cxnSp>
+        <p:nvCxnSpPr>
+          <p:cNvPr id="119" name="Connecteur droit avec flèche 118"/>
+          <p:cNvCxnSpPr/>
+          <p:nvPr/>
+        </p:nvCxnSpPr>
+        <p:spPr>
+          <a:xfrm>
+            <a:off x="1560116" y="2859592"/>
+            <a:ext cx="202080" cy="166705"/>
+          </a:xfrm>
+          <a:prstGeom prst="straightConnector1">
+            <a:avLst/>
+          </a:prstGeom>
+          <a:ln w="22225">
+            <a:solidFill>
+              <a:schemeClr val="tx1"/>
+            </a:solidFill>
+            <a:tailEnd type="triangle"/>
+          </a:ln>
+          <a:effectLst/>
+        </p:spPr>
+        <p:style>
+          <a:lnRef idx="2">
+            <a:schemeClr val="accent1"/>
+          </a:lnRef>
+          <a:fillRef idx="0">
+            <a:schemeClr val="accent1"/>
+          </a:fillRef>
+          <a:effectRef idx="1">
+            <a:schemeClr val="accent1"/>
+          </a:effectRef>
+          <a:fontRef idx="minor">
+            <a:schemeClr val="tx1"/>
+          </a:fontRef>
+        </p:style>
+      </p:cxnSp>
+      <p:cxnSp>
+        <p:nvCxnSpPr>
+          <p:cNvPr id="121" name="Connecteur droit avec flèche 120"/>
+          <p:cNvCxnSpPr/>
+          <p:nvPr/>
+        </p:nvCxnSpPr>
+        <p:spPr>
+          <a:xfrm>
+            <a:off x="1562576" y="2859592"/>
+            <a:ext cx="0" cy="288000"/>
+          </a:xfrm>
+          <a:prstGeom prst="straightConnector1">
+            <a:avLst/>
+          </a:prstGeom>
+          <a:ln w="22225">
+            <a:solidFill>
+              <a:schemeClr val="tx1"/>
+            </a:solidFill>
+            <a:tailEnd type="triangle"/>
+          </a:ln>
+          <a:effectLst/>
+        </p:spPr>
+        <p:style>
+          <a:lnRef idx="2">
+            <a:schemeClr val="accent1"/>
+          </a:lnRef>
+          <a:fillRef idx="0">
+            <a:schemeClr val="accent1"/>
+          </a:fillRef>
+          <a:effectRef idx="1">
+            <a:schemeClr val="accent1"/>
+          </a:effectRef>
+          <a:fontRef idx="minor">
+            <a:schemeClr val="tx1"/>
+          </a:fontRef>
+        </p:style>
+      </p:cxnSp>
+      <p:cxnSp>
+        <p:nvCxnSpPr>
+          <p:cNvPr id="128" name="Connecteur droit avec flèche 127"/>
+          <p:cNvCxnSpPr/>
+          <p:nvPr/>
+        </p:nvCxnSpPr>
+        <p:spPr>
+          <a:xfrm flipV="1">
+            <a:off x="1554642" y="2772833"/>
+            <a:ext cx="207554" cy="92234"/>
+          </a:xfrm>
+          <a:prstGeom prst="straightConnector1">
+            <a:avLst/>
+          </a:prstGeom>
+          <a:ln w="22225">
+            <a:solidFill>
+              <a:schemeClr val="tx1"/>
+            </a:solidFill>
+            <a:tailEnd type="triangle"/>
+          </a:ln>
+          <a:effectLst/>
+        </p:spPr>
+        <p:style>
+          <a:lnRef idx="2">
+            <a:schemeClr val="accent1"/>
+          </a:lnRef>
+          <a:fillRef idx="0">
+            <a:schemeClr val="accent1"/>
+          </a:fillRef>
+          <a:effectRef idx="1">
+            <a:schemeClr val="accent1"/>
+          </a:effectRef>
+          <a:fontRef idx="minor">
+            <a:schemeClr val="tx1"/>
+          </a:fontRef>
+        </p:style>
+      </p:cxnSp>
+      <p:sp>
+        <p:nvSpPr>
+          <p:cNvPr id="129" name="ZoneTexte 128"/>
+          <p:cNvSpPr txBox="1"/>
+          <p:nvPr/>
+        </p:nvSpPr>
+        <p:spPr>
+          <a:xfrm>
+            <a:off x="5864868" y="2871377"/>
+            <a:ext cx="305830" cy="215444"/>
+          </a:xfrm>
+          <a:prstGeom prst="rect">
+            <a:avLst/>
+          </a:prstGeom>
+          <a:noFill/>
+        </p:spPr>
+        <p:txBody>
+          <a:bodyPr wrap="square" rtlCol="0">
+            <a:spAutoFit/>
+          </a:bodyPr>
+          <a:lstStyle/>
+          <a:p>
+            <a:pPr algn="ctr"/>
+            <a:r>
+              <a:rPr lang="fr-FR" sz="800" dirty="0" smtClean="0"/>
+              <a:t>= j</a:t>
+            </a:r>
+            <a:endParaRPr lang="fr-FR" sz="800" dirty="0"/>
+          </a:p>
+        </p:txBody>
+      </p:sp>
+      <p:sp>
+        <p:nvSpPr>
+          <p:cNvPr id="130" name="ZoneTexte 129"/>
+          <p:cNvSpPr txBox="1"/>
+          <p:nvPr/>
+        </p:nvSpPr>
+        <p:spPr>
+          <a:xfrm>
+            <a:off x="5541657" y="3077745"/>
+            <a:ext cx="294807" cy="215444"/>
+          </a:xfrm>
+          <a:prstGeom prst="rect">
+            <a:avLst/>
+          </a:prstGeom>
+          <a:noFill/>
+        </p:spPr>
+        <p:txBody>
+          <a:bodyPr wrap="square" rtlCol="0">
+            <a:spAutoFit/>
+          </a:bodyPr>
+          <a:lstStyle/>
+          <a:p>
+            <a:pPr algn="ctr"/>
+            <a:r>
+              <a:rPr lang="fr-FR" sz="800" dirty="0" smtClean="0"/>
+              <a:t>= i</a:t>
+            </a:r>
+            <a:endParaRPr lang="fr-FR" sz="800" dirty="0"/>
+          </a:p>
+        </p:txBody>
+      </p:sp>
+      <p:sp>
+        <p:nvSpPr>
+          <p:cNvPr id="131" name="ZoneTexte 130"/>
+          <p:cNvSpPr txBox="1"/>
+          <p:nvPr/>
+        </p:nvSpPr>
+        <p:spPr>
+          <a:xfrm>
+            <a:off x="5576455" y="2541959"/>
+            <a:ext cx="305830" cy="215444"/>
+          </a:xfrm>
+          <a:prstGeom prst="rect">
+            <a:avLst/>
+          </a:prstGeom>
+          <a:noFill/>
+        </p:spPr>
+        <p:txBody>
+          <a:bodyPr wrap="square" rtlCol="0">
+            <a:spAutoFit/>
+          </a:bodyPr>
+          <a:lstStyle/>
+          <a:p>
+            <a:pPr algn="ctr"/>
+            <a:r>
+              <a:rPr lang="fr-FR" sz="800" dirty="0" smtClean="0"/>
+              <a:t>= k</a:t>
+            </a:r>
+            <a:endParaRPr lang="fr-FR" sz="800" dirty="0"/>
+          </a:p>
+        </p:txBody>
+      </p:sp>
+      <p:sp>
+        <p:nvSpPr>
+          <p:cNvPr id="132" name="ZoneTexte 131"/>
+          <p:cNvSpPr txBox="1"/>
+          <p:nvPr/>
+        </p:nvSpPr>
+        <p:spPr>
+          <a:xfrm>
+            <a:off x="1818420" y="2854394"/>
+            <a:ext cx="305830" cy="215444"/>
+          </a:xfrm>
+          <a:prstGeom prst="rect">
+            <a:avLst/>
+          </a:prstGeom>
+          <a:noFill/>
+        </p:spPr>
+        <p:txBody>
+          <a:bodyPr wrap="square" rtlCol="0">
+            <a:spAutoFit/>
+          </a:bodyPr>
+          <a:lstStyle/>
+          <a:p>
+            <a:pPr algn="ctr"/>
+            <a:r>
+              <a:rPr lang="fr-FR" sz="800" dirty="0" smtClean="0"/>
+              <a:t>= j</a:t>
+            </a:r>
+            <a:endParaRPr lang="fr-FR" sz="800" dirty="0"/>
+          </a:p>
+        </p:txBody>
+      </p:sp>
+      <p:sp>
+        <p:nvSpPr>
+          <p:cNvPr id="133" name="ZoneTexte 132"/>
+          <p:cNvSpPr txBox="1"/>
+          <p:nvPr/>
+        </p:nvSpPr>
+        <p:spPr>
+          <a:xfrm>
+            <a:off x="1495209" y="3060762"/>
+            <a:ext cx="294807" cy="215444"/>
+          </a:xfrm>
+          <a:prstGeom prst="rect">
+            <a:avLst/>
+          </a:prstGeom>
+          <a:noFill/>
+        </p:spPr>
+        <p:txBody>
+          <a:bodyPr wrap="square" rtlCol="0">
+            <a:spAutoFit/>
+          </a:bodyPr>
+          <a:lstStyle/>
+          <a:p>
+            <a:pPr algn="ctr"/>
+            <a:r>
+              <a:rPr lang="fr-FR" sz="800" dirty="0" smtClean="0"/>
+              <a:t>= i</a:t>
+            </a:r>
+            <a:endParaRPr lang="fr-FR" sz="800" dirty="0"/>
+          </a:p>
+        </p:txBody>
+      </p:sp>
+      <p:sp>
+        <p:nvSpPr>
+          <p:cNvPr id="134" name="ZoneTexte 133"/>
+          <p:cNvSpPr txBox="1"/>
+          <p:nvPr/>
+        </p:nvSpPr>
+        <p:spPr>
+          <a:xfrm>
+            <a:off x="1530007" y="2524976"/>
+            <a:ext cx="305830" cy="215444"/>
+          </a:xfrm>
+          <a:prstGeom prst="rect">
+            <a:avLst/>
+          </a:prstGeom>
+          <a:noFill/>
+        </p:spPr>
+        <p:txBody>
+          <a:bodyPr wrap="square" rtlCol="0">
+            <a:spAutoFit/>
+          </a:bodyPr>
+          <a:lstStyle/>
+          <a:p>
+            <a:pPr algn="ctr"/>
+            <a:r>
+              <a:rPr lang="fr-FR" sz="800" dirty="0" smtClean="0"/>
+              <a:t>= k</a:t>
+            </a:r>
+            <a:endParaRPr lang="fr-FR" sz="800" dirty="0"/>
+          </a:p>
+        </p:txBody>
+      </p:sp>
+      <p:pic>
+        <p:nvPicPr>
+          <p:cNvPr id="135" name="Image 134" descr="latex-image-1.pdf"/>
+          <p:cNvPicPr>
+            <a:picLocks noChangeAspect="1"/>
+          </p:cNvPicPr>
+          <p:nvPr/>
+        </p:nvPicPr>
+        <p:blipFill>
+          <a:blip r:embed="rId5">
+            <a:extLst>
+              <a:ext uri="{28A0092B-C50C-407E-A947-70E740481C1C}">
+                <a14:useLocalDpi xmlns:a14="http://schemas.microsoft.com/office/drawing/2010/main" val="0"/>
+              </a:ext>
+            </a:extLst>
+          </a:blip>
+          <a:stretch>
+            <a:fillRect/>
+          </a:stretch>
+        </p:blipFill>
+        <p:spPr>
+          <a:xfrm>
+            <a:off x="1778687" y="2909341"/>
+            <a:ext cx="114300" cy="101600"/>
+          </a:xfrm>
+          <a:prstGeom prst="rect">
+            <a:avLst/>
+          </a:prstGeom>
+        </p:spPr>
+      </p:pic>
+      <p:pic>
+        <p:nvPicPr>
+          <p:cNvPr id="136" name="Image 135" descr="latex-image-1.pdf"/>
+          <p:cNvPicPr>
+            <a:picLocks noChangeAspect="1"/>
+          </p:cNvPicPr>
+          <p:nvPr/>
+        </p:nvPicPr>
+        <p:blipFill>
+          <a:blip r:embed="rId6">
+            <a:extLst>
+              <a:ext uri="{28A0092B-C50C-407E-A947-70E740481C1C}">
+                <a14:useLocalDpi xmlns:a14="http://schemas.microsoft.com/office/drawing/2010/main" val="0"/>
+              </a:ext>
+            </a:extLst>
+          </a:blip>
+          <a:stretch>
+            <a:fillRect/>
+          </a:stretch>
+        </p:blipFill>
+        <p:spPr>
+          <a:xfrm>
+            <a:off x="1444409" y="3120977"/>
+            <a:ext cx="101600" cy="101600"/>
+          </a:xfrm>
+          <a:prstGeom prst="rect">
+            <a:avLst/>
+          </a:prstGeom>
+        </p:spPr>
+      </p:pic>
+      <p:pic>
+        <p:nvPicPr>
+          <p:cNvPr id="137" name="Image 136" descr="latex-image-1.pdf"/>
+          <p:cNvPicPr>
+            <a:picLocks noChangeAspect="1"/>
+          </p:cNvPicPr>
+          <p:nvPr/>
+        </p:nvPicPr>
+        <p:blipFill>
+          <a:blip r:embed="rId7">
+            <a:extLst>
+              <a:ext uri="{28A0092B-C50C-407E-A947-70E740481C1C}">
+                <a14:useLocalDpi xmlns:a14="http://schemas.microsoft.com/office/drawing/2010/main" val="0"/>
+              </a:ext>
+            </a:extLst>
+          </a:blip>
+          <a:stretch>
+            <a:fillRect/>
+          </a:stretch>
+        </p:blipFill>
+        <p:spPr>
+          <a:xfrm>
+            <a:off x="1471813" y="2577841"/>
+            <a:ext cx="139700" cy="101600"/>
+          </a:xfrm>
+          <a:prstGeom prst="rect">
+            <a:avLst/>
+          </a:prstGeom>
+        </p:spPr>
+      </p:pic>
+      <p:pic>
+        <p:nvPicPr>
+          <p:cNvPr id="138" name="Image 137" descr="latex-image-1.pdf"/>
+          <p:cNvPicPr>
+            <a:picLocks noChangeAspect="1"/>
+          </p:cNvPicPr>
+          <p:nvPr/>
+        </p:nvPicPr>
+        <p:blipFill>
+          <a:blip r:embed="rId5">
+            <a:extLst>
+              <a:ext uri="{28A0092B-C50C-407E-A947-70E740481C1C}">
+                <a14:useLocalDpi xmlns:a14="http://schemas.microsoft.com/office/drawing/2010/main" val="0"/>
+              </a:ext>
+            </a:extLst>
+          </a:blip>
+          <a:stretch>
+            <a:fillRect/>
+          </a:stretch>
+        </p:blipFill>
+        <p:spPr>
+          <a:xfrm>
+            <a:off x="5825135" y="2919499"/>
+            <a:ext cx="114300" cy="101600"/>
+          </a:xfrm>
+          <a:prstGeom prst="rect">
+            <a:avLst/>
+          </a:prstGeom>
+        </p:spPr>
+      </p:pic>
+      <p:pic>
+        <p:nvPicPr>
+          <p:cNvPr id="139" name="Image 138" descr="latex-image-1.pdf"/>
+          <p:cNvPicPr>
+            <a:picLocks noChangeAspect="1"/>
+          </p:cNvPicPr>
+          <p:nvPr/>
+        </p:nvPicPr>
+        <p:blipFill>
+          <a:blip r:embed="rId6">
+            <a:extLst>
+              <a:ext uri="{28A0092B-C50C-407E-A947-70E740481C1C}">
+                <a14:useLocalDpi xmlns:a14="http://schemas.microsoft.com/office/drawing/2010/main" val="0"/>
+              </a:ext>
+            </a:extLst>
+          </a:blip>
+          <a:stretch>
+            <a:fillRect/>
+          </a:stretch>
+        </p:blipFill>
+        <p:spPr>
+          <a:xfrm>
+            <a:off x="5490857" y="3131135"/>
+            <a:ext cx="101600" cy="101600"/>
+          </a:xfrm>
+          <a:prstGeom prst="rect">
+            <a:avLst/>
+          </a:prstGeom>
+        </p:spPr>
+      </p:pic>
+      <p:pic>
+        <p:nvPicPr>
+          <p:cNvPr id="140" name="Image 139" descr="latex-image-1.pdf"/>
+          <p:cNvPicPr>
+            <a:picLocks noChangeAspect="1"/>
+          </p:cNvPicPr>
+          <p:nvPr/>
+        </p:nvPicPr>
+        <p:blipFill>
+          <a:blip r:embed="rId7">
+            <a:extLst>
+              <a:ext uri="{28A0092B-C50C-407E-A947-70E740481C1C}">
+                <a14:useLocalDpi xmlns:a14="http://schemas.microsoft.com/office/drawing/2010/main" val="0"/>
+              </a:ext>
+            </a:extLst>
+          </a:blip>
+          <a:stretch>
+            <a:fillRect/>
+          </a:stretch>
+        </p:blipFill>
+        <p:spPr>
+          <a:xfrm>
+            <a:off x="5518261" y="2587999"/>
+            <a:ext cx="139700" cy="101600"/>
+          </a:xfrm>
+          <a:prstGeom prst="rect">
+            <a:avLst/>
+          </a:prstGeom>
+        </p:spPr>
+      </p:pic>
     </p:spTree>
     <p:extLst>
       <p:ext uri="{BB962C8B-B14F-4D97-AF65-F5344CB8AC3E}">

</xml_diff>